<commit_message>
Full baseline run complete and updated slides
</commit_message>
<xml_diff>
--- a/DSCI521_rna63_final_project_pres.pptx
+++ b/DSCI521_rna63_final_project_pres.pptx
@@ -5,7 +5,7 @@
     <p:sldMasterId id="2147483648" r:id="rId1"/>
   </p:sldMasterIdLst>
   <p:notesMasterIdLst>
-    <p:notesMasterId r:id="rId22"/>
+    <p:notesMasterId r:id="rId26"/>
   </p:notesMasterIdLst>
   <p:sldIdLst>
     <p:sldId id="257" r:id="rId2"/>
@@ -20,14 +20,18 @@
     <p:sldId id="275" r:id="rId11"/>
     <p:sldId id="273" r:id="rId12"/>
     <p:sldId id="276" r:id="rId13"/>
-    <p:sldId id="274" r:id="rId14"/>
-    <p:sldId id="267" r:id="rId15"/>
-    <p:sldId id="269" r:id="rId16"/>
-    <p:sldId id="264" r:id="rId17"/>
-    <p:sldId id="265" r:id="rId18"/>
-    <p:sldId id="260" r:id="rId19"/>
-    <p:sldId id="261" r:id="rId20"/>
-    <p:sldId id="262" r:id="rId21"/>
+    <p:sldId id="279" r:id="rId14"/>
+    <p:sldId id="280" r:id="rId15"/>
+    <p:sldId id="281" r:id="rId16"/>
+    <p:sldId id="267" r:id="rId17"/>
+    <p:sldId id="269" r:id="rId18"/>
+    <p:sldId id="264" r:id="rId19"/>
+    <p:sldId id="277" r:id="rId20"/>
+    <p:sldId id="265" r:id="rId21"/>
+    <p:sldId id="278" r:id="rId22"/>
+    <p:sldId id="260" r:id="rId23"/>
+    <p:sldId id="261" r:id="rId24"/>
+    <p:sldId id="262" r:id="rId25"/>
   </p:sldIdLst>
   <p:sldSz cx="12192000" cy="6858000"/>
   <p:notesSz cx="6858000" cy="9144000"/>
@@ -126,6 +130,11 @@
       </a:defRPr>
     </a:lvl9pPr>
   </p:defaultTextStyle>
+  <p:extLst>
+    <p:ext uri="{EFAFB233-063F-42B5-8137-9DF3F51BA10A}">
+      <p15:sldGuideLst xmlns:p15="http://schemas.microsoft.com/office/powerpoint/2012/main"/>
+    </p:ext>
+  </p:extLst>
 </p:presentation>
 </file>
 
@@ -6038,8 +6047,8 @@
         </p:blipFill>
         <p:spPr>
           <a:xfrm>
-            <a:off x="415600" y="1249489"/>
-            <a:ext cx="7316289" cy="4127527"/>
+            <a:off x="1476838" y="1356967"/>
+            <a:ext cx="8441159" cy="4762129"/>
           </a:xfrm>
           <a:prstGeom prst="rect">
             <a:avLst/>
@@ -6081,7 +6090,7 @@
           <p:cNvPr id="2" name="Title 1">
             <a:extLst>
               <a:ext uri="{FF2B5EF4-FFF2-40B4-BE49-F238E27FC236}">
-                <a16:creationId xmlns:a16="http://schemas.microsoft.com/office/drawing/2014/main" id="{F896689A-01B6-8262-D8A2-F13FC4E303EF}"/>
+                <a16:creationId xmlns:a16="http://schemas.microsoft.com/office/drawing/2014/main" id="{4F7DF899-F2F3-763D-CB80-3F7980E38C55}"/>
               </a:ext>
             </a:extLst>
           </p:cNvPr>
@@ -6099,39 +6108,77 @@
           </a:bodyPr>
           <a:lstStyle/>
           <a:p>
-            <a:endParaRPr lang="en-US"/>
-          </a:p>
-        </p:txBody>
-      </p:sp>
-      <p:sp>
-        <p:nvSpPr>
-          <p:cNvPr id="3" name="Text Placeholder 2">
-            <a:extLst>
-              <a:ext uri="{FF2B5EF4-FFF2-40B4-BE49-F238E27FC236}">
-                <a16:creationId xmlns:a16="http://schemas.microsoft.com/office/drawing/2014/main" id="{38F8583C-FF1F-1B5C-02A6-6C6C36AEE106}"/>
-              </a:ext>
-            </a:extLst>
-          </p:cNvPr>
-          <p:cNvSpPr>
-            <a:spLocks noGrp="1"/>
-          </p:cNvSpPr>
-          <p:nvPr>
-            <p:ph type="body" idx="1"/>
-          </p:nvPr>
-        </p:nvSpPr>
-        <p:spPr/>
-        <p:txBody>
-          <a:bodyPr/>
-          <a:lstStyle/>
-          <a:p>
-            <a:endParaRPr lang="en-US"/>
-          </a:p>
-        </p:txBody>
-      </p:sp>
+            <a:r>
+              <a:rPr lang="en-US" dirty="0"/>
+              <a:t>Categorical Features</a:t>
+            </a:r>
+          </a:p>
+        </p:txBody>
+      </p:sp>
+      <p:pic>
+        <p:nvPicPr>
+          <p:cNvPr id="3" name="Picture 2">
+            <a:extLst>
+              <a:ext uri="{FF2B5EF4-FFF2-40B4-BE49-F238E27FC236}">
+                <a16:creationId xmlns:a16="http://schemas.microsoft.com/office/drawing/2014/main" id="{5B22C405-473F-60FF-5F19-29A2C9C276D3}"/>
+              </a:ext>
+            </a:extLst>
+          </p:cNvPr>
+          <p:cNvPicPr>
+            <a:picLocks noChangeAspect="1"/>
+          </p:cNvPicPr>
+          <p:nvPr/>
+        </p:nvPicPr>
+        <p:blipFill>
+          <a:blip r:embed="rId2"/>
+          <a:stretch>
+            <a:fillRect/>
+          </a:stretch>
+        </p:blipFill>
+        <p:spPr>
+          <a:xfrm>
+            <a:off x="879231" y="1356967"/>
+            <a:ext cx="4469342" cy="4681708"/>
+          </a:xfrm>
+          <a:prstGeom prst="rect">
+            <a:avLst/>
+          </a:prstGeom>
+        </p:spPr>
+      </p:pic>
+      <p:pic>
+        <p:nvPicPr>
+          <p:cNvPr id="4" name="Picture 3">
+            <a:extLst>
+              <a:ext uri="{FF2B5EF4-FFF2-40B4-BE49-F238E27FC236}">
+                <a16:creationId xmlns:a16="http://schemas.microsoft.com/office/drawing/2014/main" id="{EAF340D5-C269-ACC8-5949-5D69281F3B04}"/>
+              </a:ext>
+            </a:extLst>
+          </p:cNvPr>
+          <p:cNvPicPr>
+            <a:picLocks noChangeAspect="1"/>
+          </p:cNvPicPr>
+          <p:nvPr/>
+        </p:nvPicPr>
+        <p:blipFill>
+          <a:blip r:embed="rId3"/>
+          <a:stretch>
+            <a:fillRect/>
+          </a:stretch>
+        </p:blipFill>
+        <p:spPr>
+          <a:xfrm>
+            <a:off x="5551726" y="1356967"/>
+            <a:ext cx="4479809" cy="4246587"/>
+          </a:xfrm>
+          <a:prstGeom prst="rect">
+            <a:avLst/>
+          </a:prstGeom>
+        </p:spPr>
+      </p:pic>
     </p:spTree>
     <p:extLst>
       <p:ext uri="{BB962C8B-B14F-4D97-AF65-F5344CB8AC3E}">
-        <p14:creationId xmlns:p14="http://schemas.microsoft.com/office/powerpoint/2010/main" val="1239029414"/>
+        <p14:creationId xmlns:p14="http://schemas.microsoft.com/office/powerpoint/2010/main" val="1614074916"/>
       </p:ext>
     </p:extLst>
   </p:cSld>
@@ -6160,6 +6207,186 @@
       </p:grpSpPr>
       <p:sp>
         <p:nvSpPr>
+          <p:cNvPr id="2" name="Title 1">
+            <a:extLst>
+              <a:ext uri="{FF2B5EF4-FFF2-40B4-BE49-F238E27FC236}">
+                <a16:creationId xmlns:a16="http://schemas.microsoft.com/office/drawing/2014/main" id="{3AA4A574-CBC4-24C7-4866-43ABEDA53EEC}"/>
+              </a:ext>
+            </a:extLst>
+          </p:cNvPr>
+          <p:cNvSpPr>
+            <a:spLocks noGrp="1"/>
+          </p:cNvSpPr>
+          <p:nvPr>
+            <p:ph type="title"/>
+          </p:nvPr>
+        </p:nvSpPr>
+        <p:spPr/>
+        <p:txBody>
+          <a:bodyPr>
+            <a:normAutofit fontScale="90000"/>
+          </a:bodyPr>
+          <a:lstStyle/>
+          <a:p>
+            <a:r>
+              <a:rPr lang="en-US" dirty="0"/>
+              <a:t>Categorical Features</a:t>
+            </a:r>
+          </a:p>
+        </p:txBody>
+      </p:sp>
+      <p:pic>
+        <p:nvPicPr>
+          <p:cNvPr id="4" name="Picture 3">
+            <a:extLst>
+              <a:ext uri="{FF2B5EF4-FFF2-40B4-BE49-F238E27FC236}">
+                <a16:creationId xmlns:a16="http://schemas.microsoft.com/office/drawing/2014/main" id="{A0762785-5C73-E247-DDCC-87D32BF5EF1D}"/>
+              </a:ext>
+            </a:extLst>
+          </p:cNvPr>
+          <p:cNvPicPr>
+            <a:picLocks noChangeAspect="1"/>
+          </p:cNvPicPr>
+          <p:nvPr/>
+        </p:nvPicPr>
+        <p:blipFill>
+          <a:blip r:embed="rId2"/>
+          <a:stretch>
+            <a:fillRect/>
+          </a:stretch>
+        </p:blipFill>
+        <p:spPr>
+          <a:xfrm>
+            <a:off x="937846" y="1444557"/>
+            <a:ext cx="9044354" cy="4618393"/>
+          </a:xfrm>
+          <a:prstGeom prst="rect">
+            <a:avLst/>
+          </a:prstGeom>
+        </p:spPr>
+      </p:pic>
+    </p:spTree>
+    <p:extLst>
+      <p:ext uri="{BB962C8B-B14F-4D97-AF65-F5344CB8AC3E}">
+        <p14:creationId xmlns:p14="http://schemas.microsoft.com/office/powerpoint/2010/main" val="211798546"/>
+      </p:ext>
+    </p:extLst>
+  </p:cSld>
+  <p:clrMapOvr>
+    <a:masterClrMapping/>
+  </p:clrMapOvr>
+</p:sld>
+</file>
+
+<file path=ppt/slides/slide15.xml><?xml version="1.0" encoding="utf-8"?>
+<p:sld xmlns:a="http://schemas.openxmlformats.org/drawingml/2006/main" xmlns:r="http://schemas.openxmlformats.org/officeDocument/2006/relationships" xmlns:p="http://schemas.openxmlformats.org/presentationml/2006/main">
+  <p:cSld>
+    <p:spTree>
+      <p:nvGrpSpPr>
+        <p:cNvPr id="1" name=""/>
+        <p:cNvGrpSpPr/>
+        <p:nvPr/>
+      </p:nvGrpSpPr>
+      <p:grpSpPr>
+        <a:xfrm>
+          <a:off x="0" y="0"/>
+          <a:ext cx="0" cy="0"/>
+          <a:chOff x="0" y="0"/>
+          <a:chExt cx="0" cy="0"/>
+        </a:xfrm>
+      </p:grpSpPr>
+      <p:sp>
+        <p:nvSpPr>
+          <p:cNvPr id="2" name="Title 1">
+            <a:extLst>
+              <a:ext uri="{FF2B5EF4-FFF2-40B4-BE49-F238E27FC236}">
+                <a16:creationId xmlns:a16="http://schemas.microsoft.com/office/drawing/2014/main" id="{9F176DE6-DCF9-5C18-92A1-49B970F6D80C}"/>
+              </a:ext>
+            </a:extLst>
+          </p:cNvPr>
+          <p:cNvSpPr>
+            <a:spLocks noGrp="1"/>
+          </p:cNvSpPr>
+          <p:nvPr>
+            <p:ph type="title"/>
+          </p:nvPr>
+        </p:nvSpPr>
+        <p:spPr/>
+        <p:txBody>
+          <a:bodyPr>
+            <a:normAutofit fontScale="90000"/>
+          </a:bodyPr>
+          <a:lstStyle/>
+          <a:p>
+            <a:r>
+              <a:rPr lang="en-US" dirty="0"/>
+              <a:t>Categorical Features</a:t>
+            </a:r>
+          </a:p>
+        </p:txBody>
+      </p:sp>
+      <p:pic>
+        <p:nvPicPr>
+          <p:cNvPr id="4" name="Picture 3">
+            <a:extLst>
+              <a:ext uri="{FF2B5EF4-FFF2-40B4-BE49-F238E27FC236}">
+                <a16:creationId xmlns:a16="http://schemas.microsoft.com/office/drawing/2014/main" id="{A18B7439-9230-CE18-7FCA-FE6A53E90C39}"/>
+              </a:ext>
+            </a:extLst>
+          </p:cNvPr>
+          <p:cNvPicPr>
+            <a:picLocks noChangeAspect="1"/>
+          </p:cNvPicPr>
+          <p:nvPr/>
+        </p:nvPicPr>
+        <p:blipFill>
+          <a:blip r:embed="rId2"/>
+          <a:stretch>
+            <a:fillRect/>
+          </a:stretch>
+        </p:blipFill>
+        <p:spPr>
+          <a:xfrm>
+            <a:off x="691662" y="1377253"/>
+            <a:ext cx="9290538" cy="4905003"/>
+          </a:xfrm>
+          <a:prstGeom prst="rect">
+            <a:avLst/>
+          </a:prstGeom>
+        </p:spPr>
+      </p:pic>
+    </p:spTree>
+    <p:extLst>
+      <p:ext uri="{BB962C8B-B14F-4D97-AF65-F5344CB8AC3E}">
+        <p14:creationId xmlns:p14="http://schemas.microsoft.com/office/powerpoint/2010/main" val="4251898205"/>
+      </p:ext>
+    </p:extLst>
+  </p:cSld>
+  <p:clrMapOvr>
+    <a:masterClrMapping/>
+  </p:clrMapOvr>
+</p:sld>
+</file>
+
+<file path=ppt/slides/slide16.xml><?xml version="1.0" encoding="utf-8"?>
+<p:sld xmlns:a="http://schemas.openxmlformats.org/drawingml/2006/main" xmlns:r="http://schemas.openxmlformats.org/officeDocument/2006/relationships" xmlns:p="http://schemas.openxmlformats.org/presentationml/2006/main">
+  <p:cSld>
+    <p:spTree>
+      <p:nvGrpSpPr>
+        <p:cNvPr id="1" name=""/>
+        <p:cNvGrpSpPr/>
+        <p:nvPr/>
+      </p:nvGrpSpPr>
+      <p:grpSpPr>
+        <a:xfrm>
+          <a:off x="0" y="0"/>
+          <a:ext cx="0" cy="0"/>
+          <a:chOff x="0" y="0"/>
+          <a:chExt cx="0" cy="0"/>
+        </a:xfrm>
+      </p:grpSpPr>
+      <p:sp>
+        <p:nvSpPr>
           <p:cNvPr id="3" name="Text Placeholder 2">
             <a:extLst>
               <a:ext uri="{FF2B5EF4-FFF2-40B4-BE49-F238E27FC236}">
@@ -6174,26 +6401,39 @@
             <p:ph type="body" idx="1"/>
           </p:nvPr>
         </p:nvSpPr>
-        <p:spPr/>
+        <p:spPr>
+          <a:xfrm>
+            <a:off x="415600" y="1536633"/>
+            <a:ext cx="4261908" cy="2402321"/>
+          </a:xfrm>
+        </p:spPr>
         <p:txBody>
           <a:bodyPr/>
           <a:lstStyle/>
           <a:p>
             <a:r>
               <a:rPr lang="en-US" dirty="0"/>
-              <a:t>TODO: cleaning, outliers</a:t>
-            </a:r>
-          </a:p>
-          <a:p>
+              <a:t>Imputed missing values</a:t>
+            </a:r>
+          </a:p>
+          <a:p>
+            <a:pPr lvl="1"/>
             <a:r>
               <a:rPr lang="en-US" dirty="0"/>
-              <a:t>TODO: imputation</a:t>
-            </a:r>
-          </a:p>
-          <a:p>
+              <a:t>Categorical mode</a:t>
+            </a:r>
+          </a:p>
+          <a:p>
+            <a:pPr lvl="1"/>
             <a:r>
               <a:rPr lang="en-US" dirty="0"/>
-              <a:t>TODO: what else?</a:t>
+              <a:t>Numerical: mean</a:t>
+            </a:r>
+          </a:p>
+          <a:p>
+            <a:r>
+              <a:rPr lang="en-US" dirty="0"/>
+              <a:t>Drop rows missing price</a:t>
             </a:r>
           </a:p>
         </p:txBody>
@@ -6438,244 +6678,97 @@
           </a:extLst>
         </p:spPr>
       </p:pic>
+      <p:sp>
+        <p:nvSpPr>
+          <p:cNvPr id="5" name="TextBox 4">
+            <a:extLst>
+              <a:ext uri="{FF2B5EF4-FFF2-40B4-BE49-F238E27FC236}">
+                <a16:creationId xmlns:a16="http://schemas.microsoft.com/office/drawing/2014/main" id="{D78EC7FA-90BF-0196-EE2D-CECFDFE39FF6}"/>
+              </a:ext>
+            </a:extLst>
+          </p:cNvPr>
+          <p:cNvSpPr txBox="1"/>
+          <p:nvPr/>
+        </p:nvSpPr>
+        <p:spPr>
+          <a:xfrm>
+            <a:off x="5603631" y="5099538"/>
+            <a:ext cx="4267200" cy="1477328"/>
+          </a:xfrm>
+          <a:prstGeom prst="rect">
+            <a:avLst/>
+          </a:prstGeom>
+          <a:noFill/>
+        </p:spPr>
+        <p:txBody>
+          <a:bodyPr wrap="square" rtlCol="0">
+            <a:spAutoFit/>
+          </a:bodyPr>
+          <a:lstStyle/>
+          <a:p>
+            <a:pPr marL="285750" indent="-285750">
+              <a:buFont typeface="Arial" panose="020B0604020202020204" pitchFamily="34" charset="0"/>
+              <a:buChar char="•"/>
+            </a:pPr>
+            <a:r>
+              <a:rPr lang="en-US" dirty="0"/>
+              <a:t>Capped outliers</a:t>
+            </a:r>
+          </a:p>
+          <a:p>
+            <a:pPr marL="742950" lvl="1" indent="-285750">
+              <a:buFont typeface="Arial" panose="020B0604020202020204" pitchFamily="34" charset="0"/>
+              <a:buChar char="•"/>
+            </a:pPr>
+            <a:r>
+              <a:rPr lang="en-US" dirty="0"/>
+              <a:t>Price &gt; 300,000 or &lt; 1</a:t>
+            </a:r>
+          </a:p>
+          <a:p>
+            <a:pPr marL="742950" lvl="1" indent="-285750">
+              <a:buFont typeface="Arial" panose="020B0604020202020204" pitchFamily="34" charset="0"/>
+              <a:buChar char="•"/>
+            </a:pPr>
+            <a:r>
+              <a:rPr lang="en-US" dirty="0"/>
+              <a:t>Years &gt; 2023</a:t>
+            </a:r>
+          </a:p>
+          <a:p>
+            <a:pPr marL="742950" lvl="1" indent="-285750">
+              <a:buFont typeface="Arial" panose="020B0604020202020204" pitchFamily="34" charset="0"/>
+              <a:buChar char="•"/>
+            </a:pPr>
+            <a:r>
+              <a:rPr lang="en-US" dirty="0"/>
+              <a:t>Odometer &gt; 300,000</a:t>
+            </a:r>
+          </a:p>
+          <a:p>
+            <a:pPr marL="742950" lvl="1" indent="-285750">
+              <a:buFont typeface="Arial" panose="020B0604020202020204" pitchFamily="34" charset="0"/>
+              <a:buChar char="•"/>
+            </a:pPr>
+            <a:r>
+              <a:rPr lang="en-US" dirty="0"/>
+              <a:t>Anything &gt; 3 </a:t>
+            </a:r>
+            <a:r>
+              <a:rPr lang="en-US" dirty="0" err="1"/>
+              <a:t>stdev</a:t>
+            </a:r>
+            <a:r>
+              <a:rPr lang="en-US" dirty="0"/>
+              <a:t> from mean</a:t>
+            </a:r>
+          </a:p>
+        </p:txBody>
+      </p:sp>
     </p:spTree>
     <p:extLst>
       <p:ext uri="{BB962C8B-B14F-4D97-AF65-F5344CB8AC3E}">
         <p14:creationId xmlns:p14="http://schemas.microsoft.com/office/powerpoint/2010/main" val="3777694294"/>
-      </p:ext>
-    </p:extLst>
-  </p:cSld>
-  <p:clrMapOvr>
-    <a:masterClrMapping/>
-  </p:clrMapOvr>
-</p:sld>
-</file>
-
-<file path=ppt/slides/slide15.xml><?xml version="1.0" encoding="utf-8"?>
-<p:sld xmlns:a="http://schemas.openxmlformats.org/drawingml/2006/main" xmlns:r="http://schemas.openxmlformats.org/officeDocument/2006/relationships" xmlns:p="http://schemas.openxmlformats.org/presentationml/2006/main">
-  <p:cSld>
-    <p:spTree>
-      <p:nvGrpSpPr>
-        <p:cNvPr id="1" name=""/>
-        <p:cNvGrpSpPr/>
-        <p:nvPr/>
-      </p:nvGrpSpPr>
-      <p:grpSpPr>
-        <a:xfrm>
-          <a:off x="0" y="0"/>
-          <a:ext cx="0" cy="0"/>
-          <a:chOff x="0" y="0"/>
-          <a:chExt cx="0" cy="0"/>
-        </a:xfrm>
-      </p:grpSpPr>
-      <p:sp>
-        <p:nvSpPr>
-          <p:cNvPr id="2" name="Title 1">
-            <a:extLst>
-              <a:ext uri="{FF2B5EF4-FFF2-40B4-BE49-F238E27FC236}">
-                <a16:creationId xmlns:a16="http://schemas.microsoft.com/office/drawing/2014/main" id="{15778324-782C-DA70-60DA-7500BFD7E639}"/>
-              </a:ext>
-            </a:extLst>
-          </p:cNvPr>
-          <p:cNvSpPr>
-            <a:spLocks noGrp="1"/>
-          </p:cNvSpPr>
-          <p:nvPr>
-            <p:ph type="title"/>
-          </p:nvPr>
-        </p:nvSpPr>
-        <p:spPr/>
-        <p:txBody>
-          <a:bodyPr>
-            <a:normAutofit fontScale="90000"/>
-          </a:bodyPr>
-          <a:lstStyle/>
-          <a:p>
-            <a:r>
-              <a:rPr lang="en-US" dirty="0"/>
-              <a:t>Regression Models</a:t>
-            </a:r>
-          </a:p>
-        </p:txBody>
-      </p:sp>
-      <p:sp>
-        <p:nvSpPr>
-          <p:cNvPr id="3" name="Text Placeholder 2">
-            <a:extLst>
-              <a:ext uri="{FF2B5EF4-FFF2-40B4-BE49-F238E27FC236}">
-                <a16:creationId xmlns:a16="http://schemas.microsoft.com/office/drawing/2014/main" id="{DE0E9E0A-63C8-A068-D9E9-42BE104B4D5A}"/>
-              </a:ext>
-            </a:extLst>
-          </p:cNvPr>
-          <p:cNvSpPr>
-            <a:spLocks noGrp="1"/>
-          </p:cNvSpPr>
-          <p:nvPr>
-            <p:ph type="body" idx="1"/>
-          </p:nvPr>
-        </p:nvSpPr>
-        <p:spPr/>
-        <p:txBody>
-          <a:bodyPr/>
-          <a:lstStyle/>
-          <a:p>
-            <a:endParaRPr lang="en-US"/>
-          </a:p>
-        </p:txBody>
-      </p:sp>
-    </p:spTree>
-    <p:extLst>
-      <p:ext uri="{BB962C8B-B14F-4D97-AF65-F5344CB8AC3E}">
-        <p14:creationId xmlns:p14="http://schemas.microsoft.com/office/powerpoint/2010/main" val="179389556"/>
-      </p:ext>
-    </p:extLst>
-  </p:cSld>
-  <p:clrMapOvr>
-    <a:masterClrMapping/>
-  </p:clrMapOvr>
-</p:sld>
-</file>
-
-<file path=ppt/slides/slide16.xml><?xml version="1.0" encoding="utf-8"?>
-<p:sld xmlns:a="http://schemas.openxmlformats.org/drawingml/2006/main" xmlns:r="http://schemas.openxmlformats.org/officeDocument/2006/relationships" xmlns:p="http://schemas.openxmlformats.org/presentationml/2006/main">
-  <p:cSld>
-    <p:spTree>
-      <p:nvGrpSpPr>
-        <p:cNvPr id="1" name=""/>
-        <p:cNvGrpSpPr/>
-        <p:nvPr/>
-      </p:nvGrpSpPr>
-      <p:grpSpPr>
-        <a:xfrm>
-          <a:off x="0" y="0"/>
-          <a:ext cx="0" cy="0"/>
-          <a:chOff x="0" y="0"/>
-          <a:chExt cx="0" cy="0"/>
-        </a:xfrm>
-      </p:grpSpPr>
-      <p:sp>
-        <p:nvSpPr>
-          <p:cNvPr id="2" name="Title 1">
-            <a:extLst>
-              <a:ext uri="{FF2B5EF4-FFF2-40B4-BE49-F238E27FC236}">
-                <a16:creationId xmlns:a16="http://schemas.microsoft.com/office/drawing/2014/main" id="{1F0C52C0-01B3-F221-D5FC-9C4EDC0CD303}"/>
-              </a:ext>
-            </a:extLst>
-          </p:cNvPr>
-          <p:cNvSpPr>
-            <a:spLocks noGrp="1"/>
-          </p:cNvSpPr>
-          <p:nvPr>
-            <p:ph type="title"/>
-          </p:nvPr>
-        </p:nvSpPr>
-        <p:spPr/>
-        <p:txBody>
-          <a:bodyPr>
-            <a:normAutofit fontScale="90000"/>
-          </a:bodyPr>
-          <a:lstStyle/>
-          <a:p>
-            <a:r>
-              <a:rPr lang="en-US" dirty="0"/>
-              <a:t>Challenges</a:t>
-            </a:r>
-          </a:p>
-        </p:txBody>
-      </p:sp>
-      <p:sp>
-        <p:nvSpPr>
-          <p:cNvPr id="3" name="Text Placeholder 2">
-            <a:extLst>
-              <a:ext uri="{FF2B5EF4-FFF2-40B4-BE49-F238E27FC236}">
-                <a16:creationId xmlns:a16="http://schemas.microsoft.com/office/drawing/2014/main" id="{C0EF2BFA-4478-3D74-D6BD-B3A6120056D8}"/>
-              </a:ext>
-            </a:extLst>
-          </p:cNvPr>
-          <p:cNvSpPr>
-            <a:spLocks noGrp="1"/>
-          </p:cNvSpPr>
-          <p:nvPr>
-            <p:ph type="body" idx="1"/>
-          </p:nvPr>
-        </p:nvSpPr>
-        <p:spPr/>
-        <p:txBody>
-          <a:bodyPr/>
-          <a:lstStyle/>
-          <a:p>
-            <a:r>
-              <a:rPr lang="en-US" dirty="0"/>
-              <a:t>EDA notebook for cleaning data kept crashing due to dataset size.</a:t>
-            </a:r>
-          </a:p>
-          <a:p>
-            <a:pPr lvl="1"/>
-            <a:r>
-              <a:rPr lang="en-US" dirty="0"/>
-              <a:t>Visualizations made it crash, actually data cleaning pretty fast.</a:t>
-            </a:r>
-          </a:p>
-          <a:p>
-            <a:pPr lvl="1"/>
-            <a:r>
-              <a:rPr lang="en-US" dirty="0"/>
-              <a:t>Had to disable pair plots for the full dataset.</a:t>
-            </a:r>
-          </a:p>
-          <a:p>
-            <a:r>
-              <a:rPr lang="en-US" dirty="0"/>
-              <a:t>Sparse categorical features</a:t>
-            </a:r>
-          </a:p>
-          <a:p>
-            <a:pPr lvl="1"/>
-            <a:r>
-              <a:rPr lang="en-US" dirty="0"/>
-              <a:t>i.e. model</a:t>
-            </a:r>
-          </a:p>
-          <a:p>
-            <a:pPr lvl="1"/>
-            <a:r>
-              <a:rPr lang="en-US" dirty="0"/>
-              <a:t>One hot encoding with decision trees has some drawbacks</a:t>
-            </a:r>
-          </a:p>
-          <a:p>
-            <a:pPr lvl="1"/>
-            <a:r>
-              <a:rPr lang="en-US" dirty="0"/>
-              <a:t>Had to use leave one out encoding for getting feature importance for </a:t>
-            </a:r>
-            <a:r>
-              <a:rPr lang="en-US" dirty="0" err="1"/>
-              <a:t>XGBoost</a:t>
-            </a:r>
-            <a:r>
-              <a:rPr lang="en-US" dirty="0"/>
-              <a:t> so could map back to original columns, but LOO had worse </a:t>
-            </a:r>
-            <a:r>
-              <a:rPr lang="en-US"/>
-              <a:t>regression performance.</a:t>
-            </a:r>
-            <a:endParaRPr lang="en-US" dirty="0"/>
-          </a:p>
-          <a:p>
-            <a:endParaRPr lang="en-US" dirty="0"/>
-          </a:p>
-          <a:p>
-            <a:pPr lvl="1"/>
-            <a:endParaRPr lang="en-US" dirty="0"/>
-          </a:p>
-        </p:txBody>
-      </p:sp>
-    </p:spTree>
-    <p:extLst>
-      <p:ext uri="{BB962C8B-B14F-4D97-AF65-F5344CB8AC3E}">
-        <p14:creationId xmlns:p14="http://schemas.microsoft.com/office/powerpoint/2010/main" val="2543066011"/>
       </p:ext>
     </p:extLst>
   </p:cSld>
@@ -6707,7 +6800,7 @@
           <p:cNvPr id="2" name="Title 1">
             <a:extLst>
               <a:ext uri="{FF2B5EF4-FFF2-40B4-BE49-F238E27FC236}">
-                <a16:creationId xmlns:a16="http://schemas.microsoft.com/office/drawing/2014/main" id="{FCA33D96-A37D-63AA-BFE9-8DC27819D038}"/>
+                <a16:creationId xmlns:a16="http://schemas.microsoft.com/office/drawing/2014/main" id="{15778324-782C-DA70-60DA-7500BFD7E639}"/>
               </a:ext>
             </a:extLst>
           </p:cNvPr>
@@ -6727,7 +6820,7 @@
           <a:p>
             <a:r>
               <a:rPr lang="en-US" dirty="0"/>
-              <a:t>Results</a:t>
+              <a:t>Regression Models</a:t>
             </a:r>
           </a:p>
         </p:txBody>
@@ -6737,7 +6830,7 @@
           <p:cNvPr id="3" name="Text Placeholder 2">
             <a:extLst>
               <a:ext uri="{FF2B5EF4-FFF2-40B4-BE49-F238E27FC236}">
-                <a16:creationId xmlns:a16="http://schemas.microsoft.com/office/drawing/2014/main" id="{58914A15-C88E-CDA4-05EE-1E2C42EC7EBC}"/>
+                <a16:creationId xmlns:a16="http://schemas.microsoft.com/office/drawing/2014/main" id="{DE0E9E0A-63C8-A068-D9E9-42BE104B4D5A}"/>
               </a:ext>
             </a:extLst>
           </p:cNvPr>
@@ -6753,14 +6846,17 @@
           <a:bodyPr/>
           <a:lstStyle/>
           <a:p>
-            <a:endParaRPr lang="en-US"/>
+            <a:r>
+              <a:rPr lang="en-US" dirty="0"/>
+              <a:t>TODO:</a:t>
+            </a:r>
           </a:p>
         </p:txBody>
       </p:sp>
     </p:spTree>
     <p:extLst>
       <p:ext uri="{BB962C8B-B14F-4D97-AF65-F5344CB8AC3E}">
-        <p14:creationId xmlns:p14="http://schemas.microsoft.com/office/powerpoint/2010/main" val="3365831599"/>
+        <p14:creationId xmlns:p14="http://schemas.microsoft.com/office/powerpoint/2010/main" val="179389556"/>
       </p:ext>
     </p:extLst>
   </p:cSld>
@@ -6792,7 +6888,7 @@
           <p:cNvPr id="2" name="Title 1">
             <a:extLst>
               <a:ext uri="{FF2B5EF4-FFF2-40B4-BE49-F238E27FC236}">
-                <a16:creationId xmlns:a16="http://schemas.microsoft.com/office/drawing/2014/main" id="{AEBC7FCA-308D-A31D-9598-DA5221AAF52C}"/>
+                <a16:creationId xmlns:a16="http://schemas.microsoft.com/office/drawing/2014/main" id="{1F0C52C0-01B3-F221-D5FC-9C4EDC0CD303}"/>
               </a:ext>
             </a:extLst>
           </p:cNvPr>
@@ -6812,7 +6908,7 @@
           <a:p>
             <a:r>
               <a:rPr lang="en-US" dirty="0"/>
-              <a:t>Summary</a:t>
+              <a:t>Challenges</a:t>
             </a:r>
           </a:p>
         </p:txBody>
@@ -6822,7 +6918,7 @@
           <p:cNvPr id="3" name="Text Placeholder 2">
             <a:extLst>
               <a:ext uri="{FF2B5EF4-FFF2-40B4-BE49-F238E27FC236}">
-                <a16:creationId xmlns:a16="http://schemas.microsoft.com/office/drawing/2014/main" id="{113FD658-CDD5-73DA-A1C2-FE8D03D723D0}"/>
+                <a16:creationId xmlns:a16="http://schemas.microsoft.com/office/drawing/2014/main" id="{C0EF2BFA-4478-3D74-D6BD-B3A6120056D8}"/>
               </a:ext>
             </a:extLst>
           </p:cNvPr>
@@ -6838,14 +6934,78 @@
           <a:bodyPr/>
           <a:lstStyle/>
           <a:p>
-            <a:endParaRPr lang="en-US"/>
+            <a:r>
+              <a:rPr lang="en-US" dirty="0"/>
+              <a:t>EDA notebook for cleaning data kept crashing due to dataset size.</a:t>
+            </a:r>
+          </a:p>
+          <a:p>
+            <a:pPr lvl="1"/>
+            <a:r>
+              <a:rPr lang="en-US" dirty="0"/>
+              <a:t>Visualizations made it crash, actually data cleaning pretty fast.</a:t>
+            </a:r>
+          </a:p>
+          <a:p>
+            <a:pPr lvl="1"/>
+            <a:r>
+              <a:rPr lang="en-US" dirty="0"/>
+              <a:t>Had to disable pair plots for the full dataset.</a:t>
+            </a:r>
+          </a:p>
+          <a:p>
+            <a:r>
+              <a:rPr lang="en-US" dirty="0"/>
+              <a:t>Sparse categorical features</a:t>
+            </a:r>
+          </a:p>
+          <a:p>
+            <a:pPr lvl="1"/>
+            <a:r>
+              <a:rPr lang="en-US" dirty="0"/>
+              <a:t>i.e. model</a:t>
+            </a:r>
+          </a:p>
+          <a:p>
+            <a:pPr lvl="1"/>
+            <a:r>
+              <a:rPr lang="en-US" dirty="0"/>
+              <a:t>One hot encoding with decision trees has some drawbacks</a:t>
+            </a:r>
+          </a:p>
+          <a:p>
+            <a:pPr lvl="1"/>
+            <a:r>
+              <a:rPr lang="en-US" dirty="0"/>
+              <a:t>Had to use leave one out encoding for getting feature importance for </a:t>
+            </a:r>
+            <a:r>
+              <a:rPr lang="en-US" dirty="0" err="1"/>
+              <a:t>XGBoost</a:t>
+            </a:r>
+            <a:r>
+              <a:rPr lang="en-US" dirty="0"/>
+              <a:t> so could map back to original columns, but LOO had worse </a:t>
+            </a:r>
+            <a:r>
+              <a:rPr lang="en-US"/>
+              <a:t>regression performance.</a:t>
+            </a:r>
+            <a:endParaRPr lang="en-US" dirty="0"/>
+          </a:p>
+          <a:p>
+            <a:endParaRPr lang="en-US" dirty="0"/>
+          </a:p>
+          <a:p>
+            <a:pPr lvl="1"/>
+            <a:endParaRPr lang="en-US" dirty="0"/>
           </a:p>
         </p:txBody>
       </p:sp>
     </p:spTree>
     <p:extLst>
       <p:ext uri="{BB962C8B-B14F-4D97-AF65-F5344CB8AC3E}">
-        <p14:creationId xmlns:p14="http://schemas.microsoft.com/office/powerpoint/2010/main" val="2573754190"/>
+        <p14:creationId xmlns:p14="http://schemas.microsoft.com/office/powerpoint/2010/main" val="2543066011"/>
       </p:ext>
     </p:extLst>
   </p:cSld>
@@ -6877,7 +7037,7 @@
           <p:cNvPr id="2" name="Title 1">
             <a:extLst>
               <a:ext uri="{FF2B5EF4-FFF2-40B4-BE49-F238E27FC236}">
-                <a16:creationId xmlns:a16="http://schemas.microsoft.com/office/drawing/2014/main" id="{1D0A476F-72B7-4C4E-0D29-8A9CD99767B6}"/>
+                <a16:creationId xmlns:a16="http://schemas.microsoft.com/office/drawing/2014/main" id="{DF5DF056-B79A-D7A6-8765-FD70C3A13085}"/>
               </a:ext>
             </a:extLst>
           </p:cNvPr>
@@ -6897,44 +7057,114 @@
           <a:p>
             <a:r>
               <a:rPr lang="en-US" dirty="0"/>
-              <a:t>Future Work</a:t>
-            </a:r>
-            <a:br>
+              <a:t>Feature Importance</a:t>
+            </a:r>
+          </a:p>
+        </p:txBody>
+      </p:sp>
+      <p:sp>
+        <p:nvSpPr>
+          <p:cNvPr id="3" name="Text Placeholder 2">
+            <a:extLst>
+              <a:ext uri="{FF2B5EF4-FFF2-40B4-BE49-F238E27FC236}">
+                <a16:creationId xmlns:a16="http://schemas.microsoft.com/office/drawing/2014/main" id="{F626F197-5A4C-8B5E-4E50-1A9DE91C51B3}"/>
+              </a:ext>
+            </a:extLst>
+          </p:cNvPr>
+          <p:cNvSpPr>
+            <a:spLocks noGrp="1"/>
+          </p:cNvSpPr>
+          <p:nvPr>
+            <p:ph type="body" idx="1"/>
+          </p:nvPr>
+        </p:nvSpPr>
+        <p:spPr>
+          <a:xfrm>
+            <a:off x="415600" y="1536633"/>
+            <a:ext cx="3910215" cy="4555200"/>
+          </a:xfrm>
+        </p:spPr>
+        <p:txBody>
+          <a:bodyPr/>
+          <a:lstStyle/>
+          <a:p>
+            <a:pPr marL="152396" indent="0">
+              <a:buNone/>
+            </a:pPr>
+            <a:r>
               <a:rPr lang="en-US" dirty="0"/>
-            </a:br>
-            <a:endParaRPr lang="en-US" dirty="0"/>
-          </a:p>
-        </p:txBody>
-      </p:sp>
-      <p:sp>
-        <p:nvSpPr>
-          <p:cNvPr id="3" name="Text Placeholder 2">
-            <a:extLst>
-              <a:ext uri="{FF2B5EF4-FFF2-40B4-BE49-F238E27FC236}">
-                <a16:creationId xmlns:a16="http://schemas.microsoft.com/office/drawing/2014/main" id="{3BE40F55-89A9-A94B-B94B-0B84ECD30482}"/>
-              </a:ext>
-            </a:extLst>
-          </p:cNvPr>
-          <p:cNvSpPr>
-            <a:spLocks noGrp="1"/>
-          </p:cNvSpPr>
-          <p:nvPr>
-            <p:ph type="body" idx="1"/>
-          </p:nvPr>
-        </p:nvSpPr>
-        <p:spPr/>
-        <p:txBody>
-          <a:bodyPr/>
-          <a:lstStyle/>
-          <a:p>
-            <a:endParaRPr lang="en-US"/>
-          </a:p>
-        </p:txBody>
-      </p:sp>
+              <a:t>Calculated by fitting </a:t>
+            </a:r>
+            <a:r>
+              <a:rPr lang="en-US" dirty="0" err="1"/>
+              <a:t>XGBoost</a:t>
+            </a:r>
+            <a:r>
+              <a:rPr lang="en-US" dirty="0"/>
+              <a:t> to cleaned data using </a:t>
+            </a:r>
+            <a:r>
+              <a:rPr lang="en-US" dirty="0" err="1"/>
+              <a:t>LeaveOneOut</a:t>
+            </a:r>
+            <a:r>
+              <a:rPr lang="en-US" dirty="0"/>
+              <a:t> encoding for categorical features.</a:t>
+            </a:r>
+          </a:p>
+        </p:txBody>
+      </p:sp>
+      <p:pic>
+        <p:nvPicPr>
+          <p:cNvPr id="1026" name="Picture 2">
+            <a:extLst>
+              <a:ext uri="{FF2B5EF4-FFF2-40B4-BE49-F238E27FC236}">
+                <a16:creationId xmlns:a16="http://schemas.microsoft.com/office/drawing/2014/main" id="{754CE3A1-1F2C-55AF-636A-ABE7C94BBBCE}"/>
+              </a:ext>
+            </a:extLst>
+          </p:cNvPr>
+          <p:cNvPicPr>
+            <a:picLocks noChangeAspect="1" noChangeArrowheads="1"/>
+          </p:cNvPicPr>
+          <p:nvPr/>
+        </p:nvPicPr>
+        <p:blipFill>
+          <a:blip r:embed="rId2">
+            <a:extLst>
+              <a:ext uri="{28A0092B-C50C-407E-A947-70E740481C1C}">
+                <a14:useLocalDpi xmlns:a14="http://schemas.microsoft.com/office/drawing/2010/main" val="0"/>
+              </a:ext>
+            </a:extLst>
+          </a:blip>
+          <a:srcRect/>
+          <a:stretch>
+            <a:fillRect/>
+          </a:stretch>
+        </p:blipFill>
+        <p:spPr bwMode="auto">
+          <a:xfrm>
+            <a:off x="4829908" y="593367"/>
+            <a:ext cx="6946492" cy="4883919"/>
+          </a:xfrm>
+          <a:prstGeom prst="rect">
+            <a:avLst/>
+          </a:prstGeom>
+          <a:noFill/>
+          <a:extLst>
+            <a:ext uri="{909E8E84-426E-40DD-AFC4-6F175D3DCCD1}">
+              <a14:hiddenFill xmlns:a14="http://schemas.microsoft.com/office/drawing/2010/main">
+                <a:solidFill>
+                  <a:srgbClr val="FFFFFF"/>
+                </a:solidFill>
+              </a14:hiddenFill>
+            </a:ext>
+          </a:extLst>
+        </p:spPr>
+      </p:pic>
     </p:spTree>
     <p:extLst>
       <p:ext uri="{BB962C8B-B14F-4D97-AF65-F5344CB8AC3E}">
-        <p14:creationId xmlns:p14="http://schemas.microsoft.com/office/powerpoint/2010/main" val="1175831093"/>
+        <p14:creationId xmlns:p14="http://schemas.microsoft.com/office/powerpoint/2010/main" val="287494984"/>
       </p:ext>
     </p:extLst>
   </p:cSld>
@@ -7227,6 +7457,350 @@
 </file>
 
 <file path=ppt/slides/slide20.xml><?xml version="1.0" encoding="utf-8"?>
+<p:sld xmlns:a="http://schemas.openxmlformats.org/drawingml/2006/main" xmlns:r="http://schemas.openxmlformats.org/officeDocument/2006/relationships" xmlns:p="http://schemas.openxmlformats.org/presentationml/2006/main">
+  <p:cSld>
+    <p:spTree>
+      <p:nvGrpSpPr>
+        <p:cNvPr id="1" name=""/>
+        <p:cNvGrpSpPr/>
+        <p:nvPr/>
+      </p:nvGrpSpPr>
+      <p:grpSpPr>
+        <a:xfrm>
+          <a:off x="0" y="0"/>
+          <a:ext cx="0" cy="0"/>
+          <a:chOff x="0" y="0"/>
+          <a:chExt cx="0" cy="0"/>
+        </a:xfrm>
+      </p:grpSpPr>
+      <p:sp>
+        <p:nvSpPr>
+          <p:cNvPr id="2" name="Title 1">
+            <a:extLst>
+              <a:ext uri="{FF2B5EF4-FFF2-40B4-BE49-F238E27FC236}">
+                <a16:creationId xmlns:a16="http://schemas.microsoft.com/office/drawing/2014/main" id="{FCA33D96-A37D-63AA-BFE9-8DC27819D038}"/>
+              </a:ext>
+            </a:extLst>
+          </p:cNvPr>
+          <p:cNvSpPr>
+            <a:spLocks noGrp="1"/>
+          </p:cNvSpPr>
+          <p:nvPr>
+            <p:ph type="title"/>
+          </p:nvPr>
+        </p:nvSpPr>
+        <p:spPr/>
+        <p:txBody>
+          <a:bodyPr>
+            <a:normAutofit fontScale="90000"/>
+          </a:bodyPr>
+          <a:lstStyle/>
+          <a:p>
+            <a:r>
+              <a:rPr lang="en-US" dirty="0"/>
+              <a:t>Regression Results - Baseline</a:t>
+            </a:r>
+          </a:p>
+        </p:txBody>
+      </p:sp>
+      <p:sp>
+        <p:nvSpPr>
+          <p:cNvPr id="3" name="Text Placeholder 2">
+            <a:extLst>
+              <a:ext uri="{FF2B5EF4-FFF2-40B4-BE49-F238E27FC236}">
+                <a16:creationId xmlns:a16="http://schemas.microsoft.com/office/drawing/2014/main" id="{58914A15-C88E-CDA4-05EE-1E2C42EC7EBC}"/>
+              </a:ext>
+            </a:extLst>
+          </p:cNvPr>
+          <p:cNvSpPr>
+            <a:spLocks noGrp="1"/>
+          </p:cNvSpPr>
+          <p:nvPr>
+            <p:ph type="body" idx="1"/>
+          </p:nvPr>
+        </p:nvSpPr>
+        <p:spPr/>
+        <p:txBody>
+          <a:bodyPr/>
+          <a:lstStyle/>
+          <a:p>
+            <a:endParaRPr lang="en-US"/>
+          </a:p>
+        </p:txBody>
+      </p:sp>
+    </p:spTree>
+    <p:extLst>
+      <p:ext uri="{BB962C8B-B14F-4D97-AF65-F5344CB8AC3E}">
+        <p14:creationId xmlns:p14="http://schemas.microsoft.com/office/powerpoint/2010/main" val="3365831599"/>
+      </p:ext>
+    </p:extLst>
+  </p:cSld>
+  <p:clrMapOvr>
+    <a:masterClrMapping/>
+  </p:clrMapOvr>
+</p:sld>
+</file>
+
+<file path=ppt/slides/slide21.xml><?xml version="1.0" encoding="utf-8"?>
+<p:sld xmlns:a="http://schemas.openxmlformats.org/drawingml/2006/main" xmlns:r="http://schemas.openxmlformats.org/officeDocument/2006/relationships" xmlns:p="http://schemas.openxmlformats.org/presentationml/2006/main">
+  <p:cSld>
+    <p:spTree>
+      <p:nvGrpSpPr>
+        <p:cNvPr id="1" name=""/>
+        <p:cNvGrpSpPr/>
+        <p:nvPr/>
+      </p:nvGrpSpPr>
+      <p:grpSpPr>
+        <a:xfrm>
+          <a:off x="0" y="0"/>
+          <a:ext cx="0" cy="0"/>
+          <a:chOff x="0" y="0"/>
+          <a:chExt cx="0" cy="0"/>
+        </a:xfrm>
+      </p:grpSpPr>
+      <p:sp>
+        <p:nvSpPr>
+          <p:cNvPr id="2" name="Title 1">
+            <a:extLst>
+              <a:ext uri="{FF2B5EF4-FFF2-40B4-BE49-F238E27FC236}">
+                <a16:creationId xmlns:a16="http://schemas.microsoft.com/office/drawing/2014/main" id="{3C7CFFCB-83A7-A1F1-8F79-8D223F6D20E7}"/>
+              </a:ext>
+            </a:extLst>
+          </p:cNvPr>
+          <p:cNvSpPr>
+            <a:spLocks noGrp="1"/>
+          </p:cNvSpPr>
+          <p:nvPr>
+            <p:ph type="title"/>
+          </p:nvPr>
+        </p:nvSpPr>
+        <p:spPr/>
+        <p:txBody>
+          <a:bodyPr>
+            <a:normAutofit fontScale="90000"/>
+          </a:bodyPr>
+          <a:lstStyle/>
+          <a:p>
+            <a:r>
+              <a:rPr lang="en-US" dirty="0"/>
+              <a:t>Regression Results – Tuned</a:t>
+            </a:r>
+          </a:p>
+        </p:txBody>
+      </p:sp>
+      <p:sp>
+        <p:nvSpPr>
+          <p:cNvPr id="3" name="Text Placeholder 2">
+            <a:extLst>
+              <a:ext uri="{FF2B5EF4-FFF2-40B4-BE49-F238E27FC236}">
+                <a16:creationId xmlns:a16="http://schemas.microsoft.com/office/drawing/2014/main" id="{BCA4F485-A9FF-6AF8-B831-B84E9803A03D}"/>
+              </a:ext>
+            </a:extLst>
+          </p:cNvPr>
+          <p:cNvSpPr>
+            <a:spLocks noGrp="1"/>
+          </p:cNvSpPr>
+          <p:nvPr>
+            <p:ph type="body" idx="1"/>
+          </p:nvPr>
+        </p:nvSpPr>
+        <p:spPr/>
+        <p:txBody>
+          <a:bodyPr/>
+          <a:lstStyle/>
+          <a:p>
+            <a:endParaRPr lang="en-US"/>
+          </a:p>
+        </p:txBody>
+      </p:sp>
+    </p:spTree>
+    <p:extLst>
+      <p:ext uri="{BB962C8B-B14F-4D97-AF65-F5344CB8AC3E}">
+        <p14:creationId xmlns:p14="http://schemas.microsoft.com/office/powerpoint/2010/main" val="3665169667"/>
+      </p:ext>
+    </p:extLst>
+  </p:cSld>
+  <p:clrMapOvr>
+    <a:masterClrMapping/>
+  </p:clrMapOvr>
+</p:sld>
+</file>
+
+<file path=ppt/slides/slide22.xml><?xml version="1.0" encoding="utf-8"?>
+<p:sld xmlns:a="http://schemas.openxmlformats.org/drawingml/2006/main" xmlns:r="http://schemas.openxmlformats.org/officeDocument/2006/relationships" xmlns:p="http://schemas.openxmlformats.org/presentationml/2006/main">
+  <p:cSld>
+    <p:spTree>
+      <p:nvGrpSpPr>
+        <p:cNvPr id="1" name=""/>
+        <p:cNvGrpSpPr/>
+        <p:nvPr/>
+      </p:nvGrpSpPr>
+      <p:grpSpPr>
+        <a:xfrm>
+          <a:off x="0" y="0"/>
+          <a:ext cx="0" cy="0"/>
+          <a:chOff x="0" y="0"/>
+          <a:chExt cx="0" cy="0"/>
+        </a:xfrm>
+      </p:grpSpPr>
+      <p:sp>
+        <p:nvSpPr>
+          <p:cNvPr id="2" name="Title 1">
+            <a:extLst>
+              <a:ext uri="{FF2B5EF4-FFF2-40B4-BE49-F238E27FC236}">
+                <a16:creationId xmlns:a16="http://schemas.microsoft.com/office/drawing/2014/main" id="{AEBC7FCA-308D-A31D-9598-DA5221AAF52C}"/>
+              </a:ext>
+            </a:extLst>
+          </p:cNvPr>
+          <p:cNvSpPr>
+            <a:spLocks noGrp="1"/>
+          </p:cNvSpPr>
+          <p:nvPr>
+            <p:ph type="title"/>
+          </p:nvPr>
+        </p:nvSpPr>
+        <p:spPr/>
+        <p:txBody>
+          <a:bodyPr>
+            <a:normAutofit fontScale="90000"/>
+          </a:bodyPr>
+          <a:lstStyle/>
+          <a:p>
+            <a:r>
+              <a:rPr lang="en-US" dirty="0"/>
+              <a:t>Summary</a:t>
+            </a:r>
+          </a:p>
+        </p:txBody>
+      </p:sp>
+      <p:sp>
+        <p:nvSpPr>
+          <p:cNvPr id="3" name="Text Placeholder 2">
+            <a:extLst>
+              <a:ext uri="{FF2B5EF4-FFF2-40B4-BE49-F238E27FC236}">
+                <a16:creationId xmlns:a16="http://schemas.microsoft.com/office/drawing/2014/main" id="{113FD658-CDD5-73DA-A1C2-FE8D03D723D0}"/>
+              </a:ext>
+            </a:extLst>
+          </p:cNvPr>
+          <p:cNvSpPr>
+            <a:spLocks noGrp="1"/>
+          </p:cNvSpPr>
+          <p:nvPr>
+            <p:ph type="body" idx="1"/>
+          </p:nvPr>
+        </p:nvSpPr>
+        <p:spPr/>
+        <p:txBody>
+          <a:bodyPr/>
+          <a:lstStyle/>
+          <a:p>
+            <a:endParaRPr lang="en-US"/>
+          </a:p>
+        </p:txBody>
+      </p:sp>
+    </p:spTree>
+    <p:extLst>
+      <p:ext uri="{BB962C8B-B14F-4D97-AF65-F5344CB8AC3E}">
+        <p14:creationId xmlns:p14="http://schemas.microsoft.com/office/powerpoint/2010/main" val="2573754190"/>
+      </p:ext>
+    </p:extLst>
+  </p:cSld>
+  <p:clrMapOvr>
+    <a:masterClrMapping/>
+  </p:clrMapOvr>
+</p:sld>
+</file>
+
+<file path=ppt/slides/slide23.xml><?xml version="1.0" encoding="utf-8"?>
+<p:sld xmlns:a="http://schemas.openxmlformats.org/drawingml/2006/main" xmlns:r="http://schemas.openxmlformats.org/officeDocument/2006/relationships" xmlns:p="http://schemas.openxmlformats.org/presentationml/2006/main">
+  <p:cSld>
+    <p:spTree>
+      <p:nvGrpSpPr>
+        <p:cNvPr id="1" name=""/>
+        <p:cNvGrpSpPr/>
+        <p:nvPr/>
+      </p:nvGrpSpPr>
+      <p:grpSpPr>
+        <a:xfrm>
+          <a:off x="0" y="0"/>
+          <a:ext cx="0" cy="0"/>
+          <a:chOff x="0" y="0"/>
+          <a:chExt cx="0" cy="0"/>
+        </a:xfrm>
+      </p:grpSpPr>
+      <p:sp>
+        <p:nvSpPr>
+          <p:cNvPr id="2" name="Title 1">
+            <a:extLst>
+              <a:ext uri="{FF2B5EF4-FFF2-40B4-BE49-F238E27FC236}">
+                <a16:creationId xmlns:a16="http://schemas.microsoft.com/office/drawing/2014/main" id="{1D0A476F-72B7-4C4E-0D29-8A9CD99767B6}"/>
+              </a:ext>
+            </a:extLst>
+          </p:cNvPr>
+          <p:cNvSpPr>
+            <a:spLocks noGrp="1"/>
+          </p:cNvSpPr>
+          <p:nvPr>
+            <p:ph type="title"/>
+          </p:nvPr>
+        </p:nvSpPr>
+        <p:spPr/>
+        <p:txBody>
+          <a:bodyPr>
+            <a:normAutofit fontScale="90000"/>
+          </a:bodyPr>
+          <a:lstStyle/>
+          <a:p>
+            <a:r>
+              <a:rPr lang="en-US" dirty="0"/>
+              <a:t>Future Work</a:t>
+            </a:r>
+            <a:br>
+              <a:rPr lang="en-US" dirty="0"/>
+            </a:br>
+            <a:endParaRPr lang="en-US" dirty="0"/>
+          </a:p>
+        </p:txBody>
+      </p:sp>
+      <p:sp>
+        <p:nvSpPr>
+          <p:cNvPr id="3" name="Text Placeholder 2">
+            <a:extLst>
+              <a:ext uri="{FF2B5EF4-FFF2-40B4-BE49-F238E27FC236}">
+                <a16:creationId xmlns:a16="http://schemas.microsoft.com/office/drawing/2014/main" id="{3BE40F55-89A9-A94B-B94B-0B84ECD30482}"/>
+              </a:ext>
+            </a:extLst>
+          </p:cNvPr>
+          <p:cNvSpPr>
+            <a:spLocks noGrp="1"/>
+          </p:cNvSpPr>
+          <p:nvPr>
+            <p:ph type="body" idx="1"/>
+          </p:nvPr>
+        </p:nvSpPr>
+        <p:spPr/>
+        <p:txBody>
+          <a:bodyPr/>
+          <a:lstStyle/>
+          <a:p>
+            <a:endParaRPr lang="en-US"/>
+          </a:p>
+        </p:txBody>
+      </p:sp>
+    </p:spTree>
+    <p:extLst>
+      <p:ext uri="{BB962C8B-B14F-4D97-AF65-F5344CB8AC3E}">
+        <p14:creationId xmlns:p14="http://schemas.microsoft.com/office/powerpoint/2010/main" val="1175831093"/>
+      </p:ext>
+    </p:extLst>
+  </p:cSld>
+  <p:clrMapOvr>
+    <a:masterClrMapping/>
+  </p:clrMapOvr>
+</p:sld>
+</file>
+
+<file path=ppt/slides/slide24.xml><?xml version="1.0" encoding="utf-8"?>
 <p:sld xmlns:a="http://schemas.openxmlformats.org/drawingml/2006/main" xmlns:r="http://schemas.openxmlformats.org/officeDocument/2006/relationships" xmlns:p="http://schemas.openxmlformats.org/presentationml/2006/main">
   <p:cSld>
     <p:spTree>

</xml_diff>

<commit_message>
Sampled working well, with training error plot
</commit_message>
<xml_diff>
--- a/DSCI521_rna63_final_project_pres.pptx
+++ b/DSCI521_rna63_final_project_pres.pptx
@@ -5,33 +5,36 @@
     <p:sldMasterId id="2147483648" r:id="rId1"/>
   </p:sldMasterIdLst>
   <p:notesMasterIdLst>
-    <p:notesMasterId r:id="rId26"/>
+    <p:notesMasterId r:id="rId29"/>
   </p:notesMasterIdLst>
   <p:sldIdLst>
     <p:sldId id="257" r:id="rId2"/>
     <p:sldId id="258" r:id="rId3"/>
-    <p:sldId id="259" r:id="rId4"/>
-    <p:sldId id="263" r:id="rId5"/>
-    <p:sldId id="270" r:id="rId6"/>
-    <p:sldId id="271" r:id="rId7"/>
-    <p:sldId id="266" r:id="rId8"/>
-    <p:sldId id="268" r:id="rId9"/>
-    <p:sldId id="272" r:id="rId10"/>
-    <p:sldId id="275" r:id="rId11"/>
-    <p:sldId id="273" r:id="rId12"/>
-    <p:sldId id="276" r:id="rId13"/>
-    <p:sldId id="279" r:id="rId14"/>
-    <p:sldId id="280" r:id="rId15"/>
-    <p:sldId id="281" r:id="rId16"/>
-    <p:sldId id="267" r:id="rId17"/>
-    <p:sldId id="269" r:id="rId18"/>
-    <p:sldId id="264" r:id="rId19"/>
-    <p:sldId id="277" r:id="rId20"/>
-    <p:sldId id="265" r:id="rId21"/>
-    <p:sldId id="278" r:id="rId22"/>
-    <p:sldId id="260" r:id="rId23"/>
-    <p:sldId id="261" r:id="rId24"/>
-    <p:sldId id="262" r:id="rId25"/>
+    <p:sldId id="284" r:id="rId4"/>
+    <p:sldId id="259" r:id="rId5"/>
+    <p:sldId id="263" r:id="rId6"/>
+    <p:sldId id="270" r:id="rId7"/>
+    <p:sldId id="271" r:id="rId8"/>
+    <p:sldId id="266" r:id="rId9"/>
+    <p:sldId id="268" r:id="rId10"/>
+    <p:sldId id="272" r:id="rId11"/>
+    <p:sldId id="275" r:id="rId12"/>
+    <p:sldId id="273" r:id="rId13"/>
+    <p:sldId id="276" r:id="rId14"/>
+    <p:sldId id="279" r:id="rId15"/>
+    <p:sldId id="280" r:id="rId16"/>
+    <p:sldId id="281" r:id="rId17"/>
+    <p:sldId id="267" r:id="rId18"/>
+    <p:sldId id="282" r:id="rId19"/>
+    <p:sldId id="283" r:id="rId20"/>
+    <p:sldId id="269" r:id="rId21"/>
+    <p:sldId id="264" r:id="rId22"/>
+    <p:sldId id="277" r:id="rId23"/>
+    <p:sldId id="265" r:id="rId24"/>
+    <p:sldId id="278" r:id="rId25"/>
+    <p:sldId id="260" r:id="rId26"/>
+    <p:sldId id="261" r:id="rId27"/>
+    <p:sldId id="262" r:id="rId28"/>
   </p:sldIdLst>
   <p:sldSz cx="12192000" cy="6858000"/>
   <p:notesSz cx="6858000" cy="9144000"/>
@@ -700,10 +703,10 @@
               <a:buNone/>
             </a:pPr>
             <a:r>
-              <a:rPr lang="en"/>
+              <a:rPr lang="en" dirty="0"/>
               <a:t>Intro</a:t>
             </a:r>
-            <a:endParaRPr/>
+            <a:endParaRPr dirty="0"/>
           </a:p>
           <a:p>
             <a:pPr marL="0" lvl="0" indent="0" algn="l" rtl="0">
@@ -715,7 +718,7 @@
               </a:spcAft>
               <a:buNone/>
             </a:pPr>
-            <a:endParaRPr/>
+            <a:endParaRPr dirty="0"/>
           </a:p>
           <a:p>
             <a:pPr marL="0" lvl="0" indent="0" algn="l" rtl="0">
@@ -728,10 +731,10 @@
               <a:buNone/>
             </a:pPr>
             <a:r>
-              <a:rPr lang="en"/>
+              <a:rPr lang="en" dirty="0"/>
               <a:t>Final project</a:t>
             </a:r>
-            <a:endParaRPr/>
+            <a:endParaRPr dirty="0"/>
           </a:p>
           <a:p>
             <a:pPr marL="0" lvl="0" indent="0" algn="l" rtl="0">
@@ -743,7 +746,7 @@
               </a:spcAft>
               <a:buNone/>
             </a:pPr>
-            <a:endParaRPr/>
+            <a:endParaRPr dirty="0"/>
           </a:p>
           <a:p>
             <a:pPr marL="0" lvl="0" indent="0" algn="l" rtl="0">
@@ -756,10 +759,10 @@
               <a:buNone/>
             </a:pPr>
             <a:r>
-              <a:rPr lang="en"/>
+              <a:rPr lang="en" dirty="0"/>
               <a:t>For CS 613 Machine learning</a:t>
             </a:r>
-            <a:endParaRPr/>
+            <a:endParaRPr dirty="0"/>
           </a:p>
           <a:p>
             <a:pPr marL="0" lvl="0" indent="0" algn="l" rtl="0">
@@ -771,7 +774,7 @@
               </a:spcAft>
               <a:buNone/>
             </a:pPr>
-            <a:endParaRPr/>
+            <a:endParaRPr dirty="0"/>
           </a:p>
           <a:p>
             <a:pPr marL="0" lvl="0" indent="0" algn="l" rtl="0">
@@ -783,11 +786,105 @@
               </a:spcAft>
               <a:buNone/>
             </a:pPr>
-            <a:endParaRPr/>
+            <a:endParaRPr dirty="0"/>
           </a:p>
         </p:txBody>
       </p:sp>
     </p:spTree>
+  </p:cSld>
+  <p:clrMapOvr>
+    <a:masterClrMapping/>
+  </p:clrMapOvr>
+</p:notes>
+</file>
+
+<file path=ppt/notesSlides/notesSlide3.xml><?xml version="1.0" encoding="utf-8"?>
+<p:notes xmlns:a="http://schemas.openxmlformats.org/drawingml/2006/main" xmlns:r="http://schemas.openxmlformats.org/officeDocument/2006/relationships" xmlns:p="http://schemas.openxmlformats.org/presentationml/2006/main">
+  <p:cSld>
+    <p:spTree>
+      <p:nvGrpSpPr>
+        <p:cNvPr id="1" name=""/>
+        <p:cNvGrpSpPr/>
+        <p:nvPr/>
+      </p:nvGrpSpPr>
+      <p:grpSpPr>
+        <a:xfrm>
+          <a:off x="0" y="0"/>
+          <a:ext cx="0" cy="0"/>
+          <a:chOff x="0" y="0"/>
+          <a:chExt cx="0" cy="0"/>
+        </a:xfrm>
+      </p:grpSpPr>
+      <p:sp>
+        <p:nvSpPr>
+          <p:cNvPr id="2" name="Slide Image Placeholder 1"/>
+          <p:cNvSpPr>
+            <a:spLocks noGrp="1" noRot="1" noChangeAspect="1"/>
+          </p:cNvSpPr>
+          <p:nvPr>
+            <p:ph type="sldImg"/>
+          </p:nvPr>
+        </p:nvSpPr>
+        <p:spPr/>
+      </p:sp>
+      <p:sp>
+        <p:nvSpPr>
+          <p:cNvPr id="3" name="Notes Placeholder 2"/>
+          <p:cNvSpPr>
+            <a:spLocks noGrp="1"/>
+          </p:cNvSpPr>
+          <p:nvPr>
+            <p:ph type="body" idx="1"/>
+          </p:nvPr>
+        </p:nvSpPr>
+        <p:spPr/>
+        <p:txBody>
+          <a:bodyPr/>
+          <a:lstStyle/>
+          <a:p>
+            <a:r>
+              <a:rPr lang="en-US" b="0" i="0" dirty="0">
+                <a:solidFill>
+                  <a:srgbClr val="262626"/>
+                </a:solidFill>
+                <a:effectLst/>
+                <a:latin typeface="Source Code Pro" panose="020B0509030403020204" pitchFamily="49" charset="0"/>
+              </a:rPr>
+              <a:t> During COVID-19 supply problems, used car prices increased significantly when new car availability decreased which caused some of my curiosity in this area.</a:t>
+            </a:r>
+            <a:endParaRPr lang="en-US" dirty="0"/>
+          </a:p>
+        </p:txBody>
+      </p:sp>
+      <p:sp>
+        <p:nvSpPr>
+          <p:cNvPr id="4" name="Slide Number Placeholder 3"/>
+          <p:cNvSpPr>
+            <a:spLocks noGrp="1"/>
+          </p:cNvSpPr>
+          <p:nvPr>
+            <p:ph type="sldNum" sz="quarter" idx="5"/>
+          </p:nvPr>
+        </p:nvSpPr>
+        <p:spPr/>
+        <p:txBody>
+          <a:bodyPr/>
+          <a:lstStyle/>
+          <a:p>
+            <a:fld id="{801F8ACE-8AB6-C746-898D-0B2E8626E4DD}" type="slidenum">
+              <a:rPr lang="en-US" smtClean="0"/>
+              <a:t>3</a:t>
+            </a:fld>
+            <a:endParaRPr lang="en-US"/>
+          </a:p>
+        </p:txBody>
+      </p:sp>
+    </p:spTree>
+    <p:extLst>
+      <p:ext uri="{BB962C8B-B14F-4D97-AF65-F5344CB8AC3E}">
+        <p14:creationId xmlns:p14="http://schemas.microsoft.com/office/powerpoint/2010/main" val="1387967105"/>
+      </p:ext>
+    </p:extLst>
   </p:cSld>
   <p:clrMapOvr>
     <a:masterClrMapping/>
@@ -5718,6 +5815,96 @@
           <p:cNvPr id="2" name="Title 1">
             <a:extLst>
               <a:ext uri="{FF2B5EF4-FFF2-40B4-BE49-F238E27FC236}">
+                <a16:creationId xmlns:a16="http://schemas.microsoft.com/office/drawing/2014/main" id="{1BC3F0F3-1C8B-09F1-60C1-ED4A763FA1B0}"/>
+              </a:ext>
+            </a:extLst>
+          </p:cNvPr>
+          <p:cNvSpPr>
+            <a:spLocks noGrp="1"/>
+          </p:cNvSpPr>
+          <p:nvPr>
+            <p:ph type="title"/>
+          </p:nvPr>
+        </p:nvSpPr>
+        <p:spPr/>
+        <p:txBody>
+          <a:bodyPr>
+            <a:normAutofit fontScale="90000"/>
+          </a:bodyPr>
+          <a:lstStyle/>
+          <a:p>
+            <a:r>
+              <a:rPr lang="en-US" dirty="0"/>
+              <a:t>Numeric Features - Histogram</a:t>
+            </a:r>
+          </a:p>
+        </p:txBody>
+      </p:sp>
+      <p:pic>
+        <p:nvPicPr>
+          <p:cNvPr id="4" name="Picture 3">
+            <a:extLst>
+              <a:ext uri="{FF2B5EF4-FFF2-40B4-BE49-F238E27FC236}">
+                <a16:creationId xmlns:a16="http://schemas.microsoft.com/office/drawing/2014/main" id="{42CCF90B-CBA7-3C6E-FC4C-6982532AE875}"/>
+              </a:ext>
+            </a:extLst>
+          </p:cNvPr>
+          <p:cNvPicPr>
+            <a:picLocks noChangeAspect="1"/>
+          </p:cNvPicPr>
+          <p:nvPr/>
+        </p:nvPicPr>
+        <p:blipFill>
+          <a:blip r:embed="rId2"/>
+          <a:stretch>
+            <a:fillRect/>
+          </a:stretch>
+        </p:blipFill>
+        <p:spPr>
+          <a:xfrm>
+            <a:off x="2209800" y="1296437"/>
+            <a:ext cx="7772400" cy="4265126"/>
+          </a:xfrm>
+          <a:prstGeom prst="rect">
+            <a:avLst/>
+          </a:prstGeom>
+        </p:spPr>
+      </p:pic>
+    </p:spTree>
+    <p:extLst>
+      <p:ext uri="{BB962C8B-B14F-4D97-AF65-F5344CB8AC3E}">
+        <p14:creationId xmlns:p14="http://schemas.microsoft.com/office/powerpoint/2010/main" val="1306705530"/>
+      </p:ext>
+    </p:extLst>
+  </p:cSld>
+  <p:clrMapOvr>
+    <a:masterClrMapping/>
+  </p:clrMapOvr>
+</p:sld>
+</file>
+
+<file path=ppt/slides/slide11.xml><?xml version="1.0" encoding="utf-8"?>
+<p:sld xmlns:a="http://schemas.openxmlformats.org/drawingml/2006/main" xmlns:r="http://schemas.openxmlformats.org/officeDocument/2006/relationships" xmlns:p="http://schemas.openxmlformats.org/presentationml/2006/main">
+  <p:cSld>
+    <p:spTree>
+      <p:nvGrpSpPr>
+        <p:cNvPr id="1" name=""/>
+        <p:cNvGrpSpPr/>
+        <p:nvPr/>
+      </p:nvGrpSpPr>
+      <p:grpSpPr>
+        <a:xfrm>
+          <a:off x="0" y="0"/>
+          <a:ext cx="0" cy="0"/>
+          <a:chOff x="0" y="0"/>
+          <a:chExt cx="0" cy="0"/>
+        </a:xfrm>
+      </p:grpSpPr>
+      <p:sp>
+        <p:nvSpPr>
+          <p:cNvPr id="2" name="Title 1">
+            <a:extLst>
+              <a:ext uri="{FF2B5EF4-FFF2-40B4-BE49-F238E27FC236}">
                 <a16:creationId xmlns:a16="http://schemas.microsoft.com/office/drawing/2014/main" id="{64F2098D-9113-1E22-512B-982EC5848802}"/>
               </a:ext>
             </a:extLst>
@@ -5888,7 +6075,7 @@
 </p:sld>
 </file>
 
-<file path=ppt/slides/slide11.xml><?xml version="1.0" encoding="utf-8"?>
+<file path=ppt/slides/slide12.xml><?xml version="1.0" encoding="utf-8"?>
 <p:sld xmlns:a="http://schemas.openxmlformats.org/drawingml/2006/main" xmlns:r="http://schemas.openxmlformats.org/officeDocument/2006/relationships" xmlns:p="http://schemas.openxmlformats.org/presentationml/2006/main">
   <p:cSld>
     <p:spTree>
@@ -5978,7 +6165,7 @@
 </p:sld>
 </file>
 
-<file path=ppt/slides/slide12.xml><?xml version="1.0" encoding="utf-8"?>
+<file path=ppt/slides/slide13.xml><?xml version="1.0" encoding="utf-8"?>
 <p:sld xmlns:a="http://schemas.openxmlformats.org/drawingml/2006/main" xmlns:r="http://schemas.openxmlformats.org/officeDocument/2006/relationships" xmlns:p="http://schemas.openxmlformats.org/presentationml/2006/main">
   <p:cSld>
     <p:spTree>
@@ -6068,7 +6255,7 @@
 </p:sld>
 </file>
 
-<file path=ppt/slides/slide13.xml><?xml version="1.0" encoding="utf-8"?>
+<file path=ppt/slides/slide14.xml><?xml version="1.0" encoding="utf-8"?>
 <p:sld xmlns:a="http://schemas.openxmlformats.org/drawingml/2006/main" xmlns:r="http://schemas.openxmlformats.org/officeDocument/2006/relationships" xmlns:p="http://schemas.openxmlformats.org/presentationml/2006/main">
   <p:cSld>
     <p:spTree>
@@ -6188,7 +6375,7 @@
 </p:sld>
 </file>
 
-<file path=ppt/slides/slide14.xml><?xml version="1.0" encoding="utf-8"?>
+<file path=ppt/slides/slide15.xml><?xml version="1.0" encoding="utf-8"?>
 <p:sld xmlns:a="http://schemas.openxmlformats.org/drawingml/2006/main" xmlns:r="http://schemas.openxmlformats.org/officeDocument/2006/relationships" xmlns:p="http://schemas.openxmlformats.org/presentationml/2006/main">
   <p:cSld>
     <p:spTree>
@@ -6278,7 +6465,7 @@
 </p:sld>
 </file>
 
-<file path=ppt/slides/slide15.xml><?xml version="1.0" encoding="utf-8"?>
+<file path=ppt/slides/slide16.xml><?xml version="1.0" encoding="utf-8"?>
 <p:sld xmlns:a="http://schemas.openxmlformats.org/drawingml/2006/main" xmlns:r="http://schemas.openxmlformats.org/officeDocument/2006/relationships" xmlns:p="http://schemas.openxmlformats.org/presentationml/2006/main">
   <p:cSld>
     <p:spTree>
@@ -6368,7 +6555,7 @@
 </p:sld>
 </file>
 
-<file path=ppt/slides/slide16.xml><?xml version="1.0" encoding="utf-8"?>
+<file path=ppt/slides/slide17.xml><?xml version="1.0" encoding="utf-8"?>
 <p:sld xmlns:a="http://schemas.openxmlformats.org/drawingml/2006/main" xmlns:r="http://schemas.openxmlformats.org/officeDocument/2006/relationships" xmlns:p="http://schemas.openxmlformats.org/presentationml/2006/main">
   <p:cSld>
     <p:spTree>
@@ -6778,94 +6965,6 @@
 </p:sld>
 </file>
 
-<file path=ppt/slides/slide17.xml><?xml version="1.0" encoding="utf-8"?>
-<p:sld xmlns:a="http://schemas.openxmlformats.org/drawingml/2006/main" xmlns:r="http://schemas.openxmlformats.org/officeDocument/2006/relationships" xmlns:p="http://schemas.openxmlformats.org/presentationml/2006/main">
-  <p:cSld>
-    <p:spTree>
-      <p:nvGrpSpPr>
-        <p:cNvPr id="1" name=""/>
-        <p:cNvGrpSpPr/>
-        <p:nvPr/>
-      </p:nvGrpSpPr>
-      <p:grpSpPr>
-        <a:xfrm>
-          <a:off x="0" y="0"/>
-          <a:ext cx="0" cy="0"/>
-          <a:chOff x="0" y="0"/>
-          <a:chExt cx="0" cy="0"/>
-        </a:xfrm>
-      </p:grpSpPr>
-      <p:sp>
-        <p:nvSpPr>
-          <p:cNvPr id="2" name="Title 1">
-            <a:extLst>
-              <a:ext uri="{FF2B5EF4-FFF2-40B4-BE49-F238E27FC236}">
-                <a16:creationId xmlns:a16="http://schemas.microsoft.com/office/drawing/2014/main" id="{15778324-782C-DA70-60DA-7500BFD7E639}"/>
-              </a:ext>
-            </a:extLst>
-          </p:cNvPr>
-          <p:cNvSpPr>
-            <a:spLocks noGrp="1"/>
-          </p:cNvSpPr>
-          <p:nvPr>
-            <p:ph type="title"/>
-          </p:nvPr>
-        </p:nvSpPr>
-        <p:spPr/>
-        <p:txBody>
-          <a:bodyPr>
-            <a:normAutofit fontScale="90000"/>
-          </a:bodyPr>
-          <a:lstStyle/>
-          <a:p>
-            <a:r>
-              <a:rPr lang="en-US" dirty="0"/>
-              <a:t>Regression Models</a:t>
-            </a:r>
-          </a:p>
-        </p:txBody>
-      </p:sp>
-      <p:sp>
-        <p:nvSpPr>
-          <p:cNvPr id="3" name="Text Placeholder 2">
-            <a:extLst>
-              <a:ext uri="{FF2B5EF4-FFF2-40B4-BE49-F238E27FC236}">
-                <a16:creationId xmlns:a16="http://schemas.microsoft.com/office/drawing/2014/main" id="{DE0E9E0A-63C8-A068-D9E9-42BE104B4D5A}"/>
-              </a:ext>
-            </a:extLst>
-          </p:cNvPr>
-          <p:cNvSpPr>
-            <a:spLocks noGrp="1"/>
-          </p:cNvSpPr>
-          <p:nvPr>
-            <p:ph type="body" idx="1"/>
-          </p:nvPr>
-        </p:nvSpPr>
-        <p:spPr/>
-        <p:txBody>
-          <a:bodyPr/>
-          <a:lstStyle/>
-          <a:p>
-            <a:r>
-              <a:rPr lang="en-US" dirty="0"/>
-              <a:t>TODO:</a:t>
-            </a:r>
-          </a:p>
-        </p:txBody>
-      </p:sp>
-    </p:spTree>
-    <p:extLst>
-      <p:ext uri="{BB962C8B-B14F-4D97-AF65-F5344CB8AC3E}">
-        <p14:creationId xmlns:p14="http://schemas.microsoft.com/office/powerpoint/2010/main" val="179389556"/>
-      </p:ext>
-    </p:extLst>
-  </p:cSld>
-  <p:clrMapOvr>
-    <a:masterClrMapping/>
-  </p:clrMapOvr>
-</p:sld>
-</file>
-
 <file path=ppt/slides/slide18.xml><?xml version="1.0" encoding="utf-8"?>
 <p:sld xmlns:a="http://schemas.openxmlformats.org/drawingml/2006/main" xmlns:r="http://schemas.openxmlformats.org/officeDocument/2006/relationships" xmlns:p="http://schemas.openxmlformats.org/presentationml/2006/main">
   <p:cSld>
@@ -6888,6 +6987,646 @@
           <p:cNvPr id="2" name="Title 1">
             <a:extLst>
               <a:ext uri="{FF2B5EF4-FFF2-40B4-BE49-F238E27FC236}">
+                <a16:creationId xmlns:a16="http://schemas.microsoft.com/office/drawing/2014/main" id="{2B9B12B5-B493-AF70-3520-A4DCFD1ECA4E}"/>
+              </a:ext>
+            </a:extLst>
+          </p:cNvPr>
+          <p:cNvSpPr>
+            <a:spLocks noGrp="1"/>
+          </p:cNvSpPr>
+          <p:nvPr>
+            <p:ph type="title"/>
+          </p:nvPr>
+        </p:nvSpPr>
+        <p:spPr/>
+        <p:txBody>
+          <a:bodyPr>
+            <a:normAutofit fontScale="90000"/>
+          </a:bodyPr>
+          <a:lstStyle/>
+          <a:p>
+            <a:r>
+              <a:rPr lang="en-US" dirty="0"/>
+              <a:t>Pair Plots</a:t>
+            </a:r>
+          </a:p>
+        </p:txBody>
+      </p:sp>
+      <p:pic>
+        <p:nvPicPr>
+          <p:cNvPr id="4" name="Picture 3">
+            <a:extLst>
+              <a:ext uri="{FF2B5EF4-FFF2-40B4-BE49-F238E27FC236}">
+                <a16:creationId xmlns:a16="http://schemas.microsoft.com/office/drawing/2014/main" id="{9F894DEE-59B4-E637-90C1-7476745E262E}"/>
+              </a:ext>
+            </a:extLst>
+          </p:cNvPr>
+          <p:cNvPicPr>
+            <a:picLocks noChangeAspect="1"/>
+          </p:cNvPicPr>
+          <p:nvPr/>
+        </p:nvPicPr>
+        <p:blipFill>
+          <a:blip r:embed="rId2"/>
+          <a:stretch>
+            <a:fillRect/>
+          </a:stretch>
+        </p:blipFill>
+        <p:spPr>
+          <a:xfrm>
+            <a:off x="3147647" y="298938"/>
+            <a:ext cx="6559062" cy="6559062"/>
+          </a:xfrm>
+          <a:prstGeom prst="rect">
+            <a:avLst/>
+          </a:prstGeom>
+        </p:spPr>
+      </p:pic>
+      <p:sp>
+        <p:nvSpPr>
+          <p:cNvPr id="5" name="TextBox 4">
+            <a:extLst>
+              <a:ext uri="{FF2B5EF4-FFF2-40B4-BE49-F238E27FC236}">
+                <a16:creationId xmlns:a16="http://schemas.microsoft.com/office/drawing/2014/main" id="{A815AC26-ED8A-286D-305D-B07728E76514}"/>
+              </a:ext>
+            </a:extLst>
+          </p:cNvPr>
+          <p:cNvSpPr txBox="1"/>
+          <p:nvPr/>
+        </p:nvSpPr>
+        <p:spPr>
+          <a:xfrm>
+            <a:off x="415600" y="1840523"/>
+            <a:ext cx="2421385" cy="923330"/>
+          </a:xfrm>
+          <a:prstGeom prst="rect">
+            <a:avLst/>
+          </a:prstGeom>
+          <a:noFill/>
+        </p:spPr>
+        <p:txBody>
+          <a:bodyPr wrap="square" rtlCol="0">
+            <a:spAutoFit/>
+          </a:bodyPr>
+          <a:lstStyle/>
+          <a:p>
+            <a:r>
+              <a:rPr lang="en-US" dirty="0"/>
+              <a:t>On cleaned numerical features of sampled dataset.</a:t>
+            </a:r>
+          </a:p>
+        </p:txBody>
+      </p:sp>
+    </p:spTree>
+    <p:extLst>
+      <p:ext uri="{BB962C8B-B14F-4D97-AF65-F5344CB8AC3E}">
+        <p14:creationId xmlns:p14="http://schemas.microsoft.com/office/powerpoint/2010/main" val="2535550334"/>
+      </p:ext>
+    </p:extLst>
+  </p:cSld>
+  <p:clrMapOvr>
+    <a:masterClrMapping/>
+  </p:clrMapOvr>
+</p:sld>
+</file>
+
+<file path=ppt/slides/slide19.xml><?xml version="1.0" encoding="utf-8"?>
+<p:sld xmlns:a="http://schemas.openxmlformats.org/drawingml/2006/main" xmlns:r="http://schemas.openxmlformats.org/officeDocument/2006/relationships" xmlns:p="http://schemas.openxmlformats.org/presentationml/2006/main">
+  <p:cSld>
+    <p:spTree>
+      <p:nvGrpSpPr>
+        <p:cNvPr id="1" name=""/>
+        <p:cNvGrpSpPr/>
+        <p:nvPr/>
+      </p:nvGrpSpPr>
+      <p:grpSpPr>
+        <a:xfrm>
+          <a:off x="0" y="0"/>
+          <a:ext cx="0" cy="0"/>
+          <a:chOff x="0" y="0"/>
+          <a:chExt cx="0" cy="0"/>
+        </a:xfrm>
+      </p:grpSpPr>
+      <p:sp>
+        <p:nvSpPr>
+          <p:cNvPr id="2" name="Title 1">
+            <a:extLst>
+              <a:ext uri="{FF2B5EF4-FFF2-40B4-BE49-F238E27FC236}">
+                <a16:creationId xmlns:a16="http://schemas.microsoft.com/office/drawing/2014/main" id="{65C47D52-A47D-DCD0-7E77-0E221B86552B}"/>
+              </a:ext>
+            </a:extLst>
+          </p:cNvPr>
+          <p:cNvSpPr>
+            <a:spLocks noGrp="1"/>
+          </p:cNvSpPr>
+          <p:nvPr>
+            <p:ph type="title"/>
+          </p:nvPr>
+        </p:nvSpPr>
+        <p:spPr>
+          <a:xfrm>
+            <a:off x="415600" y="593367"/>
+            <a:ext cx="2866443" cy="1447704"/>
+          </a:xfrm>
+        </p:spPr>
+        <p:txBody>
+          <a:bodyPr>
+            <a:normAutofit/>
+          </a:bodyPr>
+          <a:lstStyle/>
+          <a:p>
+            <a:r>
+              <a:rPr lang="en-US" dirty="0"/>
+              <a:t>Correlation</a:t>
+            </a:r>
+            <a:br>
+              <a:rPr lang="en-US" dirty="0"/>
+            </a:br>
+            <a:r>
+              <a:rPr lang="en-US" dirty="0"/>
+              <a:t>Matrix</a:t>
+            </a:r>
+          </a:p>
+        </p:txBody>
+      </p:sp>
+      <p:pic>
+        <p:nvPicPr>
+          <p:cNvPr id="4" name="Picture 3">
+            <a:extLst>
+              <a:ext uri="{FF2B5EF4-FFF2-40B4-BE49-F238E27FC236}">
+                <a16:creationId xmlns:a16="http://schemas.microsoft.com/office/drawing/2014/main" id="{94BBC513-37F4-F37F-DC7F-7A59A4DEA489}"/>
+              </a:ext>
+            </a:extLst>
+          </p:cNvPr>
+          <p:cNvPicPr>
+            <a:picLocks noChangeAspect="1"/>
+          </p:cNvPicPr>
+          <p:nvPr/>
+        </p:nvPicPr>
+        <p:blipFill>
+          <a:blip r:embed="rId2"/>
+          <a:stretch>
+            <a:fillRect/>
+          </a:stretch>
+        </p:blipFill>
+        <p:spPr>
+          <a:xfrm>
+            <a:off x="486997" y="2319215"/>
+            <a:ext cx="3009900" cy="3860800"/>
+          </a:xfrm>
+          <a:prstGeom prst="rect">
+            <a:avLst/>
+          </a:prstGeom>
+        </p:spPr>
+      </p:pic>
+      <p:pic>
+        <p:nvPicPr>
+          <p:cNvPr id="6" name="Picture 5">
+            <a:extLst>
+              <a:ext uri="{FF2B5EF4-FFF2-40B4-BE49-F238E27FC236}">
+                <a16:creationId xmlns:a16="http://schemas.microsoft.com/office/drawing/2014/main" id="{8F410A91-3981-849B-AE35-DEBA7BFC4AE9}"/>
+              </a:ext>
+            </a:extLst>
+          </p:cNvPr>
+          <p:cNvPicPr>
+            <a:picLocks noChangeAspect="1"/>
+          </p:cNvPicPr>
+          <p:nvPr/>
+        </p:nvPicPr>
+        <p:blipFill>
+          <a:blip r:embed="rId3"/>
+          <a:stretch>
+            <a:fillRect/>
+          </a:stretch>
+        </p:blipFill>
+        <p:spPr>
+          <a:xfrm>
+            <a:off x="3496897" y="677985"/>
+            <a:ext cx="7772400" cy="5829300"/>
+          </a:xfrm>
+          <a:prstGeom prst="rect">
+            <a:avLst/>
+          </a:prstGeom>
+        </p:spPr>
+      </p:pic>
+    </p:spTree>
+    <p:extLst>
+      <p:ext uri="{BB962C8B-B14F-4D97-AF65-F5344CB8AC3E}">
+        <p14:creationId xmlns:p14="http://schemas.microsoft.com/office/powerpoint/2010/main" val="2936929200"/>
+      </p:ext>
+    </p:extLst>
+  </p:cSld>
+  <p:clrMapOvr>
+    <a:masterClrMapping/>
+  </p:clrMapOvr>
+</p:sld>
+</file>
+
+<file path=ppt/slides/slide2.xml><?xml version="1.0" encoding="utf-8"?>
+<p:sld xmlns:a="http://schemas.openxmlformats.org/drawingml/2006/main" xmlns:r="http://schemas.openxmlformats.org/officeDocument/2006/relationships" xmlns:p="http://schemas.openxmlformats.org/presentationml/2006/main">
+  <p:cSld>
+    <p:spTree>
+      <p:nvGrpSpPr>
+        <p:cNvPr id="1" name="Shape 70"/>
+        <p:cNvGrpSpPr/>
+        <p:nvPr/>
+      </p:nvGrpSpPr>
+      <p:grpSpPr>
+        <a:xfrm>
+          <a:off x="0" y="0"/>
+          <a:ext cx="0" cy="0"/>
+          <a:chOff x="0" y="0"/>
+          <a:chExt cx="0" cy="0"/>
+        </a:xfrm>
+      </p:grpSpPr>
+      <p:sp>
+        <p:nvSpPr>
+          <p:cNvPr id="71" name="Google Shape;71;p15"/>
+          <p:cNvSpPr txBox="1">
+            <a:spLocks noGrp="1"/>
+          </p:cNvSpPr>
+          <p:nvPr>
+            <p:ph type="title"/>
+          </p:nvPr>
+        </p:nvSpPr>
+        <p:spPr>
+          <a:xfrm>
+            <a:off x="415600" y="593367"/>
+            <a:ext cx="11360800" cy="763600"/>
+          </a:xfrm>
+          <a:prstGeom prst="rect">
+            <a:avLst/>
+          </a:prstGeom>
+        </p:spPr>
+        <p:txBody>
+          <a:bodyPr spcFirstLastPara="1" vert="horz" wrap="square" lIns="121900" tIns="121900" rIns="121900" bIns="121900" rtlCol="0" anchor="t" anchorCtr="0">
+            <a:normAutofit fontScale="90000"/>
+          </a:bodyPr>
+          <a:lstStyle/>
+          <a:p>
+            <a:r>
+              <a:rPr lang="en" dirty="0"/>
+              <a:t>Group 8 - Team</a:t>
+            </a:r>
+            <a:endParaRPr dirty="0"/>
+          </a:p>
+        </p:txBody>
+      </p:sp>
+      <p:sp>
+        <p:nvSpPr>
+          <p:cNvPr id="72" name="Google Shape;72;p15"/>
+          <p:cNvSpPr txBox="1">
+            <a:spLocks noGrp="1"/>
+          </p:cNvSpPr>
+          <p:nvPr>
+            <p:ph type="body" idx="1"/>
+          </p:nvPr>
+        </p:nvSpPr>
+        <p:spPr>
+          <a:xfrm>
+            <a:off x="415600" y="1405953"/>
+            <a:ext cx="3578000" cy="2743201"/>
+          </a:xfrm>
+          <a:prstGeom prst="rect">
+            <a:avLst/>
+          </a:prstGeom>
+        </p:spPr>
+        <p:txBody>
+          <a:bodyPr spcFirstLastPara="1" vert="horz" wrap="square" lIns="121900" tIns="121900" rIns="121900" bIns="121900" rtlCol="0" anchor="t" anchorCtr="0">
+            <a:normAutofit lnSpcReduction="10000"/>
+          </a:bodyPr>
+          <a:lstStyle/>
+          <a:p>
+            <a:pPr marL="0" indent="0">
+              <a:buNone/>
+            </a:pPr>
+            <a:r>
+              <a:rPr lang="en" dirty="0"/>
+              <a:t> Richard Anton </a:t>
+            </a:r>
+            <a:endParaRPr dirty="0"/>
+          </a:p>
+          <a:p>
+            <a:pPr marL="152396" indent="0">
+              <a:spcBef>
+                <a:spcPts val="1600"/>
+              </a:spcBef>
+              <a:buNone/>
+            </a:pPr>
+            <a:r>
+              <a:rPr lang="en" u="sng" dirty="0">
+                <a:solidFill>
+                  <a:schemeClr val="hlink"/>
+                </a:solidFill>
+                <a:hlinkClick r:id="rId3"/>
+              </a:rPr>
+              <a:t>rna63@drexel.edu</a:t>
+            </a:r>
+            <a:endParaRPr dirty="0"/>
+          </a:p>
+          <a:p>
+            <a:pPr marL="152396" indent="0">
+              <a:buNone/>
+            </a:pPr>
+            <a:endParaRPr lang="en-US" dirty="0"/>
+          </a:p>
+          <a:p>
+            <a:pPr marL="152396" indent="0">
+              <a:buNone/>
+            </a:pPr>
+            <a:r>
+              <a:rPr lang="en-US" dirty="0"/>
+              <a:t>MS CS student</a:t>
+            </a:r>
+          </a:p>
+          <a:p>
+            <a:pPr marL="152396" indent="0">
+              <a:buNone/>
+            </a:pPr>
+            <a:r>
+              <a:rPr lang="en-US" dirty="0"/>
+              <a:t>(will complete at end of Spring ’23)</a:t>
+            </a:r>
+            <a:endParaRPr dirty="0"/>
+          </a:p>
+          <a:p>
+            <a:pPr indent="0">
+              <a:spcBef>
+                <a:spcPts val="1600"/>
+              </a:spcBef>
+              <a:spcAft>
+                <a:spcPts val="1600"/>
+              </a:spcAft>
+              <a:buNone/>
+            </a:pPr>
+            <a:endParaRPr dirty="0"/>
+          </a:p>
+        </p:txBody>
+      </p:sp>
+      <p:pic>
+        <p:nvPicPr>
+          <p:cNvPr id="73" name="Google Shape;73;p15" title="slide2.mp3">
+            <a:hlinkClick r:id="rId4"/>
+          </p:cNvPr>
+          <p:cNvPicPr preferRelativeResize="0"/>
+          <p:nvPr/>
+        </p:nvPicPr>
+        <p:blipFill>
+          <a:blip r:embed="rId5">
+            <a:alphaModFix/>
+          </a:blip>
+          <a:stretch>
+            <a:fillRect/>
+          </a:stretch>
+        </p:blipFill>
+        <p:spPr>
+          <a:xfrm>
+            <a:off x="1" y="6498234"/>
+            <a:ext cx="359767" cy="359767"/>
+          </a:xfrm>
+          <a:prstGeom prst="rect">
+            <a:avLst/>
+          </a:prstGeom>
+          <a:noFill/>
+          <a:ln>
+            <a:noFill/>
+          </a:ln>
+        </p:spPr>
+      </p:pic>
+      <p:sp>
+        <p:nvSpPr>
+          <p:cNvPr id="74" name="Google Shape;74;p15"/>
+          <p:cNvSpPr txBox="1"/>
+          <p:nvPr/>
+        </p:nvSpPr>
+        <p:spPr>
+          <a:xfrm>
+            <a:off x="4411689" y="593367"/>
+            <a:ext cx="7211200" cy="5047495"/>
+          </a:xfrm>
+          <a:prstGeom prst="rect">
+            <a:avLst/>
+          </a:prstGeom>
+          <a:noFill/>
+          <a:ln>
+            <a:noFill/>
+          </a:ln>
+        </p:spPr>
+        <p:txBody>
+          <a:bodyPr spcFirstLastPara="1" wrap="square" lIns="121900" tIns="121900" rIns="121900" bIns="121900" anchor="t" anchorCtr="0">
+            <a:spAutoFit/>
+          </a:bodyPr>
+          <a:lstStyle/>
+          <a:p>
+            <a:pPr marL="342900" indent="-342900" algn="just">
+              <a:buFont typeface="Arial" panose="020B0604020202020204" pitchFamily="34" charset="0"/>
+              <a:buChar char="•"/>
+            </a:pPr>
+            <a:r>
+              <a:rPr lang="en-US" sz="2400" dirty="0"/>
+              <a:t>Full time software developer, part time student.  </a:t>
+            </a:r>
+          </a:p>
+          <a:p>
+            <a:pPr marL="342900" indent="-342900" algn="just">
+              <a:buFont typeface="Arial" panose="020B0604020202020204" pitchFamily="34" charset="0"/>
+              <a:buChar char="•"/>
+            </a:pPr>
+            <a:r>
+              <a:rPr lang="en-US" sz="2400" dirty="0"/>
+              <a:t>Proficient in Python and a number of other programming languages.</a:t>
+            </a:r>
+          </a:p>
+          <a:p>
+            <a:pPr marL="342900" indent="-342900" algn="just">
+              <a:buFont typeface="Arial" panose="020B0604020202020204" pitchFamily="34" charset="0"/>
+              <a:buChar char="•"/>
+            </a:pPr>
+            <a:r>
+              <a:rPr lang="en-US" sz="2400" dirty="0"/>
+              <a:t>In Seattle area, work and time-zone makes group project collaboration challenging.</a:t>
+            </a:r>
+          </a:p>
+          <a:p>
+            <a:pPr marL="342900" indent="-342900" algn="just">
+              <a:buFont typeface="Arial" panose="020B0604020202020204" pitchFamily="34" charset="0"/>
+              <a:buChar char="•"/>
+            </a:pPr>
+            <a:r>
+              <a:rPr lang="en-US" sz="2400" dirty="0"/>
+              <a:t>Completed ML, AI, deep learning, and computer vision courses at Drexel.</a:t>
+            </a:r>
+          </a:p>
+          <a:p>
+            <a:pPr marL="342900" indent="-342900" algn="just">
+              <a:buFont typeface="Arial" panose="020B0604020202020204" pitchFamily="34" charset="0"/>
+              <a:buChar char="•"/>
+            </a:pPr>
+            <a:r>
+              <a:rPr lang="en-US" sz="2400" dirty="0"/>
+              <a:t>Minimal prior experience with exploratory data analysis and data cleaning or preparation.</a:t>
+            </a:r>
+          </a:p>
+          <a:p>
+            <a:pPr marL="342900" indent="-342900" algn="just">
+              <a:buFont typeface="Arial" panose="020B0604020202020204" pitchFamily="34" charset="0"/>
+              <a:buChar char="•"/>
+            </a:pPr>
+            <a:r>
+              <a:rPr lang="en-US" sz="2400" dirty="0"/>
+              <a:t>Not much experience with tools and libraries like Pandas and Scikit-learn; prior courses usually required implementing algorithms “from scratch”, i.e. just using NumPy.</a:t>
+            </a:r>
+          </a:p>
+        </p:txBody>
+      </p:sp>
+      <p:pic>
+        <p:nvPicPr>
+          <p:cNvPr id="2" name="Picture 1">
+            <a:extLst>
+              <a:ext uri="{FF2B5EF4-FFF2-40B4-BE49-F238E27FC236}">
+                <a16:creationId xmlns:a16="http://schemas.microsoft.com/office/drawing/2014/main" id="{927D9057-8FBE-CA0E-8CEF-4FD47F58C4BF}"/>
+              </a:ext>
+            </a:extLst>
+          </p:cNvPr>
+          <p:cNvPicPr>
+            <a:picLocks noChangeAspect="1"/>
+          </p:cNvPicPr>
+          <p:nvPr/>
+        </p:nvPicPr>
+        <p:blipFill>
+          <a:blip r:embed="rId6"/>
+          <a:stretch>
+            <a:fillRect/>
+          </a:stretch>
+        </p:blipFill>
+        <p:spPr>
+          <a:xfrm>
+            <a:off x="644769" y="3906132"/>
+            <a:ext cx="1768876" cy="2358501"/>
+          </a:xfrm>
+          <a:prstGeom prst="rect">
+            <a:avLst/>
+          </a:prstGeom>
+        </p:spPr>
+      </p:pic>
+    </p:spTree>
+  </p:cSld>
+  <p:clrMapOvr>
+    <a:masterClrMapping/>
+  </p:clrMapOvr>
+</p:sld>
+</file>
+
+<file path=ppt/slides/slide20.xml><?xml version="1.0" encoding="utf-8"?>
+<p:sld xmlns:a="http://schemas.openxmlformats.org/drawingml/2006/main" xmlns:r="http://schemas.openxmlformats.org/officeDocument/2006/relationships" xmlns:p="http://schemas.openxmlformats.org/presentationml/2006/main">
+  <p:cSld>
+    <p:spTree>
+      <p:nvGrpSpPr>
+        <p:cNvPr id="1" name=""/>
+        <p:cNvGrpSpPr/>
+        <p:nvPr/>
+      </p:nvGrpSpPr>
+      <p:grpSpPr>
+        <a:xfrm>
+          <a:off x="0" y="0"/>
+          <a:ext cx="0" cy="0"/>
+          <a:chOff x="0" y="0"/>
+          <a:chExt cx="0" cy="0"/>
+        </a:xfrm>
+      </p:grpSpPr>
+      <p:sp>
+        <p:nvSpPr>
+          <p:cNvPr id="2" name="Title 1">
+            <a:extLst>
+              <a:ext uri="{FF2B5EF4-FFF2-40B4-BE49-F238E27FC236}">
+                <a16:creationId xmlns:a16="http://schemas.microsoft.com/office/drawing/2014/main" id="{15778324-782C-DA70-60DA-7500BFD7E639}"/>
+              </a:ext>
+            </a:extLst>
+          </p:cNvPr>
+          <p:cNvSpPr>
+            <a:spLocks noGrp="1"/>
+          </p:cNvSpPr>
+          <p:nvPr>
+            <p:ph type="title"/>
+          </p:nvPr>
+        </p:nvSpPr>
+        <p:spPr/>
+        <p:txBody>
+          <a:bodyPr>
+            <a:normAutofit fontScale="90000"/>
+          </a:bodyPr>
+          <a:lstStyle/>
+          <a:p>
+            <a:r>
+              <a:rPr lang="en-US" dirty="0"/>
+              <a:t>Regression Models</a:t>
+            </a:r>
+          </a:p>
+        </p:txBody>
+      </p:sp>
+      <p:sp>
+        <p:nvSpPr>
+          <p:cNvPr id="3" name="Text Placeholder 2">
+            <a:extLst>
+              <a:ext uri="{FF2B5EF4-FFF2-40B4-BE49-F238E27FC236}">
+                <a16:creationId xmlns:a16="http://schemas.microsoft.com/office/drawing/2014/main" id="{DE0E9E0A-63C8-A068-D9E9-42BE104B4D5A}"/>
+              </a:ext>
+            </a:extLst>
+          </p:cNvPr>
+          <p:cNvSpPr>
+            <a:spLocks noGrp="1"/>
+          </p:cNvSpPr>
+          <p:nvPr>
+            <p:ph type="body" idx="1"/>
+          </p:nvPr>
+        </p:nvSpPr>
+        <p:spPr/>
+        <p:txBody>
+          <a:bodyPr/>
+          <a:lstStyle/>
+          <a:p>
+            <a:r>
+              <a:rPr lang="en-US" dirty="0"/>
+              <a:t>TODO:</a:t>
+            </a:r>
+          </a:p>
+        </p:txBody>
+      </p:sp>
+    </p:spTree>
+    <p:extLst>
+      <p:ext uri="{BB962C8B-B14F-4D97-AF65-F5344CB8AC3E}">
+        <p14:creationId xmlns:p14="http://schemas.microsoft.com/office/powerpoint/2010/main" val="179389556"/>
+      </p:ext>
+    </p:extLst>
+  </p:cSld>
+  <p:clrMapOvr>
+    <a:masterClrMapping/>
+  </p:clrMapOvr>
+</p:sld>
+</file>
+
+<file path=ppt/slides/slide21.xml><?xml version="1.0" encoding="utf-8"?>
+<p:sld xmlns:a="http://schemas.openxmlformats.org/drawingml/2006/main" xmlns:r="http://schemas.openxmlformats.org/officeDocument/2006/relationships" xmlns:p="http://schemas.openxmlformats.org/presentationml/2006/main">
+  <p:cSld>
+    <p:spTree>
+      <p:nvGrpSpPr>
+        <p:cNvPr id="1" name=""/>
+        <p:cNvGrpSpPr/>
+        <p:nvPr/>
+      </p:nvGrpSpPr>
+      <p:grpSpPr>
+        <a:xfrm>
+          <a:off x="0" y="0"/>
+          <a:ext cx="0" cy="0"/>
+          <a:chOff x="0" y="0"/>
+          <a:chExt cx="0" cy="0"/>
+        </a:xfrm>
+      </p:grpSpPr>
+      <p:sp>
+        <p:nvSpPr>
+          <p:cNvPr id="2" name="Title 1">
+            <a:extLst>
+              <a:ext uri="{FF2B5EF4-FFF2-40B4-BE49-F238E27FC236}">
                 <a16:creationId xmlns:a16="http://schemas.microsoft.com/office/drawing/2014/main" id="{1F0C52C0-01B3-F221-D5FC-9C4EDC0CD303}"/>
               </a:ext>
             </a:extLst>
@@ -7015,7 +7754,7 @@
 </p:sld>
 </file>
 
-<file path=ppt/slides/slide19.xml><?xml version="1.0" encoding="utf-8"?>
+<file path=ppt/slides/slide22.xml><?xml version="1.0" encoding="utf-8"?>
 <p:sld xmlns:a="http://schemas.openxmlformats.org/drawingml/2006/main" xmlns:r="http://schemas.openxmlformats.org/officeDocument/2006/relationships" xmlns:p="http://schemas.openxmlformats.org/presentationml/2006/main">
   <p:cSld>
     <p:spTree>
@@ -7174,543 +7913,6 @@
 </p:sld>
 </file>
 
-<file path=ppt/slides/slide2.xml><?xml version="1.0" encoding="utf-8"?>
-<p:sld xmlns:a="http://schemas.openxmlformats.org/drawingml/2006/main" xmlns:r="http://schemas.openxmlformats.org/officeDocument/2006/relationships" xmlns:p="http://schemas.openxmlformats.org/presentationml/2006/main">
-  <p:cSld>
-    <p:spTree>
-      <p:nvGrpSpPr>
-        <p:cNvPr id="1" name="Shape 70"/>
-        <p:cNvGrpSpPr/>
-        <p:nvPr/>
-      </p:nvGrpSpPr>
-      <p:grpSpPr>
-        <a:xfrm>
-          <a:off x="0" y="0"/>
-          <a:ext cx="0" cy="0"/>
-          <a:chOff x="0" y="0"/>
-          <a:chExt cx="0" cy="0"/>
-        </a:xfrm>
-      </p:grpSpPr>
-      <p:sp>
-        <p:nvSpPr>
-          <p:cNvPr id="71" name="Google Shape;71;p15"/>
-          <p:cNvSpPr txBox="1">
-            <a:spLocks noGrp="1"/>
-          </p:cNvSpPr>
-          <p:nvPr>
-            <p:ph type="title"/>
-          </p:nvPr>
-        </p:nvSpPr>
-        <p:spPr>
-          <a:xfrm>
-            <a:off x="415600" y="593367"/>
-            <a:ext cx="11360800" cy="763600"/>
-          </a:xfrm>
-          <a:prstGeom prst="rect">
-            <a:avLst/>
-          </a:prstGeom>
-        </p:spPr>
-        <p:txBody>
-          <a:bodyPr spcFirstLastPara="1" vert="horz" wrap="square" lIns="121900" tIns="121900" rIns="121900" bIns="121900" rtlCol="0" anchor="t" anchorCtr="0">
-            <a:normAutofit fontScale="90000"/>
-          </a:bodyPr>
-          <a:lstStyle/>
-          <a:p>
-            <a:r>
-              <a:rPr lang="en" dirty="0"/>
-              <a:t>Group 8 - Team</a:t>
-            </a:r>
-            <a:endParaRPr dirty="0"/>
-          </a:p>
-        </p:txBody>
-      </p:sp>
-      <p:sp>
-        <p:nvSpPr>
-          <p:cNvPr id="72" name="Google Shape;72;p15"/>
-          <p:cNvSpPr txBox="1">
-            <a:spLocks noGrp="1"/>
-          </p:cNvSpPr>
-          <p:nvPr>
-            <p:ph type="body" idx="1"/>
-          </p:nvPr>
-        </p:nvSpPr>
-        <p:spPr>
-          <a:xfrm>
-            <a:off x="415600" y="1536633"/>
-            <a:ext cx="3578000" cy="2783200"/>
-          </a:xfrm>
-          <a:prstGeom prst="rect">
-            <a:avLst/>
-          </a:prstGeom>
-        </p:spPr>
-        <p:txBody>
-          <a:bodyPr spcFirstLastPara="1" vert="horz" wrap="square" lIns="121900" tIns="121900" rIns="121900" bIns="121900" rtlCol="0" anchor="t" anchorCtr="0">
-            <a:normAutofit/>
-          </a:bodyPr>
-          <a:lstStyle/>
-          <a:p>
-            <a:pPr marL="0" indent="0">
-              <a:buNone/>
-            </a:pPr>
-            <a:r>
-              <a:rPr lang="en" dirty="0"/>
-              <a:t>Richard Anton </a:t>
-            </a:r>
-            <a:endParaRPr dirty="0"/>
-          </a:p>
-          <a:p>
-            <a:pPr>
-              <a:spcBef>
-                <a:spcPts val="1600"/>
-              </a:spcBef>
-            </a:pPr>
-            <a:r>
-              <a:rPr lang="en" u="sng" dirty="0">
-                <a:solidFill>
-                  <a:schemeClr val="hlink"/>
-                </a:solidFill>
-                <a:hlinkClick r:id="rId3"/>
-              </a:rPr>
-              <a:t>rna63@drexel.edu</a:t>
-            </a:r>
-            <a:endParaRPr dirty="0"/>
-          </a:p>
-          <a:p>
-            <a:r>
-              <a:rPr lang="en-US" dirty="0"/>
-              <a:t>MSCS student</a:t>
-            </a:r>
-          </a:p>
-          <a:p>
-            <a:r>
-              <a:rPr lang="en-US" dirty="0"/>
-              <a:t>(will complete at end of Spring ’23)</a:t>
-            </a:r>
-            <a:endParaRPr dirty="0"/>
-          </a:p>
-          <a:p>
-            <a:pPr indent="0">
-              <a:spcBef>
-                <a:spcPts val="1600"/>
-              </a:spcBef>
-              <a:spcAft>
-                <a:spcPts val="1600"/>
-              </a:spcAft>
-              <a:buNone/>
-            </a:pPr>
-            <a:endParaRPr dirty="0"/>
-          </a:p>
-        </p:txBody>
-      </p:sp>
-      <p:pic>
-        <p:nvPicPr>
-          <p:cNvPr id="73" name="Google Shape;73;p15" title="slide2.mp3">
-            <a:hlinkClick r:id="rId4"/>
-          </p:cNvPr>
-          <p:cNvPicPr preferRelativeResize="0"/>
-          <p:nvPr/>
-        </p:nvPicPr>
-        <p:blipFill>
-          <a:blip r:embed="rId5">
-            <a:alphaModFix/>
-          </a:blip>
-          <a:stretch>
-            <a:fillRect/>
-          </a:stretch>
-        </p:blipFill>
-        <p:spPr>
-          <a:xfrm>
-            <a:off x="1" y="6498234"/>
-            <a:ext cx="359767" cy="359767"/>
-          </a:xfrm>
-          <a:prstGeom prst="rect">
-            <a:avLst/>
-          </a:prstGeom>
-          <a:noFill/>
-          <a:ln>
-            <a:noFill/>
-          </a:ln>
-        </p:spPr>
-      </p:pic>
-      <p:sp>
-        <p:nvSpPr>
-          <p:cNvPr id="74" name="Google Shape;74;p15"/>
-          <p:cNvSpPr txBox="1"/>
-          <p:nvPr/>
-        </p:nvSpPr>
-        <p:spPr>
-          <a:xfrm>
-            <a:off x="4411689" y="593367"/>
-            <a:ext cx="7211200" cy="5047495"/>
-          </a:xfrm>
-          <a:prstGeom prst="rect">
-            <a:avLst/>
-          </a:prstGeom>
-          <a:noFill/>
-          <a:ln>
-            <a:noFill/>
-          </a:ln>
-        </p:spPr>
-        <p:txBody>
-          <a:bodyPr spcFirstLastPara="1" wrap="square" lIns="121900" tIns="121900" rIns="121900" bIns="121900" anchor="t" anchorCtr="0">
-            <a:spAutoFit/>
-          </a:bodyPr>
-          <a:lstStyle/>
-          <a:p>
-            <a:pPr marL="342900" indent="-342900" algn="just">
-              <a:buFont typeface="Arial" panose="020B0604020202020204" pitchFamily="34" charset="0"/>
-              <a:buChar char="•"/>
-            </a:pPr>
-            <a:r>
-              <a:rPr lang="en-US" sz="2400" dirty="0"/>
-              <a:t>Full time software developer, part time student.  </a:t>
-            </a:r>
-          </a:p>
-          <a:p>
-            <a:pPr marL="342900" indent="-342900" algn="just">
-              <a:buFont typeface="Arial" panose="020B0604020202020204" pitchFamily="34" charset="0"/>
-              <a:buChar char="•"/>
-            </a:pPr>
-            <a:r>
-              <a:rPr lang="en-US" sz="2400" dirty="0"/>
-              <a:t>Proficient in Python and a number of other programming languages.</a:t>
-            </a:r>
-          </a:p>
-          <a:p>
-            <a:pPr marL="342900" indent="-342900" algn="just">
-              <a:buFont typeface="Arial" panose="020B0604020202020204" pitchFamily="34" charset="0"/>
-              <a:buChar char="•"/>
-            </a:pPr>
-            <a:r>
-              <a:rPr lang="en-US" sz="2400" dirty="0"/>
-              <a:t>In Seattle area, work and time-zone makes group project collaboration challenging.</a:t>
-            </a:r>
-          </a:p>
-          <a:p>
-            <a:pPr marL="342900" indent="-342900" algn="just">
-              <a:buFont typeface="Arial" panose="020B0604020202020204" pitchFamily="34" charset="0"/>
-              <a:buChar char="•"/>
-            </a:pPr>
-            <a:r>
-              <a:rPr lang="en-US" sz="2400" dirty="0"/>
-              <a:t>Completed ML, AI, deep learning, and computer vision courses at Drexel.</a:t>
-            </a:r>
-          </a:p>
-          <a:p>
-            <a:pPr marL="342900" indent="-342900" algn="just">
-              <a:buFont typeface="Arial" panose="020B0604020202020204" pitchFamily="34" charset="0"/>
-              <a:buChar char="•"/>
-            </a:pPr>
-            <a:r>
-              <a:rPr lang="en-US" sz="2400" dirty="0"/>
-              <a:t>Minimal prior experience with exploratory data analysis and data cleaning or preparation.</a:t>
-            </a:r>
-          </a:p>
-          <a:p>
-            <a:pPr marL="342900" indent="-342900" algn="just">
-              <a:buFont typeface="Arial" panose="020B0604020202020204" pitchFamily="34" charset="0"/>
-              <a:buChar char="•"/>
-            </a:pPr>
-            <a:r>
-              <a:rPr lang="en-US" sz="2400" dirty="0"/>
-              <a:t>Not much experience with tools and libraries like Pandas and Scikit-learn; prior courses usually required implementing algorithms “from scratch”, i.e. just using NumPy.</a:t>
-            </a:r>
-          </a:p>
-        </p:txBody>
-      </p:sp>
-      <p:pic>
-        <p:nvPicPr>
-          <p:cNvPr id="2" name="Picture 1">
-            <a:extLst>
-              <a:ext uri="{FF2B5EF4-FFF2-40B4-BE49-F238E27FC236}">
-                <a16:creationId xmlns:a16="http://schemas.microsoft.com/office/drawing/2014/main" id="{927D9057-8FBE-CA0E-8CEF-4FD47F58C4BF}"/>
-              </a:ext>
-            </a:extLst>
-          </p:cNvPr>
-          <p:cNvPicPr>
-            <a:picLocks noChangeAspect="1"/>
-          </p:cNvPicPr>
-          <p:nvPr/>
-        </p:nvPicPr>
-        <p:blipFill>
-          <a:blip r:embed="rId6"/>
-          <a:stretch>
-            <a:fillRect/>
-          </a:stretch>
-        </p:blipFill>
-        <p:spPr>
-          <a:xfrm>
-            <a:off x="415600" y="3906132"/>
-            <a:ext cx="1768876" cy="2358501"/>
-          </a:xfrm>
-          <a:prstGeom prst="rect">
-            <a:avLst/>
-          </a:prstGeom>
-        </p:spPr>
-      </p:pic>
-    </p:spTree>
-  </p:cSld>
-  <p:clrMapOvr>
-    <a:masterClrMapping/>
-  </p:clrMapOvr>
-</p:sld>
-</file>
-
-<file path=ppt/slides/slide20.xml><?xml version="1.0" encoding="utf-8"?>
-<p:sld xmlns:a="http://schemas.openxmlformats.org/drawingml/2006/main" xmlns:r="http://schemas.openxmlformats.org/officeDocument/2006/relationships" xmlns:p="http://schemas.openxmlformats.org/presentationml/2006/main">
-  <p:cSld>
-    <p:spTree>
-      <p:nvGrpSpPr>
-        <p:cNvPr id="1" name=""/>
-        <p:cNvGrpSpPr/>
-        <p:nvPr/>
-      </p:nvGrpSpPr>
-      <p:grpSpPr>
-        <a:xfrm>
-          <a:off x="0" y="0"/>
-          <a:ext cx="0" cy="0"/>
-          <a:chOff x="0" y="0"/>
-          <a:chExt cx="0" cy="0"/>
-        </a:xfrm>
-      </p:grpSpPr>
-      <p:sp>
-        <p:nvSpPr>
-          <p:cNvPr id="2" name="Title 1">
-            <a:extLst>
-              <a:ext uri="{FF2B5EF4-FFF2-40B4-BE49-F238E27FC236}">
-                <a16:creationId xmlns:a16="http://schemas.microsoft.com/office/drawing/2014/main" id="{FCA33D96-A37D-63AA-BFE9-8DC27819D038}"/>
-              </a:ext>
-            </a:extLst>
-          </p:cNvPr>
-          <p:cNvSpPr>
-            <a:spLocks noGrp="1"/>
-          </p:cNvSpPr>
-          <p:nvPr>
-            <p:ph type="title"/>
-          </p:nvPr>
-        </p:nvSpPr>
-        <p:spPr/>
-        <p:txBody>
-          <a:bodyPr>
-            <a:normAutofit fontScale="90000"/>
-          </a:bodyPr>
-          <a:lstStyle/>
-          <a:p>
-            <a:r>
-              <a:rPr lang="en-US" dirty="0"/>
-              <a:t>Regression Results - Baseline</a:t>
-            </a:r>
-          </a:p>
-        </p:txBody>
-      </p:sp>
-      <p:sp>
-        <p:nvSpPr>
-          <p:cNvPr id="3" name="Text Placeholder 2">
-            <a:extLst>
-              <a:ext uri="{FF2B5EF4-FFF2-40B4-BE49-F238E27FC236}">
-                <a16:creationId xmlns:a16="http://schemas.microsoft.com/office/drawing/2014/main" id="{58914A15-C88E-CDA4-05EE-1E2C42EC7EBC}"/>
-              </a:ext>
-            </a:extLst>
-          </p:cNvPr>
-          <p:cNvSpPr>
-            <a:spLocks noGrp="1"/>
-          </p:cNvSpPr>
-          <p:nvPr>
-            <p:ph type="body" idx="1"/>
-          </p:nvPr>
-        </p:nvSpPr>
-        <p:spPr/>
-        <p:txBody>
-          <a:bodyPr/>
-          <a:lstStyle/>
-          <a:p>
-            <a:endParaRPr lang="en-US"/>
-          </a:p>
-        </p:txBody>
-      </p:sp>
-    </p:spTree>
-    <p:extLst>
-      <p:ext uri="{BB962C8B-B14F-4D97-AF65-F5344CB8AC3E}">
-        <p14:creationId xmlns:p14="http://schemas.microsoft.com/office/powerpoint/2010/main" val="3365831599"/>
-      </p:ext>
-    </p:extLst>
-  </p:cSld>
-  <p:clrMapOvr>
-    <a:masterClrMapping/>
-  </p:clrMapOvr>
-</p:sld>
-</file>
-
-<file path=ppt/slides/slide21.xml><?xml version="1.0" encoding="utf-8"?>
-<p:sld xmlns:a="http://schemas.openxmlformats.org/drawingml/2006/main" xmlns:r="http://schemas.openxmlformats.org/officeDocument/2006/relationships" xmlns:p="http://schemas.openxmlformats.org/presentationml/2006/main">
-  <p:cSld>
-    <p:spTree>
-      <p:nvGrpSpPr>
-        <p:cNvPr id="1" name=""/>
-        <p:cNvGrpSpPr/>
-        <p:nvPr/>
-      </p:nvGrpSpPr>
-      <p:grpSpPr>
-        <a:xfrm>
-          <a:off x="0" y="0"/>
-          <a:ext cx="0" cy="0"/>
-          <a:chOff x="0" y="0"/>
-          <a:chExt cx="0" cy="0"/>
-        </a:xfrm>
-      </p:grpSpPr>
-      <p:sp>
-        <p:nvSpPr>
-          <p:cNvPr id="2" name="Title 1">
-            <a:extLst>
-              <a:ext uri="{FF2B5EF4-FFF2-40B4-BE49-F238E27FC236}">
-                <a16:creationId xmlns:a16="http://schemas.microsoft.com/office/drawing/2014/main" id="{3C7CFFCB-83A7-A1F1-8F79-8D223F6D20E7}"/>
-              </a:ext>
-            </a:extLst>
-          </p:cNvPr>
-          <p:cNvSpPr>
-            <a:spLocks noGrp="1"/>
-          </p:cNvSpPr>
-          <p:nvPr>
-            <p:ph type="title"/>
-          </p:nvPr>
-        </p:nvSpPr>
-        <p:spPr/>
-        <p:txBody>
-          <a:bodyPr>
-            <a:normAutofit fontScale="90000"/>
-          </a:bodyPr>
-          <a:lstStyle/>
-          <a:p>
-            <a:r>
-              <a:rPr lang="en-US" dirty="0"/>
-              <a:t>Regression Results – Tuned</a:t>
-            </a:r>
-          </a:p>
-        </p:txBody>
-      </p:sp>
-      <p:sp>
-        <p:nvSpPr>
-          <p:cNvPr id="3" name="Text Placeholder 2">
-            <a:extLst>
-              <a:ext uri="{FF2B5EF4-FFF2-40B4-BE49-F238E27FC236}">
-                <a16:creationId xmlns:a16="http://schemas.microsoft.com/office/drawing/2014/main" id="{BCA4F485-A9FF-6AF8-B831-B84E9803A03D}"/>
-              </a:ext>
-            </a:extLst>
-          </p:cNvPr>
-          <p:cNvSpPr>
-            <a:spLocks noGrp="1"/>
-          </p:cNvSpPr>
-          <p:nvPr>
-            <p:ph type="body" idx="1"/>
-          </p:nvPr>
-        </p:nvSpPr>
-        <p:spPr/>
-        <p:txBody>
-          <a:bodyPr/>
-          <a:lstStyle/>
-          <a:p>
-            <a:endParaRPr lang="en-US"/>
-          </a:p>
-        </p:txBody>
-      </p:sp>
-    </p:spTree>
-    <p:extLst>
-      <p:ext uri="{BB962C8B-B14F-4D97-AF65-F5344CB8AC3E}">
-        <p14:creationId xmlns:p14="http://schemas.microsoft.com/office/powerpoint/2010/main" val="3665169667"/>
-      </p:ext>
-    </p:extLst>
-  </p:cSld>
-  <p:clrMapOvr>
-    <a:masterClrMapping/>
-  </p:clrMapOvr>
-</p:sld>
-</file>
-
-<file path=ppt/slides/slide22.xml><?xml version="1.0" encoding="utf-8"?>
-<p:sld xmlns:a="http://schemas.openxmlformats.org/drawingml/2006/main" xmlns:r="http://schemas.openxmlformats.org/officeDocument/2006/relationships" xmlns:p="http://schemas.openxmlformats.org/presentationml/2006/main">
-  <p:cSld>
-    <p:spTree>
-      <p:nvGrpSpPr>
-        <p:cNvPr id="1" name=""/>
-        <p:cNvGrpSpPr/>
-        <p:nvPr/>
-      </p:nvGrpSpPr>
-      <p:grpSpPr>
-        <a:xfrm>
-          <a:off x="0" y="0"/>
-          <a:ext cx="0" cy="0"/>
-          <a:chOff x="0" y="0"/>
-          <a:chExt cx="0" cy="0"/>
-        </a:xfrm>
-      </p:grpSpPr>
-      <p:sp>
-        <p:nvSpPr>
-          <p:cNvPr id="2" name="Title 1">
-            <a:extLst>
-              <a:ext uri="{FF2B5EF4-FFF2-40B4-BE49-F238E27FC236}">
-                <a16:creationId xmlns:a16="http://schemas.microsoft.com/office/drawing/2014/main" id="{AEBC7FCA-308D-A31D-9598-DA5221AAF52C}"/>
-              </a:ext>
-            </a:extLst>
-          </p:cNvPr>
-          <p:cNvSpPr>
-            <a:spLocks noGrp="1"/>
-          </p:cNvSpPr>
-          <p:nvPr>
-            <p:ph type="title"/>
-          </p:nvPr>
-        </p:nvSpPr>
-        <p:spPr/>
-        <p:txBody>
-          <a:bodyPr>
-            <a:normAutofit fontScale="90000"/>
-          </a:bodyPr>
-          <a:lstStyle/>
-          <a:p>
-            <a:r>
-              <a:rPr lang="en-US" dirty="0"/>
-              <a:t>Summary</a:t>
-            </a:r>
-          </a:p>
-        </p:txBody>
-      </p:sp>
-      <p:sp>
-        <p:nvSpPr>
-          <p:cNvPr id="3" name="Text Placeholder 2">
-            <a:extLst>
-              <a:ext uri="{FF2B5EF4-FFF2-40B4-BE49-F238E27FC236}">
-                <a16:creationId xmlns:a16="http://schemas.microsoft.com/office/drawing/2014/main" id="{113FD658-CDD5-73DA-A1C2-FE8D03D723D0}"/>
-              </a:ext>
-            </a:extLst>
-          </p:cNvPr>
-          <p:cNvSpPr>
-            <a:spLocks noGrp="1"/>
-          </p:cNvSpPr>
-          <p:nvPr>
-            <p:ph type="body" idx="1"/>
-          </p:nvPr>
-        </p:nvSpPr>
-        <p:spPr/>
-        <p:txBody>
-          <a:bodyPr/>
-          <a:lstStyle/>
-          <a:p>
-            <a:endParaRPr lang="en-US"/>
-          </a:p>
-        </p:txBody>
-      </p:sp>
-    </p:spTree>
-    <p:extLst>
-      <p:ext uri="{BB962C8B-B14F-4D97-AF65-F5344CB8AC3E}">
-        <p14:creationId xmlns:p14="http://schemas.microsoft.com/office/powerpoint/2010/main" val="2573754190"/>
-      </p:ext>
-    </p:extLst>
-  </p:cSld>
-  <p:clrMapOvr>
-    <a:masterClrMapping/>
-  </p:clrMapOvr>
-</p:sld>
-</file>
-
 <file path=ppt/slides/slide23.xml><?xml version="1.0" encoding="utf-8"?>
 <p:sld xmlns:a="http://schemas.openxmlformats.org/drawingml/2006/main" xmlns:r="http://schemas.openxmlformats.org/officeDocument/2006/relationships" xmlns:p="http://schemas.openxmlformats.org/presentationml/2006/main">
   <p:cSld>
@@ -7733,6 +7935,261 @@
           <p:cNvPr id="2" name="Title 1">
             <a:extLst>
               <a:ext uri="{FF2B5EF4-FFF2-40B4-BE49-F238E27FC236}">
+                <a16:creationId xmlns:a16="http://schemas.microsoft.com/office/drawing/2014/main" id="{FCA33D96-A37D-63AA-BFE9-8DC27819D038}"/>
+              </a:ext>
+            </a:extLst>
+          </p:cNvPr>
+          <p:cNvSpPr>
+            <a:spLocks noGrp="1"/>
+          </p:cNvSpPr>
+          <p:nvPr>
+            <p:ph type="title"/>
+          </p:nvPr>
+        </p:nvSpPr>
+        <p:spPr/>
+        <p:txBody>
+          <a:bodyPr>
+            <a:normAutofit fontScale="90000"/>
+          </a:bodyPr>
+          <a:lstStyle/>
+          <a:p>
+            <a:r>
+              <a:rPr lang="en-US" dirty="0"/>
+              <a:t>Regression Results - Baseline</a:t>
+            </a:r>
+          </a:p>
+        </p:txBody>
+      </p:sp>
+      <p:sp>
+        <p:nvSpPr>
+          <p:cNvPr id="3" name="Text Placeholder 2">
+            <a:extLst>
+              <a:ext uri="{FF2B5EF4-FFF2-40B4-BE49-F238E27FC236}">
+                <a16:creationId xmlns:a16="http://schemas.microsoft.com/office/drawing/2014/main" id="{58914A15-C88E-CDA4-05EE-1E2C42EC7EBC}"/>
+              </a:ext>
+            </a:extLst>
+          </p:cNvPr>
+          <p:cNvSpPr>
+            <a:spLocks noGrp="1"/>
+          </p:cNvSpPr>
+          <p:nvPr>
+            <p:ph type="body" idx="1"/>
+          </p:nvPr>
+        </p:nvSpPr>
+        <p:spPr/>
+        <p:txBody>
+          <a:bodyPr/>
+          <a:lstStyle/>
+          <a:p>
+            <a:endParaRPr lang="en-US"/>
+          </a:p>
+        </p:txBody>
+      </p:sp>
+    </p:spTree>
+    <p:extLst>
+      <p:ext uri="{BB962C8B-B14F-4D97-AF65-F5344CB8AC3E}">
+        <p14:creationId xmlns:p14="http://schemas.microsoft.com/office/powerpoint/2010/main" val="3365831599"/>
+      </p:ext>
+    </p:extLst>
+  </p:cSld>
+  <p:clrMapOvr>
+    <a:masterClrMapping/>
+  </p:clrMapOvr>
+</p:sld>
+</file>
+
+<file path=ppt/slides/slide24.xml><?xml version="1.0" encoding="utf-8"?>
+<p:sld xmlns:a="http://schemas.openxmlformats.org/drawingml/2006/main" xmlns:r="http://schemas.openxmlformats.org/officeDocument/2006/relationships" xmlns:p="http://schemas.openxmlformats.org/presentationml/2006/main">
+  <p:cSld>
+    <p:spTree>
+      <p:nvGrpSpPr>
+        <p:cNvPr id="1" name=""/>
+        <p:cNvGrpSpPr/>
+        <p:nvPr/>
+      </p:nvGrpSpPr>
+      <p:grpSpPr>
+        <a:xfrm>
+          <a:off x="0" y="0"/>
+          <a:ext cx="0" cy="0"/>
+          <a:chOff x="0" y="0"/>
+          <a:chExt cx="0" cy="0"/>
+        </a:xfrm>
+      </p:grpSpPr>
+      <p:sp>
+        <p:nvSpPr>
+          <p:cNvPr id="2" name="Title 1">
+            <a:extLst>
+              <a:ext uri="{FF2B5EF4-FFF2-40B4-BE49-F238E27FC236}">
+                <a16:creationId xmlns:a16="http://schemas.microsoft.com/office/drawing/2014/main" id="{3C7CFFCB-83A7-A1F1-8F79-8D223F6D20E7}"/>
+              </a:ext>
+            </a:extLst>
+          </p:cNvPr>
+          <p:cNvSpPr>
+            <a:spLocks noGrp="1"/>
+          </p:cNvSpPr>
+          <p:nvPr>
+            <p:ph type="title"/>
+          </p:nvPr>
+        </p:nvSpPr>
+        <p:spPr/>
+        <p:txBody>
+          <a:bodyPr>
+            <a:normAutofit fontScale="90000"/>
+          </a:bodyPr>
+          <a:lstStyle/>
+          <a:p>
+            <a:r>
+              <a:rPr lang="en-US" dirty="0"/>
+              <a:t>Regression Results – Tuned</a:t>
+            </a:r>
+          </a:p>
+        </p:txBody>
+      </p:sp>
+      <p:sp>
+        <p:nvSpPr>
+          <p:cNvPr id="3" name="Text Placeholder 2">
+            <a:extLst>
+              <a:ext uri="{FF2B5EF4-FFF2-40B4-BE49-F238E27FC236}">
+                <a16:creationId xmlns:a16="http://schemas.microsoft.com/office/drawing/2014/main" id="{BCA4F485-A9FF-6AF8-B831-B84E9803A03D}"/>
+              </a:ext>
+            </a:extLst>
+          </p:cNvPr>
+          <p:cNvSpPr>
+            <a:spLocks noGrp="1"/>
+          </p:cNvSpPr>
+          <p:nvPr>
+            <p:ph type="body" idx="1"/>
+          </p:nvPr>
+        </p:nvSpPr>
+        <p:spPr/>
+        <p:txBody>
+          <a:bodyPr/>
+          <a:lstStyle/>
+          <a:p>
+            <a:endParaRPr lang="en-US"/>
+          </a:p>
+        </p:txBody>
+      </p:sp>
+    </p:spTree>
+    <p:extLst>
+      <p:ext uri="{BB962C8B-B14F-4D97-AF65-F5344CB8AC3E}">
+        <p14:creationId xmlns:p14="http://schemas.microsoft.com/office/powerpoint/2010/main" val="3665169667"/>
+      </p:ext>
+    </p:extLst>
+  </p:cSld>
+  <p:clrMapOvr>
+    <a:masterClrMapping/>
+  </p:clrMapOvr>
+</p:sld>
+</file>
+
+<file path=ppt/slides/slide25.xml><?xml version="1.0" encoding="utf-8"?>
+<p:sld xmlns:a="http://schemas.openxmlformats.org/drawingml/2006/main" xmlns:r="http://schemas.openxmlformats.org/officeDocument/2006/relationships" xmlns:p="http://schemas.openxmlformats.org/presentationml/2006/main">
+  <p:cSld>
+    <p:spTree>
+      <p:nvGrpSpPr>
+        <p:cNvPr id="1" name=""/>
+        <p:cNvGrpSpPr/>
+        <p:nvPr/>
+      </p:nvGrpSpPr>
+      <p:grpSpPr>
+        <a:xfrm>
+          <a:off x="0" y="0"/>
+          <a:ext cx="0" cy="0"/>
+          <a:chOff x="0" y="0"/>
+          <a:chExt cx="0" cy="0"/>
+        </a:xfrm>
+      </p:grpSpPr>
+      <p:sp>
+        <p:nvSpPr>
+          <p:cNvPr id="2" name="Title 1">
+            <a:extLst>
+              <a:ext uri="{FF2B5EF4-FFF2-40B4-BE49-F238E27FC236}">
+                <a16:creationId xmlns:a16="http://schemas.microsoft.com/office/drawing/2014/main" id="{AEBC7FCA-308D-A31D-9598-DA5221AAF52C}"/>
+              </a:ext>
+            </a:extLst>
+          </p:cNvPr>
+          <p:cNvSpPr>
+            <a:spLocks noGrp="1"/>
+          </p:cNvSpPr>
+          <p:nvPr>
+            <p:ph type="title"/>
+          </p:nvPr>
+        </p:nvSpPr>
+        <p:spPr/>
+        <p:txBody>
+          <a:bodyPr>
+            <a:normAutofit fontScale="90000"/>
+          </a:bodyPr>
+          <a:lstStyle/>
+          <a:p>
+            <a:r>
+              <a:rPr lang="en-US" dirty="0"/>
+              <a:t>Summary</a:t>
+            </a:r>
+          </a:p>
+        </p:txBody>
+      </p:sp>
+      <p:sp>
+        <p:nvSpPr>
+          <p:cNvPr id="3" name="Text Placeholder 2">
+            <a:extLst>
+              <a:ext uri="{FF2B5EF4-FFF2-40B4-BE49-F238E27FC236}">
+                <a16:creationId xmlns:a16="http://schemas.microsoft.com/office/drawing/2014/main" id="{113FD658-CDD5-73DA-A1C2-FE8D03D723D0}"/>
+              </a:ext>
+            </a:extLst>
+          </p:cNvPr>
+          <p:cNvSpPr>
+            <a:spLocks noGrp="1"/>
+          </p:cNvSpPr>
+          <p:nvPr>
+            <p:ph type="body" idx="1"/>
+          </p:nvPr>
+        </p:nvSpPr>
+        <p:spPr/>
+        <p:txBody>
+          <a:bodyPr/>
+          <a:lstStyle/>
+          <a:p>
+            <a:endParaRPr lang="en-US"/>
+          </a:p>
+        </p:txBody>
+      </p:sp>
+    </p:spTree>
+    <p:extLst>
+      <p:ext uri="{BB962C8B-B14F-4D97-AF65-F5344CB8AC3E}">
+        <p14:creationId xmlns:p14="http://schemas.microsoft.com/office/powerpoint/2010/main" val="2573754190"/>
+      </p:ext>
+    </p:extLst>
+  </p:cSld>
+  <p:clrMapOvr>
+    <a:masterClrMapping/>
+  </p:clrMapOvr>
+</p:sld>
+</file>
+
+<file path=ppt/slides/slide26.xml><?xml version="1.0" encoding="utf-8"?>
+<p:sld xmlns:a="http://schemas.openxmlformats.org/drawingml/2006/main" xmlns:r="http://schemas.openxmlformats.org/officeDocument/2006/relationships" xmlns:p="http://schemas.openxmlformats.org/presentationml/2006/main">
+  <p:cSld>
+    <p:spTree>
+      <p:nvGrpSpPr>
+        <p:cNvPr id="1" name=""/>
+        <p:cNvGrpSpPr/>
+        <p:nvPr/>
+      </p:nvGrpSpPr>
+      <p:grpSpPr>
+        <a:xfrm>
+          <a:off x="0" y="0"/>
+          <a:ext cx="0" cy="0"/>
+          <a:chOff x="0" y="0"/>
+          <a:chExt cx="0" cy="0"/>
+        </a:xfrm>
+      </p:grpSpPr>
+      <p:sp>
+        <p:nvSpPr>
+          <p:cNvPr id="2" name="Title 1">
+            <a:extLst>
+              <a:ext uri="{FF2B5EF4-FFF2-40B4-BE49-F238E27FC236}">
                 <a16:creationId xmlns:a16="http://schemas.microsoft.com/office/drawing/2014/main" id="{1D0A476F-72B7-4C4E-0D29-8A9CD99767B6}"/>
               </a:ext>
             </a:extLst>
@@ -7800,7 +8257,7 @@
 </p:sld>
 </file>
 
-<file path=ppt/slides/slide24.xml><?xml version="1.0" encoding="utf-8"?>
+<file path=ppt/slides/slide27.xml><?xml version="1.0" encoding="utf-8"?>
 <p:sld xmlns:a="http://schemas.openxmlformats.org/drawingml/2006/main" xmlns:r="http://schemas.openxmlformats.org/officeDocument/2006/relationships" xmlns:p="http://schemas.openxmlformats.org/presentationml/2006/main">
   <p:cSld>
     <p:spTree>
@@ -7907,7 +8364,7 @@
           <p:cNvPr id="2" name="Title 1">
             <a:extLst>
               <a:ext uri="{FF2B5EF4-FFF2-40B4-BE49-F238E27FC236}">
-                <a16:creationId xmlns:a16="http://schemas.microsoft.com/office/drawing/2014/main" id="{E77CFA32-0119-E516-D6F1-78CCC1931D12}"/>
+                <a16:creationId xmlns:a16="http://schemas.microsoft.com/office/drawing/2014/main" id="{2D7DEC3F-1228-2286-6B91-A2B87C2B6270}"/>
               </a:ext>
             </a:extLst>
           </p:cNvPr>
@@ -7921,13 +8378,23 @@
         <p:spPr/>
         <p:txBody>
           <a:bodyPr>
-            <a:normAutofit fontScale="90000"/>
+            <a:normAutofit/>
           </a:bodyPr>
           <a:lstStyle/>
           <a:p>
-            <a:r>
-              <a:rPr lang="en-US" dirty="0"/>
-              <a:t>Project Overview</a:t>
+            <a:pPr marL="152396" indent="0">
+              <a:buNone/>
+            </a:pPr>
+            <a:r>
+              <a:rPr lang="en-US" sz="3600" b="0" i="0" dirty="0">
+                <a:solidFill>
+                  <a:srgbClr val="262626"/>
+                </a:solidFill>
+                <a:effectLst/>
+                <a:latin typeface="Calibri" panose="020F0502020204030204" pitchFamily="34" charset="0"/>
+                <a:cs typeface="Calibri" panose="020F0502020204030204" pitchFamily="34" charset="0"/>
+              </a:rPr>
+              <a:t>How do different variables influence used vehicle pricing?</a:t>
             </a:r>
           </a:p>
         </p:txBody>
@@ -7937,7 +8404,7 @@
           <p:cNvPr id="3" name="Text Placeholder 2">
             <a:extLst>
               <a:ext uri="{FF2B5EF4-FFF2-40B4-BE49-F238E27FC236}">
-                <a16:creationId xmlns:a16="http://schemas.microsoft.com/office/drawing/2014/main" id="{551864E5-FFDC-ADFD-43FF-2B170516EB7F}"/>
+                <a16:creationId xmlns:a16="http://schemas.microsoft.com/office/drawing/2014/main" id="{6E057948-2F4E-0E44-5B1E-51136C244822}"/>
               </a:ext>
             </a:extLst>
           </p:cNvPr>
@@ -7948,109 +8415,199 @@
             <p:ph type="body" idx="1"/>
           </p:nvPr>
         </p:nvSpPr>
-        <p:spPr/>
+        <p:spPr>
+          <a:xfrm>
+            <a:off x="415600" y="1536633"/>
+            <a:ext cx="11360800" cy="4360584"/>
+          </a:xfrm>
+        </p:spPr>
         <p:txBody>
           <a:bodyPr>
-            <a:normAutofit fontScale="85000" lnSpcReduction="20000"/>
+            <a:normAutofit fontScale="92500" lnSpcReduction="20000"/>
           </a:bodyPr>
           <a:lstStyle/>
           <a:p>
-            <a:r>
-              <a:rPr lang="en-US" dirty="0"/>
-              <a:t>A number of the prior projects that I have worked on have been focused on classification, for example of images or sentiment analysis of textual data.</a:t>
-            </a:r>
-          </a:p>
-          <a:p>
-            <a:r>
-              <a:rPr lang="en-US" dirty="0"/>
-              <a:t>Since much of my experience with handling data sets for machine learning problems has been through graduate CS courses, I have implemented them typically without a dependency on anything but NumPy and matplotlib for visualizing results, which means I have limited experience with existing common tools like scikit-learn. </a:t>
-            </a:r>
-          </a:p>
-          <a:p>
-            <a:r>
-              <a:rPr lang="en-US" dirty="0"/>
-              <a:t>I am competent at using </a:t>
-            </a:r>
-            <a:r>
-              <a:rPr lang="en-US" dirty="0" err="1"/>
-              <a:t>LaTex</a:t>
-            </a:r>
-            <a:r>
-              <a:rPr lang="en-US" dirty="0"/>
-              <a:t>, but not an advanced user.</a:t>
-            </a:r>
-          </a:p>
-          <a:p>
-            <a:r>
-              <a:rPr lang="en-US" dirty="0"/>
-              <a:t>I have significant experience with NumPy and some experience using Pandas. I also have experience with matplotlib for visualizing aspects of data, but less with Seaborn.</a:t>
-            </a:r>
-          </a:p>
-          <a:p>
-            <a:r>
-              <a:rPr lang="en-US" dirty="0"/>
-              <a:t>The areas and skills I would like to grow through this project are:</a:t>
-            </a:r>
-          </a:p>
-          <a:p>
-            <a:pPr>
-              <a:buFont typeface="+mj-lt"/>
-              <a:buAutoNum type="arabicPeriod"/>
+            <a:pPr marL="152396" indent="0">
+              <a:buNone/>
             </a:pPr>
             <a:r>
-              <a:rPr lang="en-US" dirty="0"/>
-              <a:t>More hands-on experience with scikit-learn and Pandas libraries.</a:t>
-            </a:r>
-          </a:p>
-          <a:p>
-            <a:pPr>
-              <a:buFont typeface="+mj-lt"/>
-              <a:buAutoNum type="arabicPeriod"/>
+              <a:rPr lang="en-US" b="1" dirty="0">
+                <a:solidFill>
+                  <a:srgbClr val="262626"/>
+                </a:solidFill>
+                <a:latin typeface="Calibri" panose="020F0502020204030204" pitchFamily="34" charset="0"/>
+                <a:cs typeface="Calibri" panose="020F0502020204030204" pitchFamily="34" charset="0"/>
+              </a:rPr>
+              <a:t>Practical utility to multiple types of users</a:t>
+            </a:r>
+          </a:p>
+          <a:p>
+            <a:r>
+              <a:rPr lang="en-US" dirty="0">
+                <a:latin typeface="Calibri" panose="020F0502020204030204" pitchFamily="34" charset="0"/>
+                <a:cs typeface="Calibri" panose="020F0502020204030204" pitchFamily="34" charset="0"/>
+              </a:rPr>
+              <a:t>User car dealers</a:t>
+            </a:r>
+          </a:p>
+          <a:p>
+            <a:r>
+              <a:rPr lang="en-US" dirty="0">
+                <a:latin typeface="Calibri" panose="020F0502020204030204" pitchFamily="34" charset="0"/>
+                <a:cs typeface="Calibri" panose="020F0502020204030204" pitchFamily="34" charset="0"/>
+              </a:rPr>
+              <a:t>Private sellers</a:t>
+            </a:r>
+          </a:p>
+          <a:p>
+            <a:r>
+              <a:rPr lang="en-US" dirty="0">
+                <a:latin typeface="Calibri" panose="020F0502020204030204" pitchFamily="34" charset="0"/>
+                <a:cs typeface="Calibri" panose="020F0502020204030204" pitchFamily="34" charset="0"/>
+              </a:rPr>
+              <a:t>New car purchasers with a trade-in </a:t>
+            </a:r>
+          </a:p>
+          <a:p>
+            <a:r>
+              <a:rPr lang="en-US" dirty="0">
+                <a:latin typeface="Calibri" panose="020F0502020204030204" pitchFamily="34" charset="0"/>
+                <a:cs typeface="Calibri" panose="020F0502020204030204" pitchFamily="34" charset="0"/>
+              </a:rPr>
+              <a:t>Dealerships purchasing trade-ins</a:t>
+            </a:r>
+          </a:p>
+          <a:p>
+            <a:r>
+              <a:rPr lang="en-US" dirty="0">
+                <a:latin typeface="Calibri" panose="020F0502020204030204" pitchFamily="34" charset="0"/>
+                <a:cs typeface="Calibri" panose="020F0502020204030204" pitchFamily="34" charset="0"/>
+              </a:rPr>
+              <a:t>Automotive websites and data providers (KBB, Edmunds, </a:t>
+            </a:r>
+            <a:r>
+              <a:rPr lang="en-US" dirty="0" err="1">
+                <a:latin typeface="Calibri" panose="020F0502020204030204" pitchFamily="34" charset="0"/>
+                <a:cs typeface="Calibri" panose="020F0502020204030204" pitchFamily="34" charset="0"/>
+              </a:rPr>
+              <a:t>etc</a:t>
+            </a:r>
+            <a:r>
+              <a:rPr lang="en-US" dirty="0">
+                <a:latin typeface="Calibri" panose="020F0502020204030204" pitchFamily="34" charset="0"/>
+                <a:cs typeface="Calibri" panose="020F0502020204030204" pitchFamily="34" charset="0"/>
+              </a:rPr>
+              <a:t>).</a:t>
+            </a:r>
+          </a:p>
+          <a:p>
+            <a:r>
+              <a:rPr lang="en-US" dirty="0">
+                <a:latin typeface="Calibri" panose="020F0502020204030204" pitchFamily="34" charset="0"/>
+                <a:cs typeface="Calibri" panose="020F0502020204030204" pitchFamily="34" charset="0"/>
+              </a:rPr>
+              <a:t>Economists or scientists investigating used vehicle market dynamics</a:t>
+            </a:r>
+          </a:p>
+          <a:p>
+            <a:pPr marL="152396" indent="0">
+              <a:buNone/>
             </a:pPr>
-            <a:r>
-              <a:rPr lang="en-US" dirty="0"/>
-              <a:t>More practice with visualization tools, such as matplotlib and Seaborn.</a:t>
-            </a:r>
-          </a:p>
-          <a:p>
-            <a:pPr>
-              <a:buFont typeface="+mj-lt"/>
-              <a:buAutoNum type="arabicPeriod"/>
+            <a:endParaRPr lang="en-US" dirty="0">
+              <a:solidFill>
+                <a:srgbClr val="262626"/>
+              </a:solidFill>
+              <a:latin typeface="Calibri" panose="020F0502020204030204" pitchFamily="34" charset="0"/>
+              <a:cs typeface="Calibri" panose="020F0502020204030204" pitchFamily="34" charset="0"/>
+            </a:endParaRPr>
+          </a:p>
+          <a:p>
+            <a:pPr marL="152396" indent="0">
+              <a:buNone/>
             </a:pPr>
             <a:r>
-              <a:rPr lang="en-US" dirty="0"/>
-              <a:t>More practical experience with investigating a dataset, i.e. what data cleaning is needed and what relationships can be discovered in the data.</a:t>
-            </a:r>
-          </a:p>
-          <a:p>
-            <a:pPr>
-              <a:buFont typeface="+mj-lt"/>
-              <a:buAutoNum type="arabicPeriod"/>
+              <a:rPr lang="en-US" b="1" dirty="0">
+                <a:solidFill>
+                  <a:srgbClr val="262626"/>
+                </a:solidFill>
+                <a:latin typeface="Calibri" panose="020F0502020204030204" pitchFamily="34" charset="0"/>
+                <a:cs typeface="Calibri" panose="020F0502020204030204" pitchFamily="34" charset="0"/>
+              </a:rPr>
+              <a:t>Team’s Personal Reasons</a:t>
+            </a:r>
+          </a:p>
+          <a:p>
+            <a:r>
+              <a:rPr lang="en-US" dirty="0">
+                <a:solidFill>
+                  <a:srgbClr val="262626"/>
+                </a:solidFill>
+                <a:latin typeface="Calibri" panose="020F0502020204030204" pitchFamily="34" charset="0"/>
+                <a:cs typeface="Calibri" panose="020F0502020204030204" pitchFamily="34" charset="0"/>
+              </a:rPr>
+              <a:t>Explore a regression problem (more prior experience with classification)</a:t>
+            </a:r>
+            <a:endParaRPr lang="en-US" dirty="0">
+              <a:latin typeface="Calibri" panose="020F0502020204030204" pitchFamily="34" charset="0"/>
+              <a:cs typeface="Calibri" panose="020F0502020204030204" pitchFamily="34" charset="0"/>
+            </a:endParaRPr>
+          </a:p>
+          <a:p>
+            <a:r>
+              <a:rPr lang="en-US" dirty="0">
+                <a:latin typeface="Calibri" panose="020F0502020204030204" pitchFamily="34" charset="0"/>
+                <a:cs typeface="Calibri" panose="020F0502020204030204" pitchFamily="34" charset="0"/>
+              </a:rPr>
+              <a:t>Gain experience with visualization, data preparation, and relevant libraries, especially scikit-learn, Pandas, and </a:t>
+            </a:r>
+            <a:r>
+              <a:rPr lang="en-US" dirty="0" err="1">
+                <a:latin typeface="Calibri" panose="020F0502020204030204" pitchFamily="34" charset="0"/>
+                <a:cs typeface="Calibri" panose="020F0502020204030204" pitchFamily="34" charset="0"/>
+              </a:rPr>
+              <a:t>XGBoost</a:t>
+            </a:r>
+            <a:r>
+              <a:rPr lang="en-US" dirty="0">
+                <a:latin typeface="Calibri" panose="020F0502020204030204" pitchFamily="34" charset="0"/>
+                <a:cs typeface="Calibri" panose="020F0502020204030204" pitchFamily="34" charset="0"/>
+              </a:rPr>
+              <a:t>.</a:t>
+            </a:r>
+          </a:p>
+          <a:p>
+            <a:r>
+              <a:rPr lang="en-US" dirty="0">
+                <a:latin typeface="Calibri" panose="020F0502020204030204" pitchFamily="34" charset="0"/>
+                <a:cs typeface="Calibri" panose="020F0502020204030204" pitchFamily="34" charset="0"/>
+              </a:rPr>
+              <a:t>Interested in cars</a:t>
+            </a:r>
+          </a:p>
+          <a:p>
+            <a:r>
+              <a:rPr lang="en-US" dirty="0">
+                <a:latin typeface="Calibri" panose="020F0502020204030204" pitchFamily="34" charset="0"/>
+                <a:cs typeface="Calibri" panose="020F0502020204030204" pitchFamily="34" charset="0"/>
+              </a:rPr>
+              <a:t>COVID-19 supply chain problems highlighted vehicle pricing changes</a:t>
+            </a:r>
+          </a:p>
+          <a:p>
+            <a:pPr marL="152396" indent="0">
+              <a:buNone/>
             </a:pPr>
-            <a:r>
-              <a:rPr lang="en-US" dirty="0"/>
-              <a:t>Experience with a practical machine learning regression problem.</a:t>
-            </a:r>
-          </a:p>
-          <a:p>
-            <a:pPr>
-              <a:buFont typeface="+mj-lt"/>
-              <a:buAutoNum type="arabicPeriod"/>
-            </a:pPr>
-            <a:r>
-              <a:rPr lang="en-US" dirty="0"/>
-              <a:t>Feature selection techniques to make machine learning problems more effective.</a:t>
-            </a:r>
-          </a:p>
-          <a:p>
-            <a:endParaRPr lang="en-US" dirty="0"/>
+            <a:endParaRPr lang="en-US" dirty="0">
+              <a:latin typeface="Calibri" panose="020F0502020204030204" pitchFamily="34" charset="0"/>
+              <a:cs typeface="Calibri" panose="020F0502020204030204" pitchFamily="34" charset="0"/>
+            </a:endParaRPr>
           </a:p>
         </p:txBody>
       </p:sp>
     </p:spTree>
     <p:extLst>
       <p:ext uri="{BB962C8B-B14F-4D97-AF65-F5344CB8AC3E}">
-        <p14:creationId xmlns:p14="http://schemas.microsoft.com/office/powerpoint/2010/main" val="1503249293"/>
+        <p14:creationId xmlns:p14="http://schemas.microsoft.com/office/powerpoint/2010/main" val="2519445450"/>
       </p:ext>
     </p:extLst>
   </p:cSld>
@@ -8082,7 +8639,7 @@
           <p:cNvPr id="2" name="Title 1">
             <a:extLst>
               <a:ext uri="{FF2B5EF4-FFF2-40B4-BE49-F238E27FC236}">
-                <a16:creationId xmlns:a16="http://schemas.microsoft.com/office/drawing/2014/main" id="{39BC2DB1-AC92-5E21-1B33-2489A7B1FF5D}"/>
+                <a16:creationId xmlns:a16="http://schemas.microsoft.com/office/drawing/2014/main" id="{E77CFA32-0119-E516-D6F1-78CCC1931D12}"/>
               </a:ext>
             </a:extLst>
           </p:cNvPr>
@@ -8102,47 +8659,17 @@
           <a:p>
             <a:r>
               <a:rPr lang="en-US" dirty="0"/>
-              <a:t>Dataset</a:t>
-            </a:r>
-          </a:p>
-        </p:txBody>
-      </p:sp>
-      <p:pic>
-        <p:nvPicPr>
-          <p:cNvPr id="4" name="Picture 3">
-            <a:extLst>
-              <a:ext uri="{FF2B5EF4-FFF2-40B4-BE49-F238E27FC236}">
-                <a16:creationId xmlns:a16="http://schemas.microsoft.com/office/drawing/2014/main" id="{B633A8DB-A954-FA4E-366B-261BE4C9C2C0}"/>
-              </a:ext>
-            </a:extLst>
-          </p:cNvPr>
-          <p:cNvPicPr>
-            <a:picLocks noChangeAspect="1"/>
-          </p:cNvPicPr>
-          <p:nvPr/>
-        </p:nvPicPr>
-        <p:blipFill>
-          <a:blip r:embed="rId2"/>
-          <a:stretch>
-            <a:fillRect/>
-          </a:stretch>
-        </p:blipFill>
-        <p:spPr>
-          <a:xfrm>
-            <a:off x="2349661" y="593367"/>
-            <a:ext cx="9206810" cy="4728000"/>
-          </a:xfrm>
-          <a:prstGeom prst="rect">
-            <a:avLst/>
-          </a:prstGeom>
-        </p:spPr>
-      </p:pic>
+              <a:t>Project Overview (TODO: fix)</a:t>
+            </a:r>
+          </a:p>
+        </p:txBody>
+      </p:sp>
       <p:sp>
         <p:nvSpPr>
           <p:cNvPr id="3" name="Text Placeholder 2">
             <a:extLst>
               <a:ext uri="{FF2B5EF4-FFF2-40B4-BE49-F238E27FC236}">
-                <a16:creationId xmlns:a16="http://schemas.microsoft.com/office/drawing/2014/main" id="{72D2AF17-7DED-06AD-401E-F3D8604A170B}"/>
+                <a16:creationId xmlns:a16="http://schemas.microsoft.com/office/drawing/2014/main" id="{551864E5-FFDC-ADFD-43FF-2B170516EB7F}"/>
               </a:ext>
             </a:extLst>
           </p:cNvPr>
@@ -8155,32 +8682,10 @@
         </p:nvSpPr>
         <p:spPr/>
         <p:txBody>
-          <a:bodyPr/>
-          <a:lstStyle/>
-          <a:p>
-            <a:r>
-              <a:rPr lang="en-US" dirty="0"/>
-              <a:t>TODO:</a:t>
-            </a:r>
-          </a:p>
-          <a:p>
-            <a:r>
-              <a:rPr lang="en-US" dirty="0"/>
-              <a:t>Replace</a:t>
-            </a:r>
-          </a:p>
-          <a:p>
-            <a:r>
-              <a:rPr lang="en-US" dirty="0"/>
-              <a:t>With </a:t>
-            </a:r>
-          </a:p>
-          <a:p>
-            <a:r>
-              <a:rPr lang="en-US" dirty="0"/>
-              <a:t>Txt</a:t>
-            </a:r>
-          </a:p>
+          <a:bodyPr>
+            <a:normAutofit/>
+          </a:bodyPr>
+          <a:lstStyle/>
           <a:p>
             <a:endParaRPr lang="en-US" dirty="0"/>
           </a:p>
@@ -8189,7 +8694,7 @@
     </p:spTree>
     <p:extLst>
       <p:ext uri="{BB962C8B-B14F-4D97-AF65-F5344CB8AC3E}">
-        <p14:creationId xmlns:p14="http://schemas.microsoft.com/office/powerpoint/2010/main" val="1645399474"/>
+        <p14:creationId xmlns:p14="http://schemas.microsoft.com/office/powerpoint/2010/main" val="1503249293"/>
       </p:ext>
     </p:extLst>
   </p:cSld>
@@ -8216,6 +8721,145 @@
           <a:chExt cx="0" cy="0"/>
         </a:xfrm>
       </p:grpSpPr>
+      <p:sp>
+        <p:nvSpPr>
+          <p:cNvPr id="2" name="Title 1">
+            <a:extLst>
+              <a:ext uri="{FF2B5EF4-FFF2-40B4-BE49-F238E27FC236}">
+                <a16:creationId xmlns:a16="http://schemas.microsoft.com/office/drawing/2014/main" id="{39BC2DB1-AC92-5E21-1B33-2489A7B1FF5D}"/>
+              </a:ext>
+            </a:extLst>
+          </p:cNvPr>
+          <p:cNvSpPr>
+            <a:spLocks noGrp="1"/>
+          </p:cNvSpPr>
+          <p:nvPr>
+            <p:ph type="title"/>
+          </p:nvPr>
+        </p:nvSpPr>
+        <p:spPr/>
+        <p:txBody>
+          <a:bodyPr>
+            <a:normAutofit fontScale="90000"/>
+          </a:bodyPr>
+          <a:lstStyle/>
+          <a:p>
+            <a:r>
+              <a:rPr lang="en-US" dirty="0"/>
+              <a:t>Dataset</a:t>
+            </a:r>
+          </a:p>
+        </p:txBody>
+      </p:sp>
+      <p:pic>
+        <p:nvPicPr>
+          <p:cNvPr id="4" name="Picture 3">
+            <a:extLst>
+              <a:ext uri="{FF2B5EF4-FFF2-40B4-BE49-F238E27FC236}">
+                <a16:creationId xmlns:a16="http://schemas.microsoft.com/office/drawing/2014/main" id="{B633A8DB-A954-FA4E-366B-261BE4C9C2C0}"/>
+              </a:ext>
+            </a:extLst>
+          </p:cNvPr>
+          <p:cNvPicPr>
+            <a:picLocks noChangeAspect="1"/>
+          </p:cNvPicPr>
+          <p:nvPr/>
+        </p:nvPicPr>
+        <p:blipFill>
+          <a:blip r:embed="rId2"/>
+          <a:stretch>
+            <a:fillRect/>
+          </a:stretch>
+        </p:blipFill>
+        <p:spPr>
+          <a:xfrm>
+            <a:off x="2349661" y="593367"/>
+            <a:ext cx="9206810" cy="4728000"/>
+          </a:xfrm>
+          <a:prstGeom prst="rect">
+            <a:avLst/>
+          </a:prstGeom>
+        </p:spPr>
+      </p:pic>
+      <p:sp>
+        <p:nvSpPr>
+          <p:cNvPr id="3" name="Text Placeholder 2">
+            <a:extLst>
+              <a:ext uri="{FF2B5EF4-FFF2-40B4-BE49-F238E27FC236}">
+                <a16:creationId xmlns:a16="http://schemas.microsoft.com/office/drawing/2014/main" id="{72D2AF17-7DED-06AD-401E-F3D8604A170B}"/>
+              </a:ext>
+            </a:extLst>
+          </p:cNvPr>
+          <p:cNvSpPr>
+            <a:spLocks noGrp="1"/>
+          </p:cNvSpPr>
+          <p:nvPr>
+            <p:ph type="body" idx="1"/>
+          </p:nvPr>
+        </p:nvSpPr>
+        <p:spPr/>
+        <p:txBody>
+          <a:bodyPr/>
+          <a:lstStyle/>
+          <a:p>
+            <a:r>
+              <a:rPr lang="en-US" dirty="0"/>
+              <a:t>TODO:</a:t>
+            </a:r>
+          </a:p>
+          <a:p>
+            <a:r>
+              <a:rPr lang="en-US" dirty="0"/>
+              <a:t>Replace</a:t>
+            </a:r>
+          </a:p>
+          <a:p>
+            <a:r>
+              <a:rPr lang="en-US" dirty="0"/>
+              <a:t>With </a:t>
+            </a:r>
+          </a:p>
+          <a:p>
+            <a:r>
+              <a:rPr lang="en-US" dirty="0"/>
+              <a:t>Txt</a:t>
+            </a:r>
+          </a:p>
+          <a:p>
+            <a:endParaRPr lang="en-US" dirty="0"/>
+          </a:p>
+        </p:txBody>
+      </p:sp>
+    </p:spTree>
+    <p:extLst>
+      <p:ext uri="{BB962C8B-B14F-4D97-AF65-F5344CB8AC3E}">
+        <p14:creationId xmlns:p14="http://schemas.microsoft.com/office/powerpoint/2010/main" val="1645399474"/>
+      </p:ext>
+    </p:extLst>
+  </p:cSld>
+  <p:clrMapOvr>
+    <a:masterClrMapping/>
+  </p:clrMapOvr>
+</p:sld>
+</file>
+
+<file path=ppt/slides/slide6.xml><?xml version="1.0" encoding="utf-8"?>
+<p:sld xmlns:a="http://schemas.openxmlformats.org/drawingml/2006/main" xmlns:r="http://schemas.openxmlformats.org/officeDocument/2006/relationships" xmlns:p="http://schemas.openxmlformats.org/presentationml/2006/main">
+  <p:cSld>
+    <p:spTree>
+      <p:nvGrpSpPr>
+        <p:cNvPr id="1" name=""/>
+        <p:cNvGrpSpPr/>
+        <p:nvPr/>
+      </p:nvGrpSpPr>
+      <p:grpSpPr>
+        <a:xfrm>
+          <a:off x="0" y="0"/>
+          <a:ext cx="0" cy="0"/>
+          <a:chOff x="0" y="0"/>
+          <a:chExt cx="0" cy="0"/>
+        </a:xfrm>
+      </p:grpSpPr>
       <p:pic>
         <p:nvPicPr>
           <p:cNvPr id="4" name="Picture 3">
@@ -8325,7 +8969,7 @@
 </p:sld>
 </file>
 
-<file path=ppt/slides/slide6.xml><?xml version="1.0" encoding="utf-8"?>
+<file path=ppt/slides/slide7.xml><?xml version="1.0" encoding="utf-8"?>
 <p:sld xmlns:a="http://schemas.openxmlformats.org/drawingml/2006/main" xmlns:r="http://schemas.openxmlformats.org/officeDocument/2006/relationships" xmlns:p="http://schemas.openxmlformats.org/presentationml/2006/main">
   <p:cSld>
     <p:spTree>
@@ -8523,7 +9167,7 @@
 </p:sld>
 </file>
 
-<file path=ppt/slides/slide7.xml><?xml version="1.0" encoding="utf-8"?>
+<file path=ppt/slides/slide8.xml><?xml version="1.0" encoding="utf-8"?>
 <p:sld xmlns:a="http://schemas.openxmlformats.org/drawingml/2006/main" xmlns:r="http://schemas.openxmlformats.org/officeDocument/2006/relationships" xmlns:p="http://schemas.openxmlformats.org/presentationml/2006/main">
   <p:cSld>
     <p:spTree>
@@ -8613,94 +9257,6 @@
 </p:sld>
 </file>
 
-<file path=ppt/slides/slide8.xml><?xml version="1.0" encoding="utf-8"?>
-<p:sld xmlns:a="http://schemas.openxmlformats.org/drawingml/2006/main" xmlns:r="http://schemas.openxmlformats.org/officeDocument/2006/relationships" xmlns:p="http://schemas.openxmlformats.org/presentationml/2006/main">
-  <p:cSld>
-    <p:spTree>
-      <p:nvGrpSpPr>
-        <p:cNvPr id="1" name=""/>
-        <p:cNvGrpSpPr/>
-        <p:nvPr/>
-      </p:nvGrpSpPr>
-      <p:grpSpPr>
-        <a:xfrm>
-          <a:off x="0" y="0"/>
-          <a:ext cx="0" cy="0"/>
-          <a:chOff x="0" y="0"/>
-          <a:chExt cx="0" cy="0"/>
-        </a:xfrm>
-      </p:grpSpPr>
-      <p:sp>
-        <p:nvSpPr>
-          <p:cNvPr id="2" name="Title 1">
-            <a:extLst>
-              <a:ext uri="{FF2B5EF4-FFF2-40B4-BE49-F238E27FC236}">
-                <a16:creationId xmlns:a16="http://schemas.microsoft.com/office/drawing/2014/main" id="{99BCD783-18E7-D28A-FF2A-FB06546705DE}"/>
-              </a:ext>
-            </a:extLst>
-          </p:cNvPr>
-          <p:cNvSpPr>
-            <a:spLocks noGrp="1"/>
-          </p:cNvSpPr>
-          <p:nvPr>
-            <p:ph type="title"/>
-          </p:nvPr>
-        </p:nvSpPr>
-        <p:spPr/>
-        <p:txBody>
-          <a:bodyPr>
-            <a:normAutofit fontScale="90000"/>
-          </a:bodyPr>
-          <a:lstStyle/>
-          <a:p>
-            <a:r>
-              <a:rPr lang="en-US" dirty="0"/>
-              <a:t>EDA 1</a:t>
-            </a:r>
-          </a:p>
-        </p:txBody>
-      </p:sp>
-      <p:sp>
-        <p:nvSpPr>
-          <p:cNvPr id="3" name="Text Placeholder 2">
-            <a:extLst>
-              <a:ext uri="{FF2B5EF4-FFF2-40B4-BE49-F238E27FC236}">
-                <a16:creationId xmlns:a16="http://schemas.microsoft.com/office/drawing/2014/main" id="{ED72843F-0B2D-3CD5-BCE2-EAE104FED82F}"/>
-              </a:ext>
-            </a:extLst>
-          </p:cNvPr>
-          <p:cNvSpPr>
-            <a:spLocks noGrp="1"/>
-          </p:cNvSpPr>
-          <p:nvPr>
-            <p:ph type="body" idx="1"/>
-          </p:nvPr>
-        </p:nvSpPr>
-        <p:spPr/>
-        <p:txBody>
-          <a:bodyPr/>
-          <a:lstStyle/>
-          <a:p>
-            <a:r>
-              <a:rPr lang="en-US" dirty="0"/>
-              <a:t>TODO: should be more than one slide</a:t>
-            </a:r>
-          </a:p>
-        </p:txBody>
-      </p:sp>
-    </p:spTree>
-    <p:extLst>
-      <p:ext uri="{BB962C8B-B14F-4D97-AF65-F5344CB8AC3E}">
-        <p14:creationId xmlns:p14="http://schemas.microsoft.com/office/powerpoint/2010/main" val="2801975149"/>
-      </p:ext>
-    </p:extLst>
-  </p:cSld>
-  <p:clrMapOvr>
-    <a:masterClrMapping/>
-  </p:clrMapOvr>
-</p:sld>
-</file>
-
 <file path=ppt/slides/slide9.xml><?xml version="1.0" encoding="utf-8"?>
 <p:sld xmlns:a="http://schemas.openxmlformats.org/drawingml/2006/main" xmlns:r="http://schemas.openxmlformats.org/officeDocument/2006/relationships" xmlns:p="http://schemas.openxmlformats.org/presentationml/2006/main">
   <p:cSld>
@@ -8723,7 +9279,7 @@
           <p:cNvPr id="2" name="Title 1">
             <a:extLst>
               <a:ext uri="{FF2B5EF4-FFF2-40B4-BE49-F238E27FC236}">
-                <a16:creationId xmlns:a16="http://schemas.microsoft.com/office/drawing/2014/main" id="{1BC3F0F3-1C8B-09F1-60C1-ED4A763FA1B0}"/>
+                <a16:creationId xmlns:a16="http://schemas.microsoft.com/office/drawing/2014/main" id="{99BCD783-18E7-D28A-FF2A-FB06546705DE}"/>
               </a:ext>
             </a:extLst>
           </p:cNvPr>
@@ -8743,45 +9299,43 @@
           <a:p>
             <a:r>
               <a:rPr lang="en-US" dirty="0"/>
-              <a:t>Numeric Features - Histogram</a:t>
-            </a:r>
-          </a:p>
-        </p:txBody>
-      </p:sp>
-      <p:pic>
-        <p:nvPicPr>
-          <p:cNvPr id="4" name="Picture 3">
-            <a:extLst>
-              <a:ext uri="{FF2B5EF4-FFF2-40B4-BE49-F238E27FC236}">
-                <a16:creationId xmlns:a16="http://schemas.microsoft.com/office/drawing/2014/main" id="{42CCF90B-CBA7-3C6E-FC4C-6982532AE875}"/>
-              </a:ext>
-            </a:extLst>
-          </p:cNvPr>
-          <p:cNvPicPr>
-            <a:picLocks noChangeAspect="1"/>
-          </p:cNvPicPr>
-          <p:nvPr/>
-        </p:nvPicPr>
-        <p:blipFill>
-          <a:blip r:embed="rId2"/>
-          <a:stretch>
-            <a:fillRect/>
-          </a:stretch>
-        </p:blipFill>
-        <p:spPr>
-          <a:xfrm>
-            <a:off x="2209800" y="1296437"/>
-            <a:ext cx="7772400" cy="4265126"/>
-          </a:xfrm>
-          <a:prstGeom prst="rect">
-            <a:avLst/>
-          </a:prstGeom>
-        </p:spPr>
-      </p:pic>
+              <a:t>Exploratory Data Analysis</a:t>
+            </a:r>
+          </a:p>
+        </p:txBody>
+      </p:sp>
+      <p:sp>
+        <p:nvSpPr>
+          <p:cNvPr id="3" name="Text Placeholder 2">
+            <a:extLst>
+              <a:ext uri="{FF2B5EF4-FFF2-40B4-BE49-F238E27FC236}">
+                <a16:creationId xmlns:a16="http://schemas.microsoft.com/office/drawing/2014/main" id="{ED72843F-0B2D-3CD5-BCE2-EAE104FED82F}"/>
+              </a:ext>
+            </a:extLst>
+          </p:cNvPr>
+          <p:cNvSpPr>
+            <a:spLocks noGrp="1"/>
+          </p:cNvSpPr>
+          <p:nvPr>
+            <p:ph type="body" idx="1"/>
+          </p:nvPr>
+        </p:nvSpPr>
+        <p:spPr/>
+        <p:txBody>
+          <a:bodyPr/>
+          <a:lstStyle/>
+          <a:p>
+            <a:r>
+              <a:rPr lang="en-US" dirty="0"/>
+              <a:t>TODO: should be more than one slide</a:t>
+            </a:r>
+          </a:p>
+        </p:txBody>
+      </p:sp>
     </p:spTree>
     <p:extLst>
       <p:ext uri="{BB962C8B-B14F-4D97-AF65-F5344CB8AC3E}">
-        <p14:creationId xmlns:p14="http://schemas.microsoft.com/office/powerpoint/2010/main" val="1306705530"/>
+        <p14:creationId xmlns:p14="http://schemas.microsoft.com/office/powerpoint/2010/main" val="2801975149"/>
       </p:ext>
     </p:extLst>
   </p:cSld>

</xml_diff>

<commit_message>
First good complete run with training graph on full data
</commit_message>
<xml_diff>
--- a/DSCI521_rna63_final_project_pres.pptx
+++ b/DSCI521_rna63_final_project_pres.pptx
@@ -883,6 +883,184 @@
     <p:extLst>
       <p:ext uri="{BB962C8B-B14F-4D97-AF65-F5344CB8AC3E}">
         <p14:creationId xmlns:p14="http://schemas.microsoft.com/office/powerpoint/2010/main" val="1387967105"/>
+      </p:ext>
+    </p:extLst>
+  </p:cSld>
+  <p:clrMapOvr>
+    <a:masterClrMapping/>
+  </p:clrMapOvr>
+</p:notes>
+</file>
+
+<file path=ppt/notesSlides/notesSlide4.xml><?xml version="1.0" encoding="utf-8"?>
+<p:notes xmlns:a="http://schemas.openxmlformats.org/drawingml/2006/main" xmlns:r="http://schemas.openxmlformats.org/officeDocument/2006/relationships" xmlns:p="http://schemas.openxmlformats.org/presentationml/2006/main">
+  <p:cSld>
+    <p:spTree>
+      <p:nvGrpSpPr>
+        <p:cNvPr id="1" name=""/>
+        <p:cNvGrpSpPr/>
+        <p:nvPr/>
+      </p:nvGrpSpPr>
+      <p:grpSpPr>
+        <a:xfrm>
+          <a:off x="0" y="0"/>
+          <a:ext cx="0" cy="0"/>
+          <a:chOff x="0" y="0"/>
+          <a:chExt cx="0" cy="0"/>
+        </a:xfrm>
+      </p:grpSpPr>
+      <p:sp>
+        <p:nvSpPr>
+          <p:cNvPr id="2" name="Slide Image Placeholder 1"/>
+          <p:cNvSpPr>
+            <a:spLocks noGrp="1" noRot="1" noChangeAspect="1"/>
+          </p:cNvSpPr>
+          <p:nvPr>
+            <p:ph type="sldImg"/>
+          </p:nvPr>
+        </p:nvSpPr>
+        <p:spPr/>
+      </p:sp>
+      <p:sp>
+        <p:nvSpPr>
+          <p:cNvPr id="3" name="Notes Placeholder 2"/>
+          <p:cNvSpPr>
+            <a:spLocks noGrp="1"/>
+          </p:cNvSpPr>
+          <p:nvPr>
+            <p:ph type="body" idx="1"/>
+          </p:nvPr>
+        </p:nvSpPr>
+        <p:spPr/>
+        <p:txBody>
+          <a:bodyPr/>
+          <a:lstStyle/>
+          <a:p>
+            <a:endParaRPr lang="en-US" dirty="0"/>
+          </a:p>
+        </p:txBody>
+      </p:sp>
+      <p:sp>
+        <p:nvSpPr>
+          <p:cNvPr id="4" name="Slide Number Placeholder 3"/>
+          <p:cNvSpPr>
+            <a:spLocks noGrp="1"/>
+          </p:cNvSpPr>
+          <p:nvPr>
+            <p:ph type="sldNum" sz="quarter" idx="5"/>
+          </p:nvPr>
+        </p:nvSpPr>
+        <p:spPr/>
+        <p:txBody>
+          <a:bodyPr/>
+          <a:lstStyle/>
+          <a:p>
+            <a:fld id="{801F8ACE-8AB6-C746-898D-0B2E8626E4DD}" type="slidenum">
+              <a:rPr lang="en-US" smtClean="0"/>
+              <a:t>22</a:t>
+            </a:fld>
+            <a:endParaRPr lang="en-US"/>
+          </a:p>
+        </p:txBody>
+      </p:sp>
+    </p:spTree>
+    <p:extLst>
+      <p:ext uri="{BB962C8B-B14F-4D97-AF65-F5344CB8AC3E}">
+        <p14:creationId xmlns:p14="http://schemas.microsoft.com/office/powerpoint/2010/main" val="3300526282"/>
+      </p:ext>
+    </p:extLst>
+  </p:cSld>
+  <p:clrMapOvr>
+    <a:masterClrMapping/>
+  </p:clrMapOvr>
+</p:notes>
+</file>
+
+<file path=ppt/notesSlides/notesSlide5.xml><?xml version="1.0" encoding="utf-8"?>
+<p:notes xmlns:a="http://schemas.openxmlformats.org/drawingml/2006/main" xmlns:r="http://schemas.openxmlformats.org/officeDocument/2006/relationships" xmlns:p="http://schemas.openxmlformats.org/presentationml/2006/main">
+  <p:cSld>
+    <p:spTree>
+      <p:nvGrpSpPr>
+        <p:cNvPr id="1" name=""/>
+        <p:cNvGrpSpPr/>
+        <p:nvPr/>
+      </p:nvGrpSpPr>
+      <p:grpSpPr>
+        <a:xfrm>
+          <a:off x="0" y="0"/>
+          <a:ext cx="0" cy="0"/>
+          <a:chOff x="0" y="0"/>
+          <a:chExt cx="0" cy="0"/>
+        </a:xfrm>
+      </p:grpSpPr>
+      <p:sp>
+        <p:nvSpPr>
+          <p:cNvPr id="2" name="Slide Image Placeholder 1"/>
+          <p:cNvSpPr>
+            <a:spLocks noGrp="1" noRot="1" noChangeAspect="1"/>
+          </p:cNvSpPr>
+          <p:nvPr>
+            <p:ph type="sldImg"/>
+          </p:nvPr>
+        </p:nvSpPr>
+        <p:spPr/>
+      </p:sp>
+      <p:sp>
+        <p:nvSpPr>
+          <p:cNvPr id="3" name="Notes Placeholder 2"/>
+          <p:cNvSpPr>
+            <a:spLocks noGrp="1"/>
+          </p:cNvSpPr>
+          <p:nvPr>
+            <p:ph type="body" idx="1"/>
+          </p:nvPr>
+        </p:nvSpPr>
+        <p:spPr/>
+        <p:txBody>
+          <a:bodyPr/>
+          <a:lstStyle/>
+          <a:p>
+            <a:r>
+              <a:rPr lang="en-US" dirty="0"/>
+              <a:t>NOTE: </a:t>
+            </a:r>
+            <a:r>
+              <a:rPr lang="en-US"/>
+              <a:t>from run saved to model_xgboost_2023_03_12_18_03_47.pkl</a:t>
+            </a:r>
+          </a:p>
+          <a:p>
+            <a:endParaRPr lang="en-US" dirty="0"/>
+          </a:p>
+        </p:txBody>
+      </p:sp>
+      <p:sp>
+        <p:nvSpPr>
+          <p:cNvPr id="4" name="Slide Number Placeholder 3"/>
+          <p:cNvSpPr>
+            <a:spLocks noGrp="1"/>
+          </p:cNvSpPr>
+          <p:nvPr>
+            <p:ph type="sldNum" sz="quarter" idx="5"/>
+          </p:nvPr>
+        </p:nvSpPr>
+        <p:spPr/>
+        <p:txBody>
+          <a:bodyPr/>
+          <a:lstStyle/>
+          <a:p>
+            <a:fld id="{801F8ACE-8AB6-C746-898D-0B2E8626E4DD}" type="slidenum">
+              <a:rPr lang="en-US" smtClean="0"/>
+              <a:t>24</a:t>
+            </a:fld>
+            <a:endParaRPr lang="en-US"/>
+          </a:p>
+        </p:txBody>
+      </p:sp>
+    </p:spTree>
+    <p:extLst>
+      <p:ext uri="{BB962C8B-B14F-4D97-AF65-F5344CB8AC3E}">
+        <p14:creationId xmlns:p14="http://schemas.microsoft.com/office/powerpoint/2010/main" val="1361920933"/>
       </p:ext>
     </p:extLst>
   </p:cSld>
@@ -7855,10 +8033,10 @@
       </p:sp>
       <p:pic>
         <p:nvPicPr>
-          <p:cNvPr id="1026" name="Picture 2">
-            <a:extLst>
-              <a:ext uri="{FF2B5EF4-FFF2-40B4-BE49-F238E27FC236}">
-                <a16:creationId xmlns:a16="http://schemas.microsoft.com/office/drawing/2014/main" id="{754CE3A1-1F2C-55AF-636A-ABE7C94BBBCE}"/>
+          <p:cNvPr id="1028" name="Picture 4">
+            <a:extLst>
+              <a:ext uri="{FF2B5EF4-FFF2-40B4-BE49-F238E27FC236}">
+                <a16:creationId xmlns:a16="http://schemas.microsoft.com/office/drawing/2014/main" id="{32193244-F731-C3E5-A562-A02BF1108917}"/>
               </a:ext>
             </a:extLst>
           </p:cNvPr>
@@ -7868,7 +8046,7 @@
           <p:nvPr/>
         </p:nvPicPr>
         <p:blipFill>
-          <a:blip r:embed="rId2">
+          <a:blip r:embed="rId3">
             <a:extLst>
               <a:ext uri="{28A0092B-C50C-407E-A947-70E740481C1C}">
                 <a14:useLocalDpi xmlns:a14="http://schemas.microsoft.com/office/drawing/2010/main" val="0"/>
@@ -7882,8 +8060,8 @@
         </p:blipFill>
         <p:spPr bwMode="auto">
           <a:xfrm>
-            <a:off x="4829908" y="593367"/>
-            <a:ext cx="6946492" cy="4883919"/>
+            <a:off x="4479234" y="0"/>
+            <a:ext cx="7712765" cy="5422667"/>
           </a:xfrm>
           <a:prstGeom prst="rect">
             <a:avLst/>
@@ -7981,10 +8159,46 @@
           <a:bodyPr/>
           <a:lstStyle/>
           <a:p>
-            <a:endParaRPr lang="en-US"/>
-          </a:p>
-        </p:txBody>
-      </p:sp>
+            <a:pPr marL="152396" indent="0">
+              <a:buNone/>
+            </a:pPr>
+            <a:r>
+              <a:rPr lang="en-US" dirty="0"/>
+              <a:t>TODO: describe this.</a:t>
+            </a:r>
+          </a:p>
+        </p:txBody>
+      </p:sp>
+      <p:pic>
+        <p:nvPicPr>
+          <p:cNvPr id="6" name="Picture 5">
+            <a:extLst>
+              <a:ext uri="{FF2B5EF4-FFF2-40B4-BE49-F238E27FC236}">
+                <a16:creationId xmlns:a16="http://schemas.microsoft.com/office/drawing/2014/main" id="{C7735F82-B18D-987A-DD69-B12C2ED876B5}"/>
+              </a:ext>
+            </a:extLst>
+          </p:cNvPr>
+          <p:cNvPicPr>
+            <a:picLocks noChangeAspect="1"/>
+          </p:cNvPicPr>
+          <p:nvPr/>
+        </p:nvPicPr>
+        <p:blipFill>
+          <a:blip r:embed="rId2"/>
+          <a:stretch>
+            <a:fillRect/>
+          </a:stretch>
+        </p:blipFill>
+        <p:spPr>
+          <a:xfrm>
+            <a:off x="6096000" y="1536633"/>
+            <a:ext cx="5346700" cy="2387600"/>
+          </a:xfrm>
+          <a:prstGeom prst="rect">
+            <a:avLst/>
+          </a:prstGeom>
+        </p:spPr>
+      </p:pic>
     </p:spTree>
     <p:extLst>
       <p:ext uri="{BB962C8B-B14F-4D97-AF65-F5344CB8AC3E}">
@@ -8061,15 +8275,75 @@
             <p:ph type="body" idx="1"/>
           </p:nvPr>
         </p:nvSpPr>
-        <p:spPr/>
+        <p:spPr>
+          <a:xfrm>
+            <a:off x="415600" y="1536633"/>
+            <a:ext cx="3904609" cy="4555200"/>
+          </a:xfrm>
+        </p:spPr>
         <p:txBody>
           <a:bodyPr/>
           <a:lstStyle/>
           <a:p>
-            <a:endParaRPr lang="en-US"/>
-          </a:p>
-        </p:txBody>
-      </p:sp>
+            <a:r>
+              <a:rPr lang="en-US" dirty="0" err="1"/>
+              <a:t>Learning_rate</a:t>
+            </a:r>
+            <a:r>
+              <a:rPr lang="en-US" dirty="0"/>
+              <a:t> = 0.1</a:t>
+            </a:r>
+          </a:p>
+          <a:p>
+            <a:r>
+              <a:rPr lang="en-US" dirty="0"/>
+              <a:t>RMSE of train data: 3148.63</a:t>
+            </a:r>
+          </a:p>
+          <a:p>
+            <a:r>
+              <a:rPr lang="en-US" dirty="0"/>
+              <a:t>RMSE of test data: 5077.03</a:t>
+            </a:r>
+          </a:p>
+          <a:p>
+            <a:r>
+              <a:rPr lang="en-US" dirty="0"/>
+              <a:t>R2 Score: 0.872617141105975</a:t>
+            </a:r>
+          </a:p>
+        </p:txBody>
+      </p:sp>
+      <p:pic>
+        <p:nvPicPr>
+          <p:cNvPr id="4" name="Picture 3">
+            <a:extLst>
+              <a:ext uri="{FF2B5EF4-FFF2-40B4-BE49-F238E27FC236}">
+                <a16:creationId xmlns:a16="http://schemas.microsoft.com/office/drawing/2014/main" id="{867B4A05-12C1-82A5-8850-BBEC259F32E1}"/>
+              </a:ext>
+            </a:extLst>
+          </p:cNvPr>
+          <p:cNvPicPr>
+            <a:picLocks noChangeAspect="1"/>
+          </p:cNvPicPr>
+          <p:nvPr/>
+        </p:nvPicPr>
+        <p:blipFill>
+          <a:blip r:embed="rId3"/>
+          <a:stretch>
+            <a:fillRect/>
+          </a:stretch>
+        </p:blipFill>
+        <p:spPr>
+          <a:xfrm>
+            <a:off x="4656759" y="98286"/>
+            <a:ext cx="7251700" cy="5283200"/>
+          </a:xfrm>
+          <a:prstGeom prst="rect">
+            <a:avLst/>
+          </a:prstGeom>
+        </p:spPr>
+      </p:pic>
     </p:spTree>
     <p:extLst>
       <p:ext uri="{BB962C8B-B14F-4D97-AF65-F5344CB8AC3E}">
@@ -8151,7 +8425,10 @@
           <a:bodyPr/>
           <a:lstStyle/>
           <a:p>
-            <a:endParaRPr lang="en-US"/>
+            <a:r>
+              <a:rPr lang="en-US" dirty="0"/>
+              <a:t>TODO: write the summary.</a:t>
+            </a:r>
           </a:p>
         </p:txBody>
       </p:sp>

</xml_diff>

<commit_message>
Cleanup notebooks and update readme and presentation
</commit_message>
<xml_diff>
--- a/DSCI521_rna63_final_project_pres.pptx
+++ b/DSCI521_rna63_final_project_pres.pptx
@@ -616,6 +616,202 @@
 </p:notes>
 </file>
 
+<file path=ppt/notesSlides/notesSlide10.xml><?xml version="1.0" encoding="utf-8"?>
+<p:notes xmlns:a="http://schemas.openxmlformats.org/drawingml/2006/main" xmlns:r="http://schemas.openxmlformats.org/officeDocument/2006/relationships" xmlns:p="http://schemas.openxmlformats.org/presentationml/2006/main">
+  <p:cSld>
+    <p:spTree>
+      <p:nvGrpSpPr>
+        <p:cNvPr id="1" name=""/>
+        <p:cNvGrpSpPr/>
+        <p:nvPr/>
+      </p:nvGrpSpPr>
+      <p:grpSpPr>
+        <a:xfrm>
+          <a:off x="0" y="0"/>
+          <a:ext cx="0" cy="0"/>
+          <a:chOff x="0" y="0"/>
+          <a:chExt cx="0" cy="0"/>
+        </a:xfrm>
+      </p:grpSpPr>
+      <p:sp>
+        <p:nvSpPr>
+          <p:cNvPr id="2" name="Slide Image Placeholder 1"/>
+          <p:cNvSpPr>
+            <a:spLocks noGrp="1" noRot="1" noChangeAspect="1"/>
+          </p:cNvSpPr>
+          <p:nvPr>
+            <p:ph type="sldImg"/>
+          </p:nvPr>
+        </p:nvSpPr>
+        <p:spPr/>
+      </p:sp>
+      <p:sp>
+        <p:nvSpPr>
+          <p:cNvPr id="3" name="Notes Placeholder 2"/>
+          <p:cNvSpPr>
+            <a:spLocks noGrp="1"/>
+          </p:cNvSpPr>
+          <p:nvPr>
+            <p:ph type="body" idx="1"/>
+          </p:nvPr>
+        </p:nvSpPr>
+        <p:spPr/>
+        <p:txBody>
+          <a:bodyPr/>
+          <a:lstStyle/>
+          <a:p>
+            <a:r>
+              <a:rPr lang="en-US" dirty="0"/>
+              <a:t>Saving model to model_xgboost_2023_03_13_16_35_43.pkl</a:t>
+            </a:r>
+          </a:p>
+          <a:p>
+            <a:endParaRPr lang="en-US" dirty="0"/>
+          </a:p>
+          <a:p>
+            <a:endParaRPr lang="en-US" dirty="0"/>
+          </a:p>
+          <a:p>
+            <a:r>
+              <a:rPr lang="en-US" dirty="0"/>
+              <a:t>The one hot encoding version performs a bit better than PCA + </a:t>
+            </a:r>
+            <a:r>
+              <a:rPr lang="en-US" dirty="0" err="1"/>
+              <a:t>LeaveOneOut</a:t>
+            </a:r>
+            <a:r>
+              <a:rPr lang="en-US" dirty="0"/>
+              <a:t>, but it uses much more memory and </a:t>
+            </a:r>
+            <a:r>
+              <a:rPr lang="en-US"/>
+              <a:t>is slower.</a:t>
+            </a:r>
+            <a:endParaRPr lang="en-US" dirty="0"/>
+          </a:p>
+        </p:txBody>
+      </p:sp>
+      <p:sp>
+        <p:nvSpPr>
+          <p:cNvPr id="4" name="Slide Number Placeholder 3"/>
+          <p:cNvSpPr>
+            <a:spLocks noGrp="1"/>
+          </p:cNvSpPr>
+          <p:nvPr>
+            <p:ph type="sldNum" sz="quarter" idx="5"/>
+          </p:nvPr>
+        </p:nvSpPr>
+        <p:spPr/>
+        <p:txBody>
+          <a:bodyPr/>
+          <a:lstStyle/>
+          <a:p>
+            <a:fld id="{801F8ACE-8AB6-C746-898D-0B2E8626E4DD}" type="slidenum">
+              <a:rPr lang="en-US" smtClean="0"/>
+              <a:t>25</a:t>
+            </a:fld>
+            <a:endParaRPr lang="en-US"/>
+          </a:p>
+        </p:txBody>
+      </p:sp>
+    </p:spTree>
+    <p:extLst>
+      <p:ext uri="{BB962C8B-B14F-4D97-AF65-F5344CB8AC3E}">
+        <p14:creationId xmlns:p14="http://schemas.microsoft.com/office/powerpoint/2010/main" val="1361920933"/>
+      </p:ext>
+    </p:extLst>
+  </p:cSld>
+  <p:clrMapOvr>
+    <a:masterClrMapping/>
+  </p:clrMapOvr>
+</p:notes>
+</file>
+
+<file path=ppt/notesSlides/notesSlide11.xml><?xml version="1.0" encoding="utf-8"?>
+<p:notes xmlns:a="http://schemas.openxmlformats.org/drawingml/2006/main" xmlns:r="http://schemas.openxmlformats.org/officeDocument/2006/relationships" xmlns:p="http://schemas.openxmlformats.org/presentationml/2006/main">
+  <p:cSld>
+    <p:spTree>
+      <p:nvGrpSpPr>
+        <p:cNvPr id="1" name=""/>
+        <p:cNvGrpSpPr/>
+        <p:nvPr/>
+      </p:nvGrpSpPr>
+      <p:grpSpPr>
+        <a:xfrm>
+          <a:off x="0" y="0"/>
+          <a:ext cx="0" cy="0"/>
+          <a:chOff x="0" y="0"/>
+          <a:chExt cx="0" cy="0"/>
+        </a:xfrm>
+      </p:grpSpPr>
+      <p:sp>
+        <p:nvSpPr>
+          <p:cNvPr id="2" name="Slide Image Placeholder 1"/>
+          <p:cNvSpPr>
+            <a:spLocks noGrp="1" noRot="1" noChangeAspect="1"/>
+          </p:cNvSpPr>
+          <p:nvPr>
+            <p:ph type="sldImg"/>
+          </p:nvPr>
+        </p:nvSpPr>
+        <p:spPr/>
+      </p:sp>
+      <p:sp>
+        <p:nvSpPr>
+          <p:cNvPr id="3" name="Notes Placeholder 2"/>
+          <p:cNvSpPr>
+            <a:spLocks noGrp="1"/>
+          </p:cNvSpPr>
+          <p:nvPr>
+            <p:ph type="body" idx="1"/>
+          </p:nvPr>
+        </p:nvSpPr>
+        <p:spPr/>
+        <p:txBody>
+          <a:bodyPr/>
+          <a:lstStyle/>
+          <a:p>
+            <a:endParaRPr lang="en-US" dirty="0"/>
+          </a:p>
+        </p:txBody>
+      </p:sp>
+      <p:sp>
+        <p:nvSpPr>
+          <p:cNvPr id="4" name="Slide Number Placeholder 3"/>
+          <p:cNvSpPr>
+            <a:spLocks noGrp="1"/>
+          </p:cNvSpPr>
+          <p:nvPr>
+            <p:ph type="sldNum" sz="quarter" idx="5"/>
+          </p:nvPr>
+        </p:nvSpPr>
+        <p:spPr/>
+        <p:txBody>
+          <a:bodyPr/>
+          <a:lstStyle/>
+          <a:p>
+            <a:fld id="{801F8ACE-8AB6-C746-898D-0B2E8626E4DD}" type="slidenum">
+              <a:rPr lang="en-US" smtClean="0"/>
+              <a:t>27</a:t>
+            </a:fld>
+            <a:endParaRPr lang="en-US"/>
+          </a:p>
+        </p:txBody>
+      </p:sp>
+    </p:spTree>
+    <p:extLst>
+      <p:ext uri="{BB962C8B-B14F-4D97-AF65-F5344CB8AC3E}">
+        <p14:creationId xmlns:p14="http://schemas.microsoft.com/office/powerpoint/2010/main" val="2825924885"/>
+      </p:ext>
+    </p:extLst>
+  </p:cSld>
+  <p:clrMapOvr>
+    <a:masterClrMapping/>
+  </p:clrMapOvr>
+</p:notes>
+</file>
+
 <file path=ppt/notesSlides/notesSlide2.xml><?xml version="1.0" encoding="utf-8"?>
 <p:notes xmlns:a="http://schemas.openxmlformats.org/drawingml/2006/main" xmlns:r="http://schemas.openxmlformats.org/officeDocument/2006/relationships" xmlns:p="http://schemas.openxmlformats.org/presentationml/2006/main" showMasterSp="0" showMasterPhAnim="0">
   <p:cSld>
@@ -942,102 +1138,7 @@
           <a:bodyPr/>
           <a:lstStyle/>
           <a:p>
-            <a:r>
-              <a:rPr lang="en-US" b="1"/>
-              <a:t>Selection of Dataset for Continued Analysis</a:t>
-            </a:r>
-          </a:p>
-          <a:p>
-            <a:r>
-              <a:rPr lang="en-US"/>
-              <a:t>The Carvana dataset provides very few columns(</a:t>
-            </a:r>
-            <a:r>
-              <a:rPr lang="en-US" err="1"/>
-              <a:t>Name,Year,Miles,Price</a:t>
-            </a:r>
-            <a:r>
-              <a:rPr lang="en-US"/>
-              <a:t>), and a much smaller set of samples than the other datasets.</a:t>
-            </a:r>
-          </a:p>
-          <a:p>
-            <a:r>
-              <a:rPr lang="en-US"/>
-              <a:t>The CarGurus dataset has the largest rows and the most feature columns </a:t>
-            </a:r>
-            <a:r>
-              <a:rPr lang="en-US" err="1"/>
-              <a:t>avaiable</a:t>
-            </a:r>
-            <a:r>
-              <a:rPr lang="en-US"/>
-              <a:t>(at 66). However, it only provides location data as zip code, longitude and latitude, which would make analyzing the effect on price from different areas more difficult since would prefer to just compare prices across US states.</a:t>
-            </a:r>
-          </a:p>
-          <a:p>
-            <a:r>
-              <a:rPr lang="en-US"/>
-              <a:t>Both the Craigslist and Carvana datasets have some data cleaning work required to remove outliers as well as </a:t>
-            </a:r>
-            <a:r>
-              <a:rPr lang="en-US" err="1"/>
-              <a:t>signficiant</a:t>
-            </a:r>
-            <a:r>
-              <a:rPr lang="en-US"/>
-              <a:t> numbers of null values.</a:t>
-            </a:r>
-          </a:p>
-          <a:p>
-            <a:r>
-              <a:rPr lang="en-US"/>
-              <a:t>The TrueCar dataset is by far the cleanest dataset, having no null values, and more </a:t>
-            </a:r>
-            <a:r>
-              <a:rPr lang="en-US" err="1"/>
-              <a:t>columsn</a:t>
-            </a:r>
-            <a:r>
-              <a:rPr lang="en-US"/>
-              <a:t> than the Carvana dataset. However, the columns available would only allow some of the investigations we have in mind. It provides </a:t>
-            </a:r>
-            <a:r>
-              <a:rPr lang="en-US" err="1"/>
-              <a:t>Price,Year,Mileage,City,State,Vin,Make,Model</a:t>
-            </a:r>
-            <a:r>
-              <a:rPr lang="en-US"/>
-              <a:t>. Vin is of little use without advanced preprocessing based on VIN coding, so the only advantage in features it </a:t>
-            </a:r>
-            <a:r>
-              <a:rPr lang="en-US" err="1"/>
-              <a:t>providese</a:t>
-            </a:r>
-            <a:r>
-              <a:rPr lang="en-US"/>
-              <a:t> to the Carvana dataset are from location based on City, State.</a:t>
-            </a:r>
-          </a:p>
-          <a:p>
-            <a:r>
-              <a:rPr lang="en-US"/>
-              <a:t>The Craigslist dataset is most amenable to the investigations planned in terms of the columns available. This is because it includes a column for the state location, the same basic make, model, price, mileage and year information common to all the datasets, but also has a number of additional feature columns which may affect price. The complete columns are: id,url,region,region_url,price,year,manufacturer,model,condition,cylinders, fuel,odometer,title_status,transmission,VIN,drive,size,type,paint_color,image_url, </a:t>
-            </a:r>
-            <a:r>
-              <a:rPr lang="en-US" err="1"/>
-              <a:t>description,county,state,lat,long,posting_date</a:t>
-            </a:r>
-            <a:endParaRPr lang="en-US"/>
-          </a:p>
-          <a:p>
-            <a:r>
-              <a:rPr lang="en-US"/>
-              <a:t>The rest of our discussion will focus on the Craigslist dataset specifically.</a:t>
-            </a:r>
-          </a:p>
-          <a:p>
-            <a:endParaRPr lang="en-US"/>
+            <a:endParaRPr lang="en-US" dirty="0"/>
           </a:p>
         </p:txBody>
       </p:sp>
@@ -1058,7 +1159,7 @@
           <a:p>
             <a:fld id="{801F8ACE-8AB6-C746-898D-0B2E8626E4DD}" type="slidenum">
               <a:rPr lang="en-US" smtClean="0"/>
-              <a:t>5</a:t>
+              <a:t>4</a:t>
             </a:fld>
             <a:endParaRPr lang="en-US"/>
           </a:p>
@@ -1067,7 +1168,7 @@
     </p:spTree>
     <p:extLst>
       <p:ext uri="{BB962C8B-B14F-4D97-AF65-F5344CB8AC3E}">
-        <p14:creationId xmlns:p14="http://schemas.microsoft.com/office/powerpoint/2010/main" val="443626585"/>
+        <p14:creationId xmlns:p14="http://schemas.microsoft.com/office/powerpoint/2010/main" val="3103034763"/>
       </p:ext>
     </p:extLst>
   </p:cSld>
@@ -1122,9 +1223,101 @@
           <a:lstStyle/>
           <a:p>
             <a:r>
+              <a:rPr lang="en-US" b="1"/>
+              <a:t>Selection of Dataset for Continued Analysis</a:t>
+            </a:r>
+          </a:p>
+          <a:p>
+            <a:r>
               <a:rPr lang="en-US"/>
-              <a:t>This is on the dataset after cleaning and imputing missing values.</a:t>
-            </a:r>
+              <a:t>The Carvana dataset provides very few columns(</a:t>
+            </a:r>
+            <a:r>
+              <a:rPr lang="en-US" err="1"/>
+              <a:t>Name,Year,Miles,Price</a:t>
+            </a:r>
+            <a:r>
+              <a:rPr lang="en-US"/>
+              <a:t>), and a much smaller set of samples than the other datasets.</a:t>
+            </a:r>
+          </a:p>
+          <a:p>
+            <a:r>
+              <a:rPr lang="en-US"/>
+              <a:t>The CarGurus dataset has the largest rows and the most feature columns </a:t>
+            </a:r>
+            <a:r>
+              <a:rPr lang="en-US" err="1"/>
+              <a:t>avaiable</a:t>
+            </a:r>
+            <a:r>
+              <a:rPr lang="en-US"/>
+              <a:t>(at 66). However, it only provides location data as zip code, longitude and latitude, which would make analyzing the effect on price from different areas more difficult since would prefer to just compare prices across US states.</a:t>
+            </a:r>
+          </a:p>
+          <a:p>
+            <a:r>
+              <a:rPr lang="en-US"/>
+              <a:t>Both the Craigslist and Carvana datasets have some data cleaning work required to remove outliers as well as </a:t>
+            </a:r>
+            <a:r>
+              <a:rPr lang="en-US" err="1"/>
+              <a:t>signficiant</a:t>
+            </a:r>
+            <a:r>
+              <a:rPr lang="en-US"/>
+              <a:t> numbers of null values.</a:t>
+            </a:r>
+          </a:p>
+          <a:p>
+            <a:r>
+              <a:rPr lang="en-US"/>
+              <a:t>The TrueCar dataset is by far the cleanest dataset, having no null values, and more </a:t>
+            </a:r>
+            <a:r>
+              <a:rPr lang="en-US" err="1"/>
+              <a:t>columsn</a:t>
+            </a:r>
+            <a:r>
+              <a:rPr lang="en-US"/>
+              <a:t> than the Carvana dataset. However, the columns available would only allow some of the investigations we have in mind. It provides </a:t>
+            </a:r>
+            <a:r>
+              <a:rPr lang="en-US" err="1"/>
+              <a:t>Price,Year,Mileage,City,State,Vin,Make,Model</a:t>
+            </a:r>
+            <a:r>
+              <a:rPr lang="en-US"/>
+              <a:t>. Vin is of little use without advanced preprocessing based on VIN coding, so the only advantage in features it </a:t>
+            </a:r>
+            <a:r>
+              <a:rPr lang="en-US" err="1"/>
+              <a:t>providese</a:t>
+            </a:r>
+            <a:r>
+              <a:rPr lang="en-US"/>
+              <a:t> to the Carvana dataset are from location based on City, State.</a:t>
+            </a:r>
+          </a:p>
+          <a:p>
+            <a:r>
+              <a:rPr lang="en-US"/>
+              <a:t>The Craigslist dataset is most amenable to the investigations planned in terms of the columns available. This is because it includes a column for the state location, the same basic make, model, price, mileage and year information common to all the datasets, but also has a number of additional feature columns which may affect price. The complete columns are: id,url,region,region_url,price,year,manufacturer,model,condition,cylinders, fuel,odometer,title_status,transmission,VIN,drive,size,type,paint_color,image_url, </a:t>
+            </a:r>
+            <a:r>
+              <a:rPr lang="en-US" err="1"/>
+              <a:t>description,county,state,lat,long,posting_date</a:t>
+            </a:r>
+            <a:endParaRPr lang="en-US"/>
+          </a:p>
+          <a:p>
+            <a:r>
+              <a:rPr lang="en-US"/>
+              <a:t>The rest of our discussion will focus on the Craigslist dataset specifically.</a:t>
+            </a:r>
+          </a:p>
+          <a:p>
+            <a:endParaRPr lang="en-US"/>
           </a:p>
         </p:txBody>
       </p:sp>
@@ -1145,7 +1338,7 @@
           <a:p>
             <a:fld id="{801F8ACE-8AB6-C746-898D-0B2E8626E4DD}" type="slidenum">
               <a:rPr lang="en-US" smtClean="0"/>
-              <a:t>19</a:t>
+              <a:t>5</a:t>
             </a:fld>
             <a:endParaRPr lang="en-US"/>
           </a:p>
@@ -1154,7 +1347,7 @@
     </p:spTree>
     <p:extLst>
       <p:ext uri="{BB962C8B-B14F-4D97-AF65-F5344CB8AC3E}">
-        <p14:creationId xmlns:p14="http://schemas.microsoft.com/office/powerpoint/2010/main" val="2751561161"/>
+        <p14:creationId xmlns:p14="http://schemas.microsoft.com/office/powerpoint/2010/main" val="443626585"/>
       </p:ext>
     </p:extLst>
   </p:cSld>
@@ -1208,10 +1401,7 @@
           <a:bodyPr/>
           <a:lstStyle/>
           <a:p>
-            <a:r>
-              <a:rPr lang="en-US"/>
-              <a:t>TODO: reference for R2 score.</a:t>
-            </a:r>
+            <a:endParaRPr lang="en-US" dirty="0"/>
           </a:p>
         </p:txBody>
       </p:sp>
@@ -1232,7 +1422,7 @@
           <a:p>
             <a:fld id="{801F8ACE-8AB6-C746-898D-0B2E8626E4DD}" type="slidenum">
               <a:rPr lang="en-US" smtClean="0"/>
-              <a:t>22</a:t>
+              <a:t>17</a:t>
             </a:fld>
             <a:endParaRPr lang="en-US"/>
           </a:p>
@@ -1241,7 +1431,7 @@
     </p:spTree>
     <p:extLst>
       <p:ext uri="{BB962C8B-B14F-4D97-AF65-F5344CB8AC3E}">
-        <p14:creationId xmlns:p14="http://schemas.microsoft.com/office/powerpoint/2010/main" val="1264112754"/>
+        <p14:creationId xmlns:p14="http://schemas.microsoft.com/office/powerpoint/2010/main" val="2864793395"/>
       </p:ext>
     </p:extLst>
   </p:cSld>
@@ -1295,7 +1485,10 @@
           <a:bodyPr/>
           <a:lstStyle/>
           <a:p>
-            <a:endParaRPr lang="en-US" dirty="0"/>
+            <a:r>
+              <a:rPr lang="en-US"/>
+              <a:t>This is on the dataset after cleaning and imputing missing values.</a:t>
+            </a:r>
           </a:p>
         </p:txBody>
       </p:sp>
@@ -1316,7 +1509,7 @@
           <a:p>
             <a:fld id="{801F8ACE-8AB6-C746-898D-0B2E8626E4DD}" type="slidenum">
               <a:rPr lang="en-US" smtClean="0"/>
-              <a:t>23</a:t>
+              <a:t>19</a:t>
             </a:fld>
             <a:endParaRPr lang="en-US"/>
           </a:p>
@@ -1325,7 +1518,7 @@
     </p:spTree>
     <p:extLst>
       <p:ext uri="{BB962C8B-B14F-4D97-AF65-F5344CB8AC3E}">
-        <p14:creationId xmlns:p14="http://schemas.microsoft.com/office/powerpoint/2010/main" val="3300526282"/>
+        <p14:creationId xmlns:p14="http://schemas.microsoft.com/office/powerpoint/2010/main" val="2751561161"/>
       </p:ext>
     </p:extLst>
   </p:cSld>
@@ -1381,7 +1574,23 @@
           <a:p>
             <a:r>
               <a:rPr lang="en-US" dirty="0"/>
-              <a:t>Saving model to model_xgboost_2023_03_13_16_35_43.pkl</a:t>
+              <a:t>https://</a:t>
+            </a:r>
+            <a:r>
+              <a:rPr lang="en-US" dirty="0" err="1"/>
+              <a:t>en.wikipedia.org</a:t>
+            </a:r>
+            <a:r>
+              <a:rPr lang="en-US" dirty="0"/>
+              <a:t>/wiki/</a:t>
+            </a:r>
+            <a:r>
+              <a:rPr lang="en-US" dirty="0" err="1"/>
+              <a:t>Coefficient_of_determination</a:t>
+            </a:r>
+            <a:r>
+              <a:rPr lang="en-US" dirty="0"/>
+              <a:t> </a:t>
             </a:r>
           </a:p>
         </p:txBody>
@@ -1403,7 +1612,7 @@
           <a:p>
             <a:fld id="{801F8ACE-8AB6-C746-898D-0B2E8626E4DD}" type="slidenum">
               <a:rPr lang="en-US" smtClean="0"/>
-              <a:t>25</a:t>
+              <a:t>22</a:t>
             </a:fld>
             <a:endParaRPr lang="en-US"/>
           </a:p>
@@ -1412,7 +1621,7 @@
     </p:spTree>
     <p:extLst>
       <p:ext uri="{BB962C8B-B14F-4D97-AF65-F5344CB8AC3E}">
-        <p14:creationId xmlns:p14="http://schemas.microsoft.com/office/powerpoint/2010/main" val="1361920933"/>
+        <p14:creationId xmlns:p14="http://schemas.microsoft.com/office/powerpoint/2010/main" val="1264112754"/>
       </p:ext>
     </p:extLst>
   </p:cSld>
@@ -1466,7 +1675,7 @@
           <a:bodyPr/>
           <a:lstStyle/>
           <a:p>
-            <a:endParaRPr lang="en-US"/>
+            <a:endParaRPr lang="en-US" dirty="0"/>
           </a:p>
         </p:txBody>
       </p:sp>
@@ -1487,7 +1696,7 @@
           <a:p>
             <a:fld id="{801F8ACE-8AB6-C746-898D-0B2E8626E4DD}" type="slidenum">
               <a:rPr lang="en-US" smtClean="0"/>
-              <a:t>27</a:t>
+              <a:t>23</a:t>
             </a:fld>
             <a:endParaRPr lang="en-US"/>
           </a:p>
@@ -1496,7 +1705,7 @@
     </p:spTree>
     <p:extLst>
       <p:ext uri="{BB962C8B-B14F-4D97-AF65-F5344CB8AC3E}">
-        <p14:creationId xmlns:p14="http://schemas.microsoft.com/office/powerpoint/2010/main" val="2825924885"/>
+        <p14:creationId xmlns:p14="http://schemas.microsoft.com/office/powerpoint/2010/main" val="3300526282"/>
       </p:ext>
     </p:extLst>
   </p:cSld>
@@ -6448,8 +6657,8 @@
           <a:lstStyle/>
           <a:p>
             <a:r>
-              <a:rPr lang="en-US"/>
-              <a:t>Numeric Features - Histogram</a:t>
+              <a:rPr lang="en-US" dirty="0"/>
+              <a:t>Numeric Features – Histogram (raw data)</a:t>
             </a:r>
           </a:p>
         </p:txBody>
@@ -6538,8 +6747,8 @@
           <a:lstStyle/>
           <a:p>
             <a:r>
-              <a:rPr lang="en-US"/>
-              <a:t>Numeric Features - Box Plots</a:t>
+              <a:rPr lang="en-US" dirty="0"/>
+              <a:t>Numeric Features - Box Plots (raw data)</a:t>
             </a:r>
           </a:p>
         </p:txBody>
@@ -7209,33 +7418,44 @@
           </a:xfrm>
         </p:spPr>
         <p:txBody>
-          <a:bodyPr/>
-          <a:lstStyle/>
-          <a:p>
-            <a:r>
-              <a:rPr lang="en-US"/>
+          <a:bodyPr>
+            <a:normAutofit fontScale="92500" lnSpcReduction="10000"/>
+          </a:bodyPr>
+          <a:lstStyle/>
+          <a:p>
+            <a:r>
+              <a:rPr lang="en-US" dirty="0"/>
               <a:t>Imputed missing values</a:t>
             </a:r>
           </a:p>
           <a:p>
             <a:pPr lvl="1"/>
             <a:r>
-              <a:rPr lang="en-US"/>
+              <a:rPr lang="en-US" dirty="0"/>
               <a:t>Categorical mode</a:t>
             </a:r>
           </a:p>
           <a:p>
             <a:pPr lvl="1"/>
             <a:r>
-              <a:rPr lang="en-US"/>
+              <a:rPr lang="en-US" dirty="0"/>
               <a:t>Numerical: mean</a:t>
             </a:r>
           </a:p>
           <a:p>
             <a:r>
-              <a:rPr lang="en-US"/>
+              <a:rPr lang="en-US" dirty="0"/>
               <a:t>Drop rows missing price</a:t>
             </a:r>
+          </a:p>
+          <a:p>
+            <a:r>
+              <a:rPr lang="en-US" dirty="0"/>
+              <a:t>Cleaned dataset contains 393, 909 rows (vs 426,880 original)</a:t>
+            </a:r>
+          </a:p>
+          <a:p>
+            <a:endParaRPr lang="en-US" dirty="0"/>
           </a:p>
         </p:txBody>
       </p:sp>
@@ -7254,7 +7474,7 @@
           <p:nvPr/>
         </p:nvPicPr>
         <p:blipFill>
-          <a:blip r:embed="rId2">
+          <a:blip r:embed="rId3">
             <a:extLst>
               <a:ext uri="{28A0092B-C50C-407E-A947-70E740481C1C}">
                 <a14:useLocalDpi xmlns:a14="http://schemas.microsoft.com/office/drawing/2010/main" val="0"/>
@@ -7447,7 +7667,7 @@
           <p:nvPr/>
         </p:nvPicPr>
         <p:blipFill>
-          <a:blip r:embed="rId3">
+          <a:blip r:embed="rId4">
             <a:extLst>
               <a:ext uri="{28A0092B-C50C-407E-A947-70E740481C1C}">
                 <a14:useLocalDpi xmlns:a14="http://schemas.microsoft.com/office/drawing/2010/main" val="0"/>
@@ -8200,70 +8420,92 @@
           <a:lstStyle/>
           <a:p>
             <a:r>
-              <a:rPr lang="en-US"/>
-              <a:t>We examined multiple different types of regression models for predicting the listing price from the other columns in the data set.</a:t>
-            </a:r>
-          </a:p>
-          <a:p>
-            <a:r>
-              <a:rPr lang="en-US"/>
-              <a:t>For a baseline we used linear, Ridge, and Lasso regression models.</a:t>
-            </a:r>
-          </a:p>
-          <a:p>
-            <a:r>
-              <a:rPr lang="en-US"/>
-              <a:t>We also compared a random forest model</a:t>
-            </a:r>
-          </a:p>
-          <a:p>
-            <a:r>
-              <a:rPr lang="en-US"/>
-              <a:t>Finally, we added an </a:t>
-            </a:r>
-            <a:r>
-              <a:rPr lang="en-US" err="1"/>
+              <a:rPr lang="en-US" dirty="0"/>
+              <a:t>Examined multiple types of regression models for predicting listing price.</a:t>
+            </a:r>
+          </a:p>
+          <a:p>
+            <a:r>
+              <a:rPr lang="en-US" dirty="0"/>
+              <a:t>Used linear, Ridge, and Lasso regression models for baseline</a:t>
+            </a:r>
+          </a:p>
+          <a:p>
+            <a:r>
+              <a:rPr lang="en-US" dirty="0"/>
+              <a:t>Also compared a random forest model.</a:t>
+            </a:r>
+          </a:p>
+          <a:p>
+            <a:r>
+              <a:rPr lang="en-US" dirty="0"/>
+              <a:t>Then an </a:t>
+            </a:r>
+            <a:r>
+              <a:rPr lang="en-US" dirty="0" err="1"/>
               <a:t>XGBoost</a:t>
             </a:r>
             <a:r>
-              <a:rPr lang="en-US"/>
-              <a:t> model. We also used a slightly different </a:t>
-            </a:r>
-            <a:r>
-              <a:rPr lang="en-US" err="1"/>
+              <a:rPr lang="en-US" dirty="0"/>
+              <a:t> model. </a:t>
+            </a:r>
+          </a:p>
+          <a:p>
+            <a:pPr lvl="1"/>
+            <a:r>
+              <a:rPr lang="en-US" dirty="0"/>
+              <a:t>Also used a slightly different </a:t>
+            </a:r>
+            <a:r>
+              <a:rPr lang="en-US" dirty="0" err="1"/>
               <a:t>XGBoost</a:t>
             </a:r>
             <a:r>
-              <a:rPr lang="en-US"/>
+              <a:rPr lang="en-US" dirty="0"/>
               <a:t> model to evaluate feature importance.</a:t>
             </a:r>
           </a:p>
           <a:p>
             <a:r>
-              <a:rPr lang="en-US"/>
-              <a:t>For the baseline run of all four models, we did little minimal tuning of hyperparameters.</a:t>
-            </a:r>
-          </a:p>
-          <a:p>
-            <a:r>
-              <a:rPr lang="en-US"/>
-              <a:t>For baseline run, we normalized the scale of the numeric features(</a:t>
-            </a:r>
-            <a:r>
-              <a:rPr lang="en-US" err="1"/>
+              <a:rPr lang="en-US" dirty="0"/>
+              <a:t>For our baseline models</a:t>
+            </a:r>
+          </a:p>
+          <a:p>
+            <a:pPr lvl="1"/>
+            <a:r>
+              <a:rPr lang="en-US" dirty="0"/>
+              <a:t>Minimal tuning of hyperparameters.</a:t>
+            </a:r>
+          </a:p>
+          <a:p>
+            <a:pPr lvl="1"/>
+            <a:r>
+              <a:rPr lang="en-US" dirty="0"/>
+              <a:t>Normalized the scale of the numeric features(</a:t>
+            </a:r>
+            <a:r>
+              <a:rPr lang="en-US" dirty="0" err="1"/>
               <a:t>sklearn’s</a:t>
             </a:r>
             <a:r>
-              <a:rPr lang="en-US"/>
+              <a:rPr lang="en-US" dirty="0"/>
               <a:t> </a:t>
             </a:r>
             <a:r>
-              <a:rPr lang="en-US" err="1"/>
+              <a:rPr lang="en-US" dirty="0" err="1"/>
               <a:t>StandardScaler</a:t>
             </a:r>
             <a:r>
-              <a:rPr lang="en-US"/>
-              <a:t>), and used one-hot encoding for the categorical features.</a:t>
+              <a:rPr lang="en-US" dirty="0"/>
+              <a:t>), </a:t>
+            </a:r>
+          </a:p>
+          <a:p>
+            <a:pPr lvl="1"/>
+            <a:r>
+              <a:rPr lang="en-US" dirty="0"/>
+              <a:t>Used one-hot encoding for the categorical features.</a:t>
             </a:r>
           </a:p>
         </p:txBody>
@@ -8350,65 +8592,65 @@
           <a:lstStyle/>
           <a:p>
             <a:r>
-              <a:rPr lang="en-US"/>
+              <a:rPr lang="en-US" dirty="0"/>
               <a:t>EDA notebook for cleaning data kept crashing due to dataset size.</a:t>
             </a:r>
           </a:p>
           <a:p>
             <a:pPr lvl="1"/>
             <a:r>
-              <a:rPr lang="en-US"/>
+              <a:rPr lang="en-US" dirty="0"/>
               <a:t>Visualizations made it crash, actually data cleaning pretty fast.</a:t>
             </a:r>
           </a:p>
           <a:p>
             <a:pPr lvl="1"/>
             <a:r>
-              <a:rPr lang="en-US"/>
+              <a:rPr lang="en-US" dirty="0"/>
               <a:t>Had to disable pair plots for the full dataset.</a:t>
             </a:r>
           </a:p>
           <a:p>
             <a:r>
-              <a:rPr lang="en-US"/>
+              <a:rPr lang="en-US" dirty="0"/>
               <a:t>Sparse categorical features</a:t>
             </a:r>
           </a:p>
           <a:p>
             <a:pPr lvl="1"/>
             <a:r>
-              <a:rPr lang="en-US"/>
-              <a:t>i.e. model</a:t>
+              <a:rPr lang="en-US" dirty="0"/>
+              <a:t>i.e. vehicle model has 29,667 unique values in the dataset.</a:t>
             </a:r>
           </a:p>
           <a:p>
             <a:pPr lvl="1"/>
             <a:r>
-              <a:rPr lang="en-US"/>
+              <a:rPr lang="en-US" dirty="0"/>
               <a:t>One hot encoding with decision trees has some drawbacks</a:t>
             </a:r>
           </a:p>
           <a:p>
             <a:pPr lvl="1"/>
             <a:r>
-              <a:rPr lang="en-US"/>
+              <a:rPr lang="en-US" dirty="0"/>
               <a:t>Had to use leave one out encoding for getting feature importance for </a:t>
             </a:r>
             <a:r>
-              <a:rPr lang="en-US" err="1"/>
+              <a:rPr lang="en-US" dirty="0" err="1"/>
               <a:t>XGBoost</a:t>
             </a:r>
             <a:r>
-              <a:rPr lang="en-US"/>
+              <a:rPr lang="en-US" dirty="0"/>
               <a:t> so could map back to original columns, but LOO had slightly worse regression performance.</a:t>
             </a:r>
           </a:p>
           <a:p>
-            <a:endParaRPr lang="en-US"/>
+            <a:endParaRPr lang="en-US" dirty="0"/>
           </a:p>
           <a:p>
             <a:pPr lvl="1"/>
-            <a:endParaRPr lang="en-US"/>
+            <a:endParaRPr lang="en-US" dirty="0"/>
           </a:p>
         </p:txBody>
       </p:sp>
@@ -8488,7 +8730,12 @@
             <p:ph type="body" idx="1"/>
           </p:nvPr>
         </p:nvSpPr>
-        <p:spPr/>
+        <p:spPr>
+          <a:xfrm>
+            <a:off x="415600" y="1536633"/>
+            <a:ext cx="5464987" cy="4555200"/>
+          </a:xfrm>
+        </p:spPr>
         <p:txBody>
           <a:bodyPr/>
           <a:lstStyle/>
@@ -8497,7 +8744,7 @@
               <a:buNone/>
             </a:pPr>
             <a:r>
-              <a:rPr lang="en-US"/>
+              <a:rPr lang="en-US" dirty="0"/>
               <a:t>To compare across the models we </a:t>
             </a:r>
           </a:p>
@@ -8506,7 +8753,7 @@
               <a:buNone/>
             </a:pPr>
             <a:r>
-              <a:rPr lang="en-US"/>
+              <a:rPr lang="en-US" dirty="0"/>
               <a:t>Used RMSE as primary metric,</a:t>
             </a:r>
           </a:p>
@@ -8515,22 +8762,22 @@
               <a:buNone/>
             </a:pPr>
             <a:r>
-              <a:rPr lang="en-US"/>
-              <a:t>Along with R2 score.</a:t>
+              <a:rPr lang="en-US" dirty="0"/>
+              <a:t>Along with R2 score, aka as the coefficient of determination</a:t>
             </a:r>
           </a:p>
           <a:p>
             <a:pPr marL="152396" indent="0">
               <a:buNone/>
             </a:pPr>
-            <a:endParaRPr lang="en-US"/>
+            <a:endParaRPr lang="en-US" dirty="0"/>
           </a:p>
           <a:p>
             <a:pPr marL="152396" indent="0">
               <a:buNone/>
             </a:pPr>
             <a:r>
-              <a:rPr lang="en-US"/>
+              <a:rPr lang="en-US" dirty="0"/>
               <a:t>We used 20% of the</a:t>
             </a:r>
           </a:p>
@@ -8539,7 +8786,7 @@
               <a:buNone/>
             </a:pPr>
             <a:r>
-              <a:rPr lang="en-US"/>
+              <a:rPr lang="en-US" dirty="0"/>
               <a:t>data used for test set, with training</a:t>
             </a:r>
           </a:p>
@@ -8548,7 +8795,7 @@
               <a:buNone/>
             </a:pPr>
             <a:r>
-              <a:rPr lang="en-US"/>
+              <a:rPr lang="en-US" dirty="0"/>
               <a:t>of the models done on the other 80%.</a:t>
             </a:r>
           </a:p>
@@ -8832,32 +9079,32 @@
         </p:spPr>
         <p:txBody>
           <a:bodyPr>
-            <a:normAutofit fontScale="92500" lnSpcReduction="10000"/>
+            <a:normAutofit fontScale="92500"/>
           </a:bodyPr>
           <a:lstStyle/>
           <a:p>
             <a:r>
-              <a:rPr lang="en-US"/>
-              <a:t>After the baseline, we experimented with different encoding of columns and learning rates for </a:t>
-            </a:r>
-            <a:r>
-              <a:rPr lang="en-US" err="1"/>
+              <a:rPr lang="en-US" dirty="0"/>
+              <a:t>Experimented with different encoding of columns and learning rates for </a:t>
+            </a:r>
+            <a:r>
+              <a:rPr lang="en-US" dirty="0" err="1"/>
               <a:t>XGBoost</a:t>
             </a:r>
             <a:r>
-              <a:rPr lang="en-US"/>
+              <a:rPr lang="en-US" dirty="0"/>
               <a:t>.</a:t>
             </a:r>
           </a:p>
           <a:p>
             <a:r>
-              <a:rPr lang="en-US"/>
-              <a:t>Our best results so far are from changing the learning rate to 0.3, and using leave one out encoding, followed by PCA for for the categorical feature encoding.</a:t>
-            </a:r>
-          </a:p>
-          <a:p>
-            <a:r>
-              <a:rPr lang="en-US"/>
+              <a:rPr lang="en-US" dirty="0"/>
+              <a:t>Best results so far are from changing the learning rate to 0.3, and using leave one out encoding, followed by PCA for for the categorical feature encoding.</a:t>
+            </a:r>
+          </a:p>
+          <a:p>
+            <a:r>
+              <a:rPr lang="en-US" dirty="0"/>
               <a:t>This also results is many fewer columns in the model which makes training much faster compared to one-hot encoding.</a:t>
             </a:r>
           </a:p>
@@ -9288,9 +9535,12 @@
           <a:bodyPr/>
           <a:lstStyle/>
           <a:p>
+            <a:pPr marL="152396" indent="0">
+              <a:buNone/>
+            </a:pPr>
             <a:r>
               <a:rPr lang="en-US" dirty="0"/>
-              <a:t>In order to make the model practically useful, we saved the trained model and fitted preprocessor pipeline so they could be loaded and used in a separate notebook, </a:t>
+              <a:t>In order to make the model practically useful, I saved the trained model and fitted preprocessor pipeline so they could be loaded and used in a separate notebook, </a:t>
             </a:r>
             <a:r>
               <a:rPr lang="en-US" sz="2600" i="1" dirty="0" err="1">
@@ -9298,8 +9548,22 @@
               </a:rPr>
               <a:t>used_car_price_predictor.ipynb</a:t>
             </a:r>
+            <a:r>
+              <a:rPr lang="en-US" sz="2600" i="1" dirty="0">
+                <a:latin typeface="Lucida Sans Typewriter" panose="020B0509030504030204" pitchFamily="49" charset="77"/>
+              </a:rPr>
+              <a:t> </a:t>
+            </a:r>
+            <a:r>
+              <a:rPr lang="en-US" sz="2600" dirty="0">
+                <a:latin typeface="Calibri" panose="020F0502020204030204" pitchFamily="34" charset="0"/>
+                <a:cs typeface="Calibri" panose="020F0502020204030204" pitchFamily="34" charset="0"/>
+              </a:rPr>
+              <a:t>to verify I could duplicate test results from the saved model.</a:t>
+            </a:r>
             <a:endParaRPr lang="en-US" sz="2600" i="1" dirty="0">
-              <a:latin typeface="Lucida Sans Typewriter" panose="020B0509030504030204" pitchFamily="49" charset="77"/>
+              <a:latin typeface="Calibri" panose="020F0502020204030204" pitchFamily="34" charset="0"/>
+              <a:cs typeface="Calibri" panose="020F0502020204030204" pitchFamily="34" charset="0"/>
             </a:endParaRPr>
           </a:p>
         </p:txBody>
@@ -9358,39 +9622,146 @@
           <a:lstStyle/>
           <a:p>
             <a:r>
-              <a:rPr lang="en-US" dirty="0"/>
-              <a:t>TODO: </a:t>
-            </a:r>
-            <a:r>
               <a:rPr lang="en-US" dirty="0" err="1"/>
               <a:t>Streamlit</a:t>
             </a:r>
+            <a:r>
+              <a:rPr lang="en-US" dirty="0"/>
+              <a:t> App</a:t>
+            </a:r>
+          </a:p>
+        </p:txBody>
+      </p:sp>
+      <p:sp>
+        <p:nvSpPr>
+          <p:cNvPr id="3" name="Text Placeholder 2">
+            <a:extLst>
+              <a:ext uri="{FF2B5EF4-FFF2-40B4-BE49-F238E27FC236}">
+                <a16:creationId xmlns:a16="http://schemas.microsoft.com/office/drawing/2014/main" id="{1097C73F-7E4A-6D7D-A039-2D91A544D308}"/>
+              </a:ext>
+            </a:extLst>
+          </p:cNvPr>
+          <p:cNvSpPr>
+            <a:spLocks noGrp="1"/>
+          </p:cNvSpPr>
+          <p:nvPr>
+            <p:ph type="body" idx="1"/>
+          </p:nvPr>
+        </p:nvSpPr>
+        <p:spPr>
+          <a:xfrm>
+            <a:off x="415599" y="1536633"/>
+            <a:ext cx="5085779" cy="4549842"/>
+          </a:xfrm>
+        </p:spPr>
+        <p:txBody>
+          <a:bodyPr/>
+          <a:lstStyle/>
+          <a:p>
+            <a:pPr marL="152396" indent="0">
+              <a:buNone/>
+            </a:pPr>
+            <a:r>
+              <a:rPr lang="en-US" dirty="0"/>
+              <a:t>Created a </a:t>
+            </a:r>
+            <a:r>
+              <a:rPr lang="en-US" dirty="0" err="1"/>
+              <a:t>Streamlit</a:t>
+            </a:r>
+            <a:r>
+              <a:rPr lang="en-US" dirty="0"/>
+              <a:t> web app</a:t>
+            </a:r>
+          </a:p>
+          <a:p>
+            <a:pPr marL="152396" indent="0">
+              <a:buNone/>
+            </a:pPr>
+            <a:r>
+              <a:rPr lang="en-US" dirty="0"/>
+              <a:t>Uses the trained model to interactively predict price for a vehicle based on vehicle data entered by the user.</a:t>
+            </a:r>
+          </a:p>
+          <a:p>
+            <a:pPr marL="152396" indent="0">
+              <a:buNone/>
+            </a:pPr>
             <a:endParaRPr lang="en-US" dirty="0"/>
           </a:p>
         </p:txBody>
       </p:sp>
-      <p:sp>
-        <p:nvSpPr>
-          <p:cNvPr id="3" name="Text Placeholder 2">
-            <a:extLst>
-              <a:ext uri="{FF2B5EF4-FFF2-40B4-BE49-F238E27FC236}">
-                <a16:creationId xmlns:a16="http://schemas.microsoft.com/office/drawing/2014/main" id="{1097C73F-7E4A-6D7D-A039-2D91A544D308}"/>
-              </a:ext>
-            </a:extLst>
-          </p:cNvPr>
-          <p:cNvSpPr>
-            <a:spLocks noGrp="1"/>
-          </p:cNvSpPr>
-          <p:nvPr>
-            <p:ph type="body" idx="1"/>
-          </p:nvPr>
-        </p:nvSpPr>
-        <p:spPr/>
-        <p:txBody>
-          <a:bodyPr/>
-          <a:lstStyle/>
-          <a:p>
-            <a:endParaRPr lang="en-US"/>
+      <p:pic>
+        <p:nvPicPr>
+          <p:cNvPr id="5" name="Picture 4">
+            <a:extLst>
+              <a:ext uri="{FF2B5EF4-FFF2-40B4-BE49-F238E27FC236}">
+                <a16:creationId xmlns:a16="http://schemas.microsoft.com/office/drawing/2014/main" id="{2FEF7F89-D513-B790-1E58-ADC80A02CC06}"/>
+              </a:ext>
+            </a:extLst>
+          </p:cNvPr>
+          <p:cNvPicPr>
+            <a:picLocks noChangeAspect="1"/>
+          </p:cNvPicPr>
+          <p:nvPr/>
+        </p:nvPicPr>
+        <p:blipFill>
+          <a:blip r:embed="rId3"/>
+          <a:stretch>
+            <a:fillRect/>
+          </a:stretch>
+        </p:blipFill>
+        <p:spPr>
+          <a:xfrm>
+            <a:off x="6096000" y="238646"/>
+            <a:ext cx="5085779" cy="6380707"/>
+          </a:xfrm>
+          <a:prstGeom prst="rect">
+            <a:avLst/>
+          </a:prstGeom>
+        </p:spPr>
+      </p:pic>
+      <p:sp>
+        <p:nvSpPr>
+          <p:cNvPr id="7" name="TextBox 6">
+            <a:extLst>
+              <a:ext uri="{FF2B5EF4-FFF2-40B4-BE49-F238E27FC236}">
+                <a16:creationId xmlns:a16="http://schemas.microsoft.com/office/drawing/2014/main" id="{E13227AA-278C-6CD5-313B-923F79318DBE}"/>
+              </a:ext>
+            </a:extLst>
+          </p:cNvPr>
+          <p:cNvSpPr txBox="1"/>
+          <p:nvPr/>
+        </p:nvSpPr>
+        <p:spPr>
+          <a:xfrm>
+            <a:off x="415599" y="5440144"/>
+            <a:ext cx="6093618" cy="646331"/>
+          </a:xfrm>
+          <a:prstGeom prst="rect">
+            <a:avLst/>
+          </a:prstGeom>
+          <a:noFill/>
+        </p:spPr>
+        <p:txBody>
+          <a:bodyPr wrap="square">
+            <a:spAutoFit/>
+          </a:bodyPr>
+          <a:lstStyle/>
+          <a:p>
+            <a:pPr marL="152396" indent="0">
+              <a:buNone/>
+            </a:pPr>
+            <a:r>
+              <a:rPr lang="en-US" dirty="0">
+                <a:hlinkClick r:id="rId4"/>
+              </a:rPr>
+              <a:t>https://ranton256-used-car-sale-price--streamlit-price-predictor-tt183q.streamlit.app/</a:t>
+            </a:r>
+            <a:r>
+              <a:rPr lang="en-US" dirty="0"/>
+              <a:t> </a:t>
+            </a:r>
           </a:p>
         </p:txBody>
       </p:sp>
@@ -9476,8 +9847,44 @@
           <a:lstStyle/>
           <a:p>
             <a:r>
-              <a:rPr lang="en-US"/>
-              <a:t>TODO: write the summary.</a:t>
+              <a:rPr lang="en-US" dirty="0"/>
+              <a:t>Imputation and cleaning of data took significant effort.</a:t>
+            </a:r>
+          </a:p>
+          <a:p>
+            <a:r>
+              <a:rPr lang="en-US" dirty="0" err="1"/>
+              <a:t>XGBoost</a:t>
+            </a:r>
+            <a:r>
+              <a:rPr lang="en-US" dirty="0"/>
+              <a:t> performed the best, with random forest second.</a:t>
+            </a:r>
+          </a:p>
+          <a:p>
+            <a:pPr lvl="1"/>
+            <a:r>
+              <a:rPr lang="en-US" dirty="0"/>
+              <a:t>But also required more preprocessing of features and tuning.</a:t>
+            </a:r>
+          </a:p>
+          <a:p>
+            <a:r>
+              <a:rPr lang="en-US" dirty="0"/>
+              <a:t>Most important features were odometer mileage, model, year, state, and make in that order.</a:t>
+            </a:r>
+          </a:p>
+          <a:p>
+            <a:r>
+              <a:rPr lang="en-US" dirty="0"/>
+              <a:t>The final trained model proposed reasonable results in most cases.</a:t>
+            </a:r>
+          </a:p>
+          <a:p>
+            <a:pPr lvl="1"/>
+            <a:r>
+              <a:rPr lang="en-US" dirty="0"/>
+              <a:t>But there are edge cases where it outputs unreasonable values.</a:t>
             </a:r>
           </a:p>
         </p:txBody>
@@ -9567,7 +9974,48 @@
           <a:bodyPr/>
           <a:lstStyle/>
           <a:p>
-            <a:endParaRPr lang="en-US"/>
+            <a:r>
+              <a:rPr lang="en-US" dirty="0"/>
+              <a:t>More thorough search of best hyperparameters for </a:t>
+            </a:r>
+            <a:r>
+              <a:rPr lang="en-US" dirty="0" err="1"/>
+              <a:t>XGBoost</a:t>
+            </a:r>
+            <a:r>
+              <a:rPr lang="en-US" dirty="0"/>
+              <a:t> model</a:t>
+            </a:r>
+          </a:p>
+          <a:p>
+            <a:r>
+              <a:rPr lang="en-US" dirty="0"/>
+              <a:t>Plot map of states color-coded for high/low mean price</a:t>
+            </a:r>
+          </a:p>
+          <a:p>
+            <a:r>
+              <a:rPr lang="en-US" dirty="0"/>
+              <a:t>Faceted histograms of price across different values of each feature column to better visualize the relationship between each variable and price.</a:t>
+            </a:r>
+          </a:p>
+          <a:p>
+            <a:r>
+              <a:rPr lang="en-US" dirty="0"/>
+              <a:t>Experiment with MLP/neural network based regression model.</a:t>
+            </a:r>
+          </a:p>
+          <a:p>
+            <a:r>
+              <a:rPr lang="en-US" dirty="0"/>
+              <a:t>Use the  CarGurus dataset with the same models and similar features to compare results.</a:t>
+            </a:r>
+          </a:p>
+          <a:p>
+            <a:r>
+              <a:rPr lang="en-US" dirty="0"/>
+              <a:t>Incorporate an NLP model of some kind to include information from the description text of each listing to improve the price prediction.</a:t>
+            </a:r>
           </a:p>
         </p:txBody>
       </p:sp>
@@ -9924,10 +10372,199 @@
         </p:nvSpPr>
         <p:spPr/>
         <p:txBody>
-          <a:bodyPr/>
-          <a:lstStyle/>
-          <a:p>
-            <a:endParaRPr lang="en-US"/>
+          <a:bodyPr>
+            <a:normAutofit fontScale="92500" lnSpcReduction="20000"/>
+          </a:bodyPr>
+          <a:lstStyle/>
+          <a:p>
+            <a:pPr marL="152396" indent="-457200">
+              <a:spcBef>
+                <a:spcPts val="1200"/>
+              </a:spcBef>
+              <a:buNone/>
+            </a:pPr>
+            <a:r>
+              <a:rPr lang="en-US" sz="2400" dirty="0"/>
+              <a:t>Coefficient of determination. (Mar 2023). </a:t>
+            </a:r>
+            <a:r>
+              <a:rPr lang="en-US" sz="2400" i="1" dirty="0"/>
+              <a:t>In Wikipedia</a:t>
+            </a:r>
+            <a:r>
+              <a:rPr lang="en-US" sz="2400" dirty="0"/>
+              <a:t>. </a:t>
+            </a:r>
+            <a:r>
+              <a:rPr lang="en-US" sz="2400" dirty="0">
+                <a:solidFill>
+                  <a:srgbClr val="0000FF"/>
+                </a:solidFill>
+                <a:effectLst/>
+                <a:hlinkClick r:id="rId2"/>
+              </a:rPr>
+              <a:t>https://en.wikipedia.org/wiki/Coefficient_of_determination</a:t>
+            </a:r>
+            <a:endParaRPr lang="en-US" sz="2400" dirty="0"/>
+          </a:p>
+          <a:p>
+            <a:pPr marL="152396" indent="-457200">
+              <a:spcBef>
+                <a:spcPts val="1200"/>
+              </a:spcBef>
+              <a:buNone/>
+            </a:pPr>
+            <a:r>
+              <a:rPr lang="en-US" sz="2400" dirty="0"/>
+              <a:t>Chen, T., He, T., </a:t>
+            </a:r>
+            <a:r>
+              <a:rPr lang="en-US" sz="2400" dirty="0" err="1"/>
+              <a:t>Benesty</a:t>
+            </a:r>
+            <a:r>
+              <a:rPr lang="en-US" sz="2400" dirty="0"/>
+              <a:t>, M., </a:t>
+            </a:r>
+            <a:r>
+              <a:rPr lang="en-US" sz="2400" dirty="0" err="1"/>
+              <a:t>Khotilovich</a:t>
+            </a:r>
+            <a:r>
+              <a:rPr lang="en-US" sz="2400" dirty="0"/>
+              <a:t>, V., Tang, Y., Cho, H., ... &amp; Zhou, T. (2015). </a:t>
+            </a:r>
+            <a:r>
+              <a:rPr lang="en-US" sz="2400" dirty="0" err="1"/>
+              <a:t>Xgboost</a:t>
+            </a:r>
+            <a:r>
+              <a:rPr lang="en-US" sz="2400" dirty="0"/>
+              <a:t>: extreme gradient boosting. </a:t>
+            </a:r>
+            <a:r>
+              <a:rPr lang="en-US" sz="2400" i="1" dirty="0"/>
+              <a:t>R package version 0.4-2</a:t>
+            </a:r>
+            <a:r>
+              <a:rPr lang="en-US" sz="2400" dirty="0"/>
+              <a:t>, </a:t>
+            </a:r>
+            <a:r>
+              <a:rPr lang="en-US" sz="2400" i="1" dirty="0"/>
+              <a:t>1</a:t>
+            </a:r>
+            <a:r>
+              <a:rPr lang="en-US" sz="2400" dirty="0"/>
+              <a:t>(4), 1-4.</a:t>
+            </a:r>
+          </a:p>
+          <a:p>
+            <a:pPr marL="152396" indent="-457200">
+              <a:spcBef>
+                <a:spcPts val="1200"/>
+              </a:spcBef>
+              <a:buNone/>
+            </a:pPr>
+            <a:r>
+              <a:rPr lang="en-US" sz="2400" dirty="0"/>
+              <a:t>Ho, T. K. (1995, August). Random decision forests. In </a:t>
+            </a:r>
+            <a:r>
+              <a:rPr lang="en-US" sz="2400" i="1" dirty="0"/>
+              <a:t>Proceedings of 3rd international conference on document analysis and recognition</a:t>
+            </a:r>
+            <a:r>
+              <a:rPr lang="en-US" sz="2400" dirty="0"/>
+              <a:t> (Vol. 1, pp. 278-282). IEEE.</a:t>
+            </a:r>
+          </a:p>
+          <a:p>
+            <a:pPr marL="152396" indent="-457200">
+              <a:spcBef>
+                <a:spcPts val="1200"/>
+              </a:spcBef>
+              <a:buNone/>
+            </a:pPr>
+            <a:r>
+              <a:rPr lang="en-US" sz="2400" dirty="0" err="1"/>
+              <a:t>Hoerl</a:t>
+            </a:r>
+            <a:r>
+              <a:rPr lang="en-US" sz="2400" dirty="0"/>
+              <a:t>, A. E., &amp; Kennard, R. W. (1970). Ridge regression: Biased estimation for nonorthogonal problems. </a:t>
+            </a:r>
+            <a:r>
+              <a:rPr lang="en-US" sz="2400" i="1" dirty="0" err="1"/>
+              <a:t>Technometrics</a:t>
+            </a:r>
+            <a:r>
+              <a:rPr lang="en-US" sz="2400" dirty="0"/>
+              <a:t>, 12(1), 55-67.</a:t>
+            </a:r>
+          </a:p>
+          <a:p>
+            <a:pPr marL="152396" indent="-457200">
+              <a:spcBef>
+                <a:spcPts val="1200"/>
+              </a:spcBef>
+              <a:buNone/>
+            </a:pPr>
+            <a:r>
+              <a:rPr lang="en-US" sz="2400" dirty="0"/>
+              <a:t>Reese, A., (2021). Used Cars Dataset: Vehicles listings from </a:t>
+            </a:r>
+            <a:r>
+              <a:rPr lang="en-US" sz="2400" dirty="0" err="1"/>
+              <a:t>Craigslist.org</a:t>
+            </a:r>
+            <a:r>
+              <a:rPr lang="en-US" sz="2400" dirty="0"/>
+              <a:t>, v10. Retrieved Jan 28, 2023 from </a:t>
+            </a:r>
+            <a:r>
+              <a:rPr lang="en-US" sz="2400" dirty="0">
+                <a:hlinkClick r:id="rId3"/>
+              </a:rPr>
+              <a:t>https://www.kaggle.com/datasets/austinreese/craigslist-carstrucks-data</a:t>
+            </a:r>
+            <a:endParaRPr lang="en-US" sz="2400" dirty="0"/>
+          </a:p>
+          <a:p>
+            <a:pPr marL="152396" indent="-457200">
+              <a:spcBef>
+                <a:spcPts val="1200"/>
+              </a:spcBef>
+              <a:buNone/>
+            </a:pPr>
+            <a:r>
+              <a:rPr lang="en-US" sz="2400" dirty="0"/>
+              <a:t>Scikit-learn: Machine Learning in Python, </a:t>
+            </a:r>
+            <a:r>
+              <a:rPr lang="en-US" sz="2400" dirty="0" err="1"/>
+              <a:t>Pedregosa</a:t>
+            </a:r>
+            <a:r>
+              <a:rPr lang="en-US" sz="2400" dirty="0"/>
+              <a:t> et al., JMLR 12, pp. 2825-2830, 2011.</a:t>
+            </a:r>
+          </a:p>
+          <a:p>
+            <a:pPr marL="152396" indent="-457200">
+              <a:spcBef>
+                <a:spcPts val="1200"/>
+              </a:spcBef>
+              <a:buNone/>
+            </a:pPr>
+            <a:r>
+              <a:rPr lang="en-US" sz="2400" dirty="0" err="1"/>
+              <a:t>Tibshirani</a:t>
+            </a:r>
+            <a:r>
+              <a:rPr lang="en-US" sz="2400" dirty="0"/>
+              <a:t>, R. (1996). Regression shrinkage and selection via the lasso. Journal of the Royal Statistical Society: Series B (Methodological), 58(1), 267-288.</a:t>
+            </a:r>
           </a:p>
         </p:txBody>
       </p:sp>
@@ -10102,42 +10739,45 @@
           <a:lstStyle/>
           <a:p>
             <a:r>
-              <a:rPr lang="en-US"/>
+              <a:rPr lang="en-US" dirty="0"/>
               <a:t>Five different datasets of used car price data were located.</a:t>
             </a:r>
           </a:p>
           <a:p>
             <a:pPr lvl="1"/>
             <a:r>
-              <a:rPr lang="en-US"/>
+              <a:rPr lang="en-US" dirty="0"/>
               <a:t>These included datasets sourced from Carvana, CarGurus, Craigslist, TrueCar, and the US Department of Transportation.</a:t>
             </a:r>
           </a:p>
           <a:p>
             <a:r>
-              <a:rPr lang="en-US"/>
-              <a:t>After investigation into these datasets for data quality issues, dataset size, and features included, the Craigslist based dataset was selected</a:t>
+              <a:rPr lang="en-US" dirty="0"/>
+              <a:t>After investigation into these datasets in phase one for data quality, dataset size, and features included, the Craigslist based dataset was selected</a:t>
             </a:r>
           </a:p>
           <a:p>
             <a:pPr lvl="1"/>
             <a:r>
-              <a:rPr lang="en-US"/>
+              <a:rPr lang="en-US" dirty="0"/>
               <a:t>It includes a column for the state location, the same basic make, model, price, mileage and year information common to all the datasets</a:t>
             </a:r>
           </a:p>
           <a:p>
             <a:pPr lvl="1"/>
             <a:r>
-              <a:rPr lang="en-US"/>
+              <a:rPr lang="en-US" dirty="0"/>
               <a:t>Plus a number of additional feature columns which may affect price. </a:t>
             </a:r>
           </a:p>
           <a:p>
-            <a:endParaRPr lang="en-US"/>
-          </a:p>
-          <a:p>
-            <a:endParaRPr lang="en-US"/>
+            <a:r>
+              <a:rPr lang="en-US" dirty="0"/>
+              <a:t>The original dataset contains 426,880 rows.</a:t>
+            </a:r>
+          </a:p>
+          <a:p>
+            <a:endParaRPr lang="en-US" dirty="0"/>
           </a:p>
         </p:txBody>
       </p:sp>
@@ -10261,8 +10901,8 @@
               <a:buNone/>
             </a:pPr>
             <a:r>
-              <a:rPr lang="en-US"/>
-              <a:t>Columns we used from the Craigslist dataset.</a:t>
+              <a:rPr lang="en-US" dirty="0"/>
+              <a:t>Columns used from the Craigslist dataset.</a:t>
             </a:r>
           </a:p>
         </p:txBody>
@@ -10354,22 +10994,22 @@
               <a:buNone/>
             </a:pPr>
             <a:r>
-              <a:rPr lang="en-US"/>
-              <a:t>These columns we dropped after EDA before cleaning the data set.</a:t>
+              <a:rPr lang="en-US" dirty="0"/>
+              <a:t>These columns were dropped after EDA before cleaning the data set.</a:t>
             </a:r>
           </a:p>
           <a:p>
             <a:pPr marL="152396" indent="0">
               <a:buNone/>
             </a:pPr>
-            <a:endParaRPr lang="en-US"/>
+            <a:endParaRPr lang="en-US" dirty="0"/>
           </a:p>
           <a:p>
             <a:pPr marL="152396" indent="0">
               <a:buNone/>
             </a:pPr>
             <a:r>
-              <a:rPr lang="en-US"/>
+              <a:rPr lang="en-US" dirty="0"/>
               <a:t>     </a:t>
             </a:r>
           </a:p>
@@ -10377,60 +11017,66 @@
             <a:pPr marL="152396" indent="0">
               <a:buNone/>
             </a:pPr>
-            <a:endParaRPr lang="en-US"/>
-          </a:p>
-          <a:p>
-            <a:r>
-              <a:rPr lang="en-US"/>
+            <a:endParaRPr lang="en-US" dirty="0"/>
+          </a:p>
+          <a:p>
+            <a:r>
+              <a:rPr lang="en-US" dirty="0"/>
               <a:t>id, </a:t>
             </a:r>
             <a:r>
-              <a:rPr lang="en-US" err="1"/>
+              <a:rPr lang="en-US" dirty="0" err="1"/>
               <a:t>url</a:t>
             </a:r>
             <a:r>
-              <a:rPr lang="en-US"/>
+              <a:rPr lang="en-US" dirty="0"/>
               <a:t>, VIN, </a:t>
             </a:r>
             <a:r>
-              <a:rPr lang="en-US" err="1"/>
+              <a:rPr lang="en-US" dirty="0" err="1"/>
               <a:t>image_url</a:t>
             </a:r>
             <a:r>
-              <a:rPr lang="en-US"/>
+              <a:rPr lang="en-US" dirty="0"/>
               <a:t> - unique to each listing</a:t>
             </a:r>
           </a:p>
           <a:p>
             <a:r>
-              <a:rPr lang="en-US" err="1"/>
+              <a:rPr lang="en-US" dirty="0" err="1"/>
               <a:t>posting_date</a:t>
             </a:r>
             <a:r>
-              <a:rPr lang="en-US"/>
+              <a:rPr lang="en-US" dirty="0"/>
               <a:t> – only have data from limited period of time so not useful to determine seasonality</a:t>
             </a:r>
           </a:p>
           <a:p>
             <a:r>
-              <a:rPr lang="en-US"/>
+              <a:rPr lang="en-US" dirty="0"/>
               <a:t>region, </a:t>
             </a:r>
             <a:r>
-              <a:rPr lang="en-US" err="1"/>
+              <a:rPr lang="en-US" dirty="0" err="1"/>
               <a:t>region_url</a:t>
             </a:r>
             <a:r>
-              <a:rPr lang="en-US"/>
+              <a:rPr lang="en-US" dirty="0"/>
               <a:t>, county, </a:t>
             </a:r>
             <a:r>
-              <a:rPr lang="en-US" err="1"/>
+              <a:rPr lang="en-US" dirty="0" err="1"/>
               <a:t>lat</a:t>
             </a:r>
             <a:r>
-              <a:rPr lang="en-US"/>
+              <a:rPr lang="en-US" dirty="0"/>
               <a:t>, and long - using state as a single column for the effect of the vehicle location on price.</a:t>
+            </a:r>
+          </a:p>
+          <a:p>
+            <a:r>
+              <a:rPr lang="en-US" dirty="0"/>
+              <a:t>description – this would potentially useful if using an NLP model but not in the scope of this project.</a:t>
             </a:r>
           </a:p>
         </p:txBody>
@@ -10637,30 +11283,30 @@
           <a:lstStyle/>
           <a:p>
             <a:r>
-              <a:rPr lang="en-US"/>
+              <a:rPr lang="en-US" dirty="0"/>
               <a:t>Useful columns in the dataset include two numeric columns, not counting listing price along with a larger number of categorical columns.</a:t>
             </a:r>
           </a:p>
           <a:p>
             <a:r>
-              <a:rPr lang="en-US"/>
+              <a:rPr lang="en-US" dirty="0"/>
               <a:t>We examined the distribution of categorical features, histogram of numeric features, and correlation across all features.</a:t>
             </a:r>
           </a:p>
           <a:p>
             <a:r>
-              <a:rPr lang="en-US"/>
+              <a:rPr lang="en-US" dirty="0"/>
               <a:t>We also examined pair plots across numeric feature pairs.</a:t>
             </a:r>
           </a:p>
           <a:p>
             <a:r>
-              <a:rPr lang="en-US"/>
-              <a:t>We also examined the missing/null ratio of all columns, as well as outliers (visualized with box plots) of the numeric features.</a:t>
-            </a:r>
-          </a:p>
-          <a:p>
-            <a:endParaRPr lang="en-US"/>
+              <a:rPr lang="en-US" dirty="0"/>
+              <a:t>We also examined the missing/null ratio of all columns, and removed outliers of the numeric features.</a:t>
+            </a:r>
+          </a:p>
+          <a:p>
+            <a:endParaRPr lang="en-US" dirty="0"/>
           </a:p>
         </p:txBody>
       </p:sp>

</xml_diff>

<commit_message>
Readme, slides, cleanup and minor fixes
</commit_message>
<xml_diff>
--- a/DSCI521_rna63_final_project_pres.pptx
+++ b/DSCI521_rna63_final_project_pres.pptx
@@ -10,8 +10,8 @@
   <p:sldIdLst>
     <p:sldId id="257" r:id="rId2"/>
     <p:sldId id="258" r:id="rId3"/>
-    <p:sldId id="284" r:id="rId4"/>
-    <p:sldId id="259" r:id="rId5"/>
+    <p:sldId id="259" r:id="rId4"/>
+    <p:sldId id="284" r:id="rId5"/>
     <p:sldId id="263" r:id="rId6"/>
     <p:sldId id="270" r:id="rId7"/>
     <p:sldId id="271" r:id="rId8"/>
@@ -29,8 +29,8 @@
     <p:sldId id="283" r:id="rId20"/>
     <p:sldId id="269" r:id="rId21"/>
     <p:sldId id="264" r:id="rId22"/>
-    <p:sldId id="265" r:id="rId23"/>
-    <p:sldId id="277" r:id="rId24"/>
+    <p:sldId id="277" r:id="rId23"/>
+    <p:sldId id="265" r:id="rId24"/>
     <p:sldId id="285" r:id="rId25"/>
     <p:sldId id="278" r:id="rId26"/>
     <p:sldId id="286" r:id="rId27"/>
@@ -682,13 +682,8 @@
             </a:r>
             <a:r>
               <a:rPr lang="en-US" dirty="0"/>
-              <a:t>, but it uses much more memory and </a:t>
-            </a:r>
-            <a:r>
-              <a:rPr lang="en-US"/>
-              <a:t>is slower.</a:t>
-            </a:r>
-            <a:endParaRPr lang="en-US" dirty="0"/>
+              <a:t>, but it uses much more memory and is slower.</a:t>
+            </a:r>
           </a:p>
         </p:txBody>
       </p:sp>
@@ -1044,17 +1039,7 @@
           <a:bodyPr/>
           <a:lstStyle/>
           <a:p>
-            <a:r>
-              <a:rPr lang="en-US" b="0" i="0">
-                <a:solidFill>
-                  <a:srgbClr val="262626"/>
-                </a:solidFill>
-                <a:effectLst/>
-                <a:latin typeface="Source Code Pro" panose="020B0509030403020204" pitchFamily="49" charset="0"/>
-              </a:rPr>
-              <a:t> During COVID-19 supply problems, used car prices increased significantly when new car availability decreased which caused some of my curiosity in this area.</a:t>
-            </a:r>
-            <a:endParaRPr lang="en-US"/>
+            <a:endParaRPr lang="en-US" dirty="0"/>
           </a:p>
         </p:txBody>
       </p:sp>
@@ -1084,7 +1069,7 @@
     </p:spTree>
     <p:extLst>
       <p:ext uri="{BB962C8B-B14F-4D97-AF65-F5344CB8AC3E}">
-        <p14:creationId xmlns:p14="http://schemas.microsoft.com/office/powerpoint/2010/main" val="1387967105"/>
+        <p14:creationId xmlns:p14="http://schemas.microsoft.com/office/powerpoint/2010/main" val="3103034763"/>
       </p:ext>
     </p:extLst>
   </p:cSld>
@@ -1138,6 +1123,16 @@
           <a:bodyPr/>
           <a:lstStyle/>
           <a:p>
+            <a:r>
+              <a:rPr lang="en-US" b="0" i="0" dirty="0">
+                <a:solidFill>
+                  <a:srgbClr val="262626"/>
+                </a:solidFill>
+                <a:effectLst/>
+                <a:latin typeface="Source Code Pro" panose="020B0509030403020204" pitchFamily="49" charset="0"/>
+              </a:rPr>
+              <a:t> During COVID-19 supply problems, used car prices increased significantly when new car availability decreased which caused some of my curiosity in this area.</a:t>
+            </a:r>
             <a:endParaRPr lang="en-US" dirty="0"/>
           </a:p>
         </p:txBody>
@@ -1168,7 +1163,7 @@
     </p:spTree>
     <p:extLst>
       <p:ext uri="{BB962C8B-B14F-4D97-AF65-F5344CB8AC3E}">
-        <p14:creationId xmlns:p14="http://schemas.microsoft.com/office/powerpoint/2010/main" val="3103034763"/>
+        <p14:creationId xmlns:p14="http://schemas.microsoft.com/office/powerpoint/2010/main" val="1387967105"/>
       </p:ext>
     </p:extLst>
   </p:cSld>
@@ -1486,7 +1481,7 @@
           <a:lstStyle/>
           <a:p>
             <a:r>
-              <a:rPr lang="en-US"/>
+              <a:rPr lang="en-US" dirty="0"/>
               <a:t>This is on the dataset after cleaning and imputing missing values.</a:t>
             </a:r>
           </a:p>
@@ -1572,26 +1567,30 @@
           <a:bodyPr/>
           <a:lstStyle/>
           <a:p>
-            <a:r>
-              <a:rPr lang="en-US" dirty="0"/>
-              <a:t>https://</a:t>
+            <a:endParaRPr lang="en-US" dirty="0"/>
+          </a:p>
+          <a:p>
+            <a:r>
+              <a:rPr lang="en-US" dirty="0"/>
+              <a:t>Model has a low correlation, but is very important according to </a:t>
             </a:r>
             <a:r>
               <a:rPr lang="en-US" dirty="0" err="1"/>
-              <a:t>en.wikipedia.org</a:t>
-            </a:r>
-            <a:r>
-              <a:rPr lang="en-US" dirty="0"/>
-              <a:t>/wiki/</a:t>
-            </a:r>
-            <a:r>
-              <a:rPr lang="en-US" dirty="0" err="1"/>
-              <a:t>Coefficient_of_determination</a:t>
-            </a:r>
-            <a:r>
-              <a:rPr lang="en-US" dirty="0"/>
-              <a:t> </a:t>
-            </a:r>
+              <a:t>Xgboost</a:t>
+            </a:r>
+            <a:r>
+              <a:rPr lang="en-US" dirty="0"/>
+              <a:t> feature importance.</a:t>
+            </a:r>
+          </a:p>
+          <a:p>
+            <a:r>
+              <a:rPr lang="en-US"/>
+              <a:t>Probably due to very high number of values.</a:t>
+            </a:r>
+          </a:p>
+          <a:p>
+            <a:endParaRPr lang="en-US" dirty="0"/>
           </a:p>
         </p:txBody>
       </p:sp>
@@ -1621,7 +1620,7 @@
     </p:spTree>
     <p:extLst>
       <p:ext uri="{BB962C8B-B14F-4D97-AF65-F5344CB8AC3E}">
-        <p14:creationId xmlns:p14="http://schemas.microsoft.com/office/powerpoint/2010/main" val="1264112754"/>
+        <p14:creationId xmlns:p14="http://schemas.microsoft.com/office/powerpoint/2010/main" val="3300526282"/>
       </p:ext>
     </p:extLst>
   </p:cSld>
@@ -1675,7 +1674,26 @@
           <a:bodyPr/>
           <a:lstStyle/>
           <a:p>
-            <a:endParaRPr lang="en-US" dirty="0"/>
+            <a:r>
+              <a:rPr lang="en-US" dirty="0"/>
+              <a:t>https://</a:t>
+            </a:r>
+            <a:r>
+              <a:rPr lang="en-US" dirty="0" err="1"/>
+              <a:t>en.wikipedia.org</a:t>
+            </a:r>
+            <a:r>
+              <a:rPr lang="en-US" dirty="0"/>
+              <a:t>/wiki/</a:t>
+            </a:r>
+            <a:r>
+              <a:rPr lang="en-US" dirty="0" err="1"/>
+              <a:t>Coefficient_of_determination</a:t>
+            </a:r>
+            <a:r>
+              <a:rPr lang="en-US" dirty="0"/>
+              <a:t> </a:t>
+            </a:r>
           </a:p>
         </p:txBody>
       </p:sp>
@@ -1705,7 +1723,7 @@
     </p:spTree>
     <p:extLst>
       <p:ext uri="{BB962C8B-B14F-4D97-AF65-F5344CB8AC3E}">
-        <p14:creationId xmlns:p14="http://schemas.microsoft.com/office/powerpoint/2010/main" val="3300526282"/>
+        <p14:creationId xmlns:p14="http://schemas.microsoft.com/office/powerpoint/2010/main" val="1264112754"/>
       </p:ext>
     </p:extLst>
   </p:cSld>
@@ -8689,183 +8707,6 @@
           <p:cNvPr id="2" name="Title 1">
             <a:extLst>
               <a:ext uri="{FF2B5EF4-FFF2-40B4-BE49-F238E27FC236}">
-                <a16:creationId xmlns:a16="http://schemas.microsoft.com/office/drawing/2014/main" id="{FCA33D96-A37D-63AA-BFE9-8DC27819D038}"/>
-              </a:ext>
-            </a:extLst>
-          </p:cNvPr>
-          <p:cNvSpPr>
-            <a:spLocks noGrp="1"/>
-          </p:cNvSpPr>
-          <p:nvPr>
-            <p:ph type="title"/>
-          </p:nvPr>
-        </p:nvSpPr>
-        <p:spPr/>
-        <p:txBody>
-          <a:bodyPr>
-            <a:normAutofit fontScale="90000"/>
-          </a:bodyPr>
-          <a:lstStyle/>
-          <a:p>
-            <a:r>
-              <a:rPr lang="en-US"/>
-              <a:t>Regression Results - Baseline</a:t>
-            </a:r>
-          </a:p>
-        </p:txBody>
-      </p:sp>
-      <p:sp>
-        <p:nvSpPr>
-          <p:cNvPr id="3" name="Text Placeholder 2">
-            <a:extLst>
-              <a:ext uri="{FF2B5EF4-FFF2-40B4-BE49-F238E27FC236}">
-                <a16:creationId xmlns:a16="http://schemas.microsoft.com/office/drawing/2014/main" id="{58914A15-C88E-CDA4-05EE-1E2C42EC7EBC}"/>
-              </a:ext>
-            </a:extLst>
-          </p:cNvPr>
-          <p:cNvSpPr>
-            <a:spLocks noGrp="1"/>
-          </p:cNvSpPr>
-          <p:nvPr>
-            <p:ph type="body" idx="1"/>
-          </p:nvPr>
-        </p:nvSpPr>
-        <p:spPr>
-          <a:xfrm>
-            <a:off x="415600" y="1536633"/>
-            <a:ext cx="5464987" cy="4555200"/>
-          </a:xfrm>
-        </p:spPr>
-        <p:txBody>
-          <a:bodyPr/>
-          <a:lstStyle/>
-          <a:p>
-            <a:pPr marL="152396" indent="0">
-              <a:buNone/>
-            </a:pPr>
-            <a:r>
-              <a:rPr lang="en-US" dirty="0"/>
-              <a:t>To compare across the models we </a:t>
-            </a:r>
-          </a:p>
-          <a:p>
-            <a:pPr marL="152396" indent="0">
-              <a:buNone/>
-            </a:pPr>
-            <a:r>
-              <a:rPr lang="en-US" dirty="0"/>
-              <a:t>Used RMSE as primary metric,</a:t>
-            </a:r>
-          </a:p>
-          <a:p>
-            <a:pPr marL="152396" indent="0">
-              <a:buNone/>
-            </a:pPr>
-            <a:r>
-              <a:rPr lang="en-US" dirty="0"/>
-              <a:t>Along with R2 score, aka as the coefficient of determination</a:t>
-            </a:r>
-          </a:p>
-          <a:p>
-            <a:pPr marL="152396" indent="0">
-              <a:buNone/>
-            </a:pPr>
-            <a:endParaRPr lang="en-US" dirty="0"/>
-          </a:p>
-          <a:p>
-            <a:pPr marL="152396" indent="0">
-              <a:buNone/>
-            </a:pPr>
-            <a:r>
-              <a:rPr lang="en-US" dirty="0"/>
-              <a:t>We used 20% of the</a:t>
-            </a:r>
-          </a:p>
-          <a:p>
-            <a:pPr marL="152396" indent="0">
-              <a:buNone/>
-            </a:pPr>
-            <a:r>
-              <a:rPr lang="en-US" dirty="0"/>
-              <a:t>data used for test set, with training</a:t>
-            </a:r>
-          </a:p>
-          <a:p>
-            <a:pPr marL="152396" indent="0">
-              <a:buNone/>
-            </a:pPr>
-            <a:r>
-              <a:rPr lang="en-US" dirty="0"/>
-              <a:t>of the models done on the other 80%.</a:t>
-            </a:r>
-          </a:p>
-        </p:txBody>
-      </p:sp>
-      <p:pic>
-        <p:nvPicPr>
-          <p:cNvPr id="7" name="Picture 6">
-            <a:extLst>
-              <a:ext uri="{FF2B5EF4-FFF2-40B4-BE49-F238E27FC236}">
-                <a16:creationId xmlns:a16="http://schemas.microsoft.com/office/drawing/2014/main" id="{AB18C148-1D6F-3AF4-C980-F58485BC1FD5}"/>
-              </a:ext>
-            </a:extLst>
-          </p:cNvPr>
-          <p:cNvPicPr>
-            <a:picLocks noChangeAspect="1"/>
-          </p:cNvPicPr>
-          <p:nvPr/>
-        </p:nvPicPr>
-        <p:blipFill>
-          <a:blip r:embed="rId3"/>
-          <a:stretch>
-            <a:fillRect/>
-          </a:stretch>
-        </p:blipFill>
-        <p:spPr>
-          <a:xfrm>
-            <a:off x="5880587" y="1076132"/>
-            <a:ext cx="5895813" cy="2710056"/>
-          </a:xfrm>
-          <a:prstGeom prst="rect">
-            <a:avLst/>
-          </a:prstGeom>
-        </p:spPr>
-      </p:pic>
-    </p:spTree>
-    <p:extLst>
-      <p:ext uri="{BB962C8B-B14F-4D97-AF65-F5344CB8AC3E}">
-        <p14:creationId xmlns:p14="http://schemas.microsoft.com/office/powerpoint/2010/main" val="3365831599"/>
-      </p:ext>
-    </p:extLst>
-  </p:cSld>
-  <p:clrMapOvr>
-    <a:masterClrMapping/>
-  </p:clrMapOvr>
-</p:sld>
-</file>
-
-<file path=ppt/slides/slide23.xml><?xml version="1.0" encoding="utf-8"?>
-<p:sld xmlns:a="http://schemas.openxmlformats.org/drawingml/2006/main" xmlns:r="http://schemas.openxmlformats.org/officeDocument/2006/relationships" xmlns:p="http://schemas.openxmlformats.org/presentationml/2006/main">
-  <p:cSld>
-    <p:spTree>
-      <p:nvGrpSpPr>
-        <p:cNvPr id="1" name=""/>
-        <p:cNvGrpSpPr/>
-        <p:nvPr/>
-      </p:nvGrpSpPr>
-      <p:grpSpPr>
-        <a:xfrm>
-          <a:off x="0" y="0"/>
-          <a:ext cx="0" cy="0"/>
-          <a:chOff x="0" y="0"/>
-          <a:chExt cx="0" cy="0"/>
-        </a:xfrm>
-      </p:grpSpPr>
-      <p:sp>
-        <p:nvSpPr>
-          <p:cNvPr id="2" name="Title 1">
-            <a:extLst>
-              <a:ext uri="{FF2B5EF4-FFF2-40B4-BE49-F238E27FC236}">
                 <a16:creationId xmlns:a16="http://schemas.microsoft.com/office/drawing/2014/main" id="{DF5DF056-B79A-D7A6-8765-FD70C3A13085}"/>
               </a:ext>
             </a:extLst>
@@ -8930,7 +8771,7 @@
             </a:r>
             <a:r>
               <a:rPr lang="en-US" dirty="0"/>
-              <a:t> to cleaned data using </a:t>
+              <a:t> on cleaned data using </a:t>
             </a:r>
             <a:r>
               <a:rPr lang="en-US" dirty="0" err="1"/>
@@ -9003,6 +8844,183 @@
 </p:sld>
 </file>
 
+<file path=ppt/slides/slide23.xml><?xml version="1.0" encoding="utf-8"?>
+<p:sld xmlns:a="http://schemas.openxmlformats.org/drawingml/2006/main" xmlns:r="http://schemas.openxmlformats.org/officeDocument/2006/relationships" xmlns:p="http://schemas.openxmlformats.org/presentationml/2006/main">
+  <p:cSld>
+    <p:spTree>
+      <p:nvGrpSpPr>
+        <p:cNvPr id="1" name=""/>
+        <p:cNvGrpSpPr/>
+        <p:nvPr/>
+      </p:nvGrpSpPr>
+      <p:grpSpPr>
+        <a:xfrm>
+          <a:off x="0" y="0"/>
+          <a:ext cx="0" cy="0"/>
+          <a:chOff x="0" y="0"/>
+          <a:chExt cx="0" cy="0"/>
+        </a:xfrm>
+      </p:grpSpPr>
+      <p:sp>
+        <p:nvSpPr>
+          <p:cNvPr id="2" name="Title 1">
+            <a:extLst>
+              <a:ext uri="{FF2B5EF4-FFF2-40B4-BE49-F238E27FC236}">
+                <a16:creationId xmlns:a16="http://schemas.microsoft.com/office/drawing/2014/main" id="{FCA33D96-A37D-63AA-BFE9-8DC27819D038}"/>
+              </a:ext>
+            </a:extLst>
+          </p:cNvPr>
+          <p:cNvSpPr>
+            <a:spLocks noGrp="1"/>
+          </p:cNvSpPr>
+          <p:nvPr>
+            <p:ph type="title"/>
+          </p:nvPr>
+        </p:nvSpPr>
+        <p:spPr/>
+        <p:txBody>
+          <a:bodyPr>
+            <a:normAutofit fontScale="90000"/>
+          </a:bodyPr>
+          <a:lstStyle/>
+          <a:p>
+            <a:r>
+              <a:rPr lang="en-US"/>
+              <a:t>Regression Results - Baseline</a:t>
+            </a:r>
+          </a:p>
+        </p:txBody>
+      </p:sp>
+      <p:sp>
+        <p:nvSpPr>
+          <p:cNvPr id="3" name="Text Placeholder 2">
+            <a:extLst>
+              <a:ext uri="{FF2B5EF4-FFF2-40B4-BE49-F238E27FC236}">
+                <a16:creationId xmlns:a16="http://schemas.microsoft.com/office/drawing/2014/main" id="{58914A15-C88E-CDA4-05EE-1E2C42EC7EBC}"/>
+              </a:ext>
+            </a:extLst>
+          </p:cNvPr>
+          <p:cNvSpPr>
+            <a:spLocks noGrp="1"/>
+          </p:cNvSpPr>
+          <p:nvPr>
+            <p:ph type="body" idx="1"/>
+          </p:nvPr>
+        </p:nvSpPr>
+        <p:spPr>
+          <a:xfrm>
+            <a:off x="415600" y="1536633"/>
+            <a:ext cx="5464987" cy="4555200"/>
+          </a:xfrm>
+        </p:spPr>
+        <p:txBody>
+          <a:bodyPr/>
+          <a:lstStyle/>
+          <a:p>
+            <a:pPr marL="152396" indent="0">
+              <a:buNone/>
+            </a:pPr>
+            <a:r>
+              <a:rPr lang="en-US" dirty="0"/>
+              <a:t>To compare across the models we </a:t>
+            </a:r>
+          </a:p>
+          <a:p>
+            <a:pPr marL="152396" indent="0">
+              <a:buNone/>
+            </a:pPr>
+            <a:r>
+              <a:rPr lang="en-US" dirty="0"/>
+              <a:t>Used RMSE as primary metric,</a:t>
+            </a:r>
+          </a:p>
+          <a:p>
+            <a:pPr marL="152396" indent="0">
+              <a:buNone/>
+            </a:pPr>
+            <a:r>
+              <a:rPr lang="en-US" dirty="0"/>
+              <a:t>Along with R2 score, aka as the coefficient of determination</a:t>
+            </a:r>
+          </a:p>
+          <a:p>
+            <a:pPr marL="152396" indent="0">
+              <a:buNone/>
+            </a:pPr>
+            <a:endParaRPr lang="en-US" dirty="0"/>
+          </a:p>
+          <a:p>
+            <a:pPr marL="152396" indent="0">
+              <a:buNone/>
+            </a:pPr>
+            <a:r>
+              <a:rPr lang="en-US" dirty="0"/>
+              <a:t>We used 20% of the</a:t>
+            </a:r>
+          </a:p>
+          <a:p>
+            <a:pPr marL="152396" indent="0">
+              <a:buNone/>
+            </a:pPr>
+            <a:r>
+              <a:rPr lang="en-US" dirty="0"/>
+              <a:t>data used for test set, with training</a:t>
+            </a:r>
+          </a:p>
+          <a:p>
+            <a:pPr marL="152396" indent="0">
+              <a:buNone/>
+            </a:pPr>
+            <a:r>
+              <a:rPr lang="en-US" dirty="0"/>
+              <a:t>of the models done on the other 80%.</a:t>
+            </a:r>
+          </a:p>
+        </p:txBody>
+      </p:sp>
+      <p:pic>
+        <p:nvPicPr>
+          <p:cNvPr id="8" name="Picture 7">
+            <a:extLst>
+              <a:ext uri="{FF2B5EF4-FFF2-40B4-BE49-F238E27FC236}">
+                <a16:creationId xmlns:a16="http://schemas.microsoft.com/office/drawing/2014/main" id="{4FB24668-B050-23AB-97C5-69502521C380}"/>
+              </a:ext>
+            </a:extLst>
+          </p:cNvPr>
+          <p:cNvPicPr>
+            <a:picLocks noChangeAspect="1"/>
+          </p:cNvPicPr>
+          <p:nvPr/>
+        </p:nvPicPr>
+        <p:blipFill>
+          <a:blip r:embed="rId3"/>
+          <a:stretch>
+            <a:fillRect/>
+          </a:stretch>
+        </p:blipFill>
+        <p:spPr>
+          <a:xfrm>
+            <a:off x="6311415" y="1356967"/>
+            <a:ext cx="5219700" cy="2387600"/>
+          </a:xfrm>
+          <a:prstGeom prst="rect">
+            <a:avLst/>
+          </a:prstGeom>
+        </p:spPr>
+      </p:pic>
+    </p:spTree>
+    <p:extLst>
+      <p:ext uri="{BB962C8B-B14F-4D97-AF65-F5344CB8AC3E}">
+        <p14:creationId xmlns:p14="http://schemas.microsoft.com/office/powerpoint/2010/main" val="3365831599"/>
+      </p:ext>
+    </p:extLst>
+  </p:cSld>
+  <p:clrMapOvr>
+    <a:masterClrMapping/>
+  </p:clrMapOvr>
+</p:sld>
+</file>
+
 <file path=ppt/slides/slide24.xml><?xml version="1.0" encoding="utf-8"?>
 <p:sld xmlns:a="http://schemas.openxmlformats.org/drawingml/2006/main" xmlns:r="http://schemas.openxmlformats.org/officeDocument/2006/relationships" xmlns:p="http://schemas.openxmlformats.org/presentationml/2006/main">
   <p:cSld>
@@ -9079,7 +9097,7 @@
         </p:spPr>
         <p:txBody>
           <a:bodyPr>
-            <a:normAutofit fontScale="92500"/>
+            <a:normAutofit fontScale="92500" lnSpcReduction="10000"/>
           </a:bodyPr>
           <a:lstStyle/>
           <a:p>
@@ -9100,6 +9118,12 @@
             <a:r>
               <a:rPr lang="en-US" dirty="0"/>
               <a:t>Best results so far are from changing the learning rate to 0.3, and using leave one out encoding, followed by PCA for for the categorical feature encoding.</a:t>
+            </a:r>
+          </a:p>
+          <a:p>
+            <a:r>
+              <a:rPr lang="en-US" dirty="0"/>
+              <a:t>Trained for 5000 rounds.</a:t>
             </a:r>
           </a:p>
           <a:p>
@@ -9540,26 +9564,20 @@
             </a:pPr>
             <a:r>
               <a:rPr lang="en-US" dirty="0"/>
-              <a:t>In order to make the model practically useful, I saved the trained model and fitted preprocessor pipeline so they could be loaded and used in a separate notebook, </a:t>
-            </a:r>
-            <a:r>
-              <a:rPr lang="en-US" sz="2600" i="1" dirty="0" err="1">
-                <a:latin typeface="Lucida Sans Typewriter" panose="020B0509030504030204" pitchFamily="49" charset="77"/>
+              <a:t>To make the model practically useful, I saved the trained model and fitted preprocessor pipeline so they could be loaded and used in a separate notebook, </a:t>
+            </a:r>
+            <a:r>
+              <a:rPr lang="en-US" sz="2600" dirty="0" err="1">
+                <a:latin typeface="American Typewriter Condensed L" panose="02090306020004020304" pitchFamily="18" charset="77"/>
               </a:rPr>
               <a:t>used_car_price_predictor.ipynb</a:t>
-            </a:r>
-            <a:r>
-              <a:rPr lang="en-US" sz="2600" i="1" dirty="0">
-                <a:latin typeface="Lucida Sans Typewriter" panose="020B0509030504030204" pitchFamily="49" charset="77"/>
-              </a:rPr>
-              <a:t> </a:t>
             </a:r>
             <a:r>
               <a:rPr lang="en-US" sz="2600" dirty="0">
                 <a:latin typeface="Calibri" panose="020F0502020204030204" pitchFamily="34" charset="0"/>
                 <a:cs typeface="Calibri" panose="020F0502020204030204" pitchFamily="34" charset="0"/>
               </a:rPr>
-              <a:t>to verify I could duplicate test results from the saved model.</a:t>
+              <a:t>,  to verify I could duplicate test results from the saved model.</a:t>
             </a:r>
             <a:endParaRPr lang="en-US" sz="2600" i="1" dirty="0">
               <a:latin typeface="Calibri" panose="020F0502020204030204" pitchFamily="34" charset="0"/>
@@ -10054,7 +10072,7 @@
           <p:cNvPr id="2" name="Title 1">
             <a:extLst>
               <a:ext uri="{FF2B5EF4-FFF2-40B4-BE49-F238E27FC236}">
-                <a16:creationId xmlns:a16="http://schemas.microsoft.com/office/drawing/2014/main" id="{2D7DEC3F-1228-2286-6B91-A2B87C2B6270}"/>
+                <a16:creationId xmlns:a16="http://schemas.microsoft.com/office/drawing/2014/main" id="{E77CFA32-0119-E516-D6F1-78CCC1931D12}"/>
               </a:ext>
             </a:extLst>
           </p:cNvPr>
@@ -10063,6 +10081,36 @@
           </p:cNvSpPr>
           <p:nvPr>
             <p:ph type="title"/>
+          </p:nvPr>
+        </p:nvSpPr>
+        <p:spPr/>
+        <p:txBody>
+          <a:bodyPr>
+            <a:normAutofit fontScale="90000"/>
+          </a:bodyPr>
+          <a:lstStyle/>
+          <a:p>
+            <a:r>
+              <a:rPr lang="en-US" dirty="0"/>
+              <a:t>Project Overview</a:t>
+            </a:r>
+          </a:p>
+        </p:txBody>
+      </p:sp>
+      <p:sp>
+        <p:nvSpPr>
+          <p:cNvPr id="3" name="Text Placeholder 2">
+            <a:extLst>
+              <a:ext uri="{FF2B5EF4-FFF2-40B4-BE49-F238E27FC236}">
+                <a16:creationId xmlns:a16="http://schemas.microsoft.com/office/drawing/2014/main" id="{551864E5-FFDC-ADFD-43FF-2B170516EB7F}"/>
+              </a:ext>
+            </a:extLst>
+          </p:cNvPr>
+          <p:cNvSpPr>
+            <a:spLocks noGrp="1"/>
+          </p:cNvSpPr>
+          <p:nvPr>
+            <p:ph type="body" idx="1"/>
           </p:nvPr>
         </p:nvSpPr>
         <p:spPr/>
@@ -10076,228 +10124,61 @@
               <a:buNone/>
             </a:pPr>
             <a:r>
-              <a:rPr lang="en-US" sz="3600" b="0" i="0" dirty="0">
-                <a:solidFill>
-                  <a:srgbClr val="262626"/>
-                </a:solidFill>
-                <a:effectLst/>
-                <a:latin typeface="Calibri" panose="020F0502020204030204" pitchFamily="34" charset="0"/>
-                <a:cs typeface="Calibri" panose="020F0502020204030204" pitchFamily="34" charset="0"/>
-              </a:rPr>
-              <a:t>How do different variables influence used vehicle pricing?</a:t>
-            </a:r>
-          </a:p>
-        </p:txBody>
-      </p:sp>
-      <p:sp>
-        <p:nvSpPr>
-          <p:cNvPr id="3" name="Text Placeholder 2">
-            <a:extLst>
-              <a:ext uri="{FF2B5EF4-FFF2-40B4-BE49-F238E27FC236}">
-                <a16:creationId xmlns:a16="http://schemas.microsoft.com/office/drawing/2014/main" id="{6E057948-2F4E-0E44-5B1E-51136C244822}"/>
-              </a:ext>
-            </a:extLst>
-          </p:cNvPr>
-          <p:cNvSpPr>
-            <a:spLocks noGrp="1"/>
-          </p:cNvSpPr>
-          <p:nvPr>
-            <p:ph type="body" idx="1"/>
-          </p:nvPr>
-        </p:nvSpPr>
-        <p:spPr>
-          <a:xfrm>
-            <a:off x="415600" y="1536633"/>
-            <a:ext cx="11360800" cy="4360584"/>
-          </a:xfrm>
-        </p:spPr>
-        <p:txBody>
-          <a:bodyPr>
-            <a:normAutofit fontScale="92500" lnSpcReduction="20000"/>
-          </a:bodyPr>
-          <a:lstStyle/>
+              <a:rPr lang="en-US" dirty="0"/>
+              <a:t>The goals of this project are:</a:t>
+            </a:r>
+          </a:p>
           <a:p>
             <a:pPr marL="152396" indent="0">
               <a:buNone/>
             </a:pPr>
-            <a:r>
-              <a:rPr lang="en-US" b="1" dirty="0">
-                <a:solidFill>
-                  <a:srgbClr val="262626"/>
-                </a:solidFill>
-                <a:latin typeface="Calibri" panose="020F0502020204030204" pitchFamily="34" charset="0"/>
-                <a:cs typeface="Calibri" panose="020F0502020204030204" pitchFamily="34" charset="0"/>
-              </a:rPr>
-              <a:t>Practical utility to multiple types of users</a:t>
-            </a:r>
-          </a:p>
-          <a:p>
-            <a:r>
-              <a:rPr lang="en-US" dirty="0">
-                <a:latin typeface="Calibri" panose="020F0502020204030204" pitchFamily="34" charset="0"/>
-                <a:cs typeface="Calibri" panose="020F0502020204030204" pitchFamily="34" charset="0"/>
-              </a:rPr>
-              <a:t>User car dealers</a:t>
-            </a:r>
-          </a:p>
-          <a:p>
-            <a:r>
-              <a:rPr lang="en-US" dirty="0">
-                <a:latin typeface="Calibri" panose="020F0502020204030204" pitchFamily="34" charset="0"/>
-                <a:cs typeface="Calibri" panose="020F0502020204030204" pitchFamily="34" charset="0"/>
-              </a:rPr>
-              <a:t>Private sellers</a:t>
-            </a:r>
-          </a:p>
-          <a:p>
-            <a:r>
-              <a:rPr lang="en-US" dirty="0">
-                <a:latin typeface="Calibri" panose="020F0502020204030204" pitchFamily="34" charset="0"/>
-                <a:cs typeface="Calibri" panose="020F0502020204030204" pitchFamily="34" charset="0"/>
-              </a:rPr>
-              <a:t>New car purchasers with a trade-in </a:t>
-            </a:r>
-          </a:p>
-          <a:p>
-            <a:r>
-              <a:rPr lang="en-US" dirty="0">
-                <a:latin typeface="Calibri" panose="020F0502020204030204" pitchFamily="34" charset="0"/>
-                <a:cs typeface="Calibri" panose="020F0502020204030204" pitchFamily="34" charset="0"/>
-              </a:rPr>
-              <a:t>Dealerships purchasing trade-ins</a:t>
-            </a:r>
-          </a:p>
-          <a:p>
-            <a:r>
-              <a:rPr lang="en-US" dirty="0">
-                <a:latin typeface="Calibri" panose="020F0502020204030204" pitchFamily="34" charset="0"/>
-                <a:cs typeface="Calibri" panose="020F0502020204030204" pitchFamily="34" charset="0"/>
-              </a:rPr>
-              <a:t>Automotive websites and data providers (KBB, Edmunds, </a:t>
-            </a:r>
-            <a:r>
-              <a:rPr lang="en-US" dirty="0" err="1">
-                <a:latin typeface="Calibri" panose="020F0502020204030204" pitchFamily="34" charset="0"/>
-                <a:cs typeface="Calibri" panose="020F0502020204030204" pitchFamily="34" charset="0"/>
-              </a:rPr>
-              <a:t>etc</a:t>
-            </a:r>
-            <a:r>
-              <a:rPr lang="en-US">
-                <a:latin typeface="Calibri" panose="020F0502020204030204" pitchFamily="34" charset="0"/>
-                <a:cs typeface="Calibri" panose="020F0502020204030204" pitchFamily="34" charset="0"/>
-              </a:rPr>
-              <a:t>).</a:t>
-            </a:r>
-          </a:p>
-          <a:p>
-            <a:r>
-              <a:rPr lang="en-US">
-                <a:latin typeface="Calibri" panose="020F0502020204030204" pitchFamily="34" charset="0"/>
-                <a:cs typeface="Calibri" panose="020F0502020204030204" pitchFamily="34" charset="0"/>
-              </a:rPr>
-              <a:t>Economists or scientists investigating used vehicle market dynamics</a:t>
-            </a:r>
+            <a:endParaRPr lang="en-US" dirty="0"/>
           </a:p>
           <a:p>
             <a:pPr marL="152396" indent="0">
               <a:buNone/>
             </a:pPr>
-            <a:endParaRPr lang="en-US">
-              <a:solidFill>
-                <a:srgbClr val="262626"/>
-              </a:solidFill>
-              <a:latin typeface="Calibri" panose="020F0502020204030204" pitchFamily="34" charset="0"/>
-              <a:cs typeface="Calibri" panose="020F0502020204030204" pitchFamily="34" charset="0"/>
-            </a:endParaRPr>
+            <a:r>
+              <a:rPr lang="en-US" dirty="0"/>
+              <a:t> 1) to explore the influence of different features on the listing price of used vehicles, </a:t>
+            </a:r>
           </a:p>
           <a:p>
             <a:pPr marL="152396" indent="0">
               <a:buNone/>
             </a:pPr>
-            <a:r>
-              <a:rPr lang="en-US" b="1">
-                <a:solidFill>
-                  <a:srgbClr val="262626"/>
-                </a:solidFill>
-                <a:latin typeface="Calibri" panose="020F0502020204030204" pitchFamily="34" charset="0"/>
-                <a:cs typeface="Calibri" panose="020F0502020204030204" pitchFamily="34" charset="0"/>
-              </a:rPr>
-              <a:t>Team’s Personal Reasons</a:t>
-            </a:r>
-          </a:p>
-          <a:p>
-            <a:r>
-              <a:rPr lang="en-US">
-                <a:solidFill>
-                  <a:srgbClr val="262626"/>
-                </a:solidFill>
-                <a:latin typeface="Calibri" panose="020F0502020204030204" pitchFamily="34" charset="0"/>
-                <a:cs typeface="Calibri" panose="020F0502020204030204" pitchFamily="34" charset="0"/>
-              </a:rPr>
-              <a:t>Explore a regression problem (more prior experience with classification)</a:t>
-            </a:r>
-            <a:endParaRPr lang="en-US">
-              <a:latin typeface="Calibri" panose="020F0502020204030204" pitchFamily="34" charset="0"/>
-              <a:cs typeface="Calibri" panose="020F0502020204030204" pitchFamily="34" charset="0"/>
-            </a:endParaRPr>
-          </a:p>
-          <a:p>
-            <a:r>
-              <a:rPr lang="en-US">
-                <a:latin typeface="Calibri" panose="020F0502020204030204" pitchFamily="34" charset="0"/>
-                <a:cs typeface="Calibri" panose="020F0502020204030204" pitchFamily="34" charset="0"/>
-              </a:rPr>
-              <a:t>Gain experience with visualization, data preparation, and relevant libraries, especially scikit-learn, Pandas, and </a:t>
-            </a:r>
-            <a:r>
-              <a:rPr lang="en-US" err="1">
-                <a:latin typeface="Calibri" panose="020F0502020204030204" pitchFamily="34" charset="0"/>
-                <a:cs typeface="Calibri" panose="020F0502020204030204" pitchFamily="34" charset="0"/>
-              </a:rPr>
-              <a:t>XGBoost</a:t>
-            </a:r>
-            <a:r>
-              <a:rPr lang="en-US">
-                <a:latin typeface="Calibri" panose="020F0502020204030204" pitchFamily="34" charset="0"/>
-                <a:cs typeface="Calibri" panose="020F0502020204030204" pitchFamily="34" charset="0"/>
-              </a:rPr>
-              <a:t>.</a:t>
-            </a:r>
-          </a:p>
-          <a:p>
-            <a:r>
-              <a:rPr lang="en-US">
-                <a:latin typeface="Calibri" panose="020F0502020204030204" pitchFamily="34" charset="0"/>
-                <a:cs typeface="Calibri" panose="020F0502020204030204" pitchFamily="34" charset="0"/>
-              </a:rPr>
-              <a:t>Interested in cars</a:t>
-            </a:r>
-          </a:p>
-          <a:p>
-            <a:r>
-              <a:rPr lang="en-US">
-                <a:latin typeface="Calibri" panose="020F0502020204030204" pitchFamily="34" charset="0"/>
-                <a:cs typeface="Calibri" panose="020F0502020204030204" pitchFamily="34" charset="0"/>
-              </a:rPr>
-              <a:t>COVID-19 supply chain problems highlighted vehicle pricing changes</a:t>
-            </a:r>
+            <a:endParaRPr lang="en-US" dirty="0"/>
           </a:p>
           <a:p>
             <a:pPr marL="152396" indent="0">
               <a:buNone/>
             </a:pPr>
-            <a:endParaRPr lang="en-US">
-              <a:latin typeface="Calibri" panose="020F0502020204030204" pitchFamily="34" charset="0"/>
-              <a:cs typeface="Calibri" panose="020F0502020204030204" pitchFamily="34" charset="0"/>
-            </a:endParaRPr>
+            <a:r>
+              <a:rPr lang="en-US" dirty="0"/>
+              <a:t>2) examine the efficacy of various machine learning models for predicting listing price from the available training data, </a:t>
+            </a:r>
+          </a:p>
+          <a:p>
+            <a:pPr marL="152396" indent="0">
+              <a:buNone/>
+            </a:pPr>
+            <a:endParaRPr lang="en-US" dirty="0"/>
+          </a:p>
+          <a:p>
+            <a:pPr marL="152396" indent="0">
+              <a:buNone/>
+            </a:pPr>
+            <a:r>
+              <a:rPr lang="en-US" dirty="0"/>
+              <a:t>and 3) to enable users to predict a vehicle price via a web application based on the trained model. </a:t>
+            </a:r>
           </a:p>
         </p:txBody>
       </p:sp>
     </p:spTree>
     <p:extLst>
       <p:ext uri="{BB962C8B-B14F-4D97-AF65-F5344CB8AC3E}">
-        <p14:creationId xmlns:p14="http://schemas.microsoft.com/office/powerpoint/2010/main" val="2519445450"/>
+        <p14:creationId xmlns:p14="http://schemas.microsoft.com/office/powerpoint/2010/main" val="1503249293"/>
       </p:ext>
     </p:extLst>
   </p:cSld>
@@ -10603,7 +10484,7 @@
           <p:cNvPr id="2" name="Title 1">
             <a:extLst>
               <a:ext uri="{FF2B5EF4-FFF2-40B4-BE49-F238E27FC236}">
-                <a16:creationId xmlns:a16="http://schemas.microsoft.com/office/drawing/2014/main" id="{E77CFA32-0119-E516-D6F1-78CCC1931D12}"/>
+                <a16:creationId xmlns:a16="http://schemas.microsoft.com/office/drawing/2014/main" id="{2D7DEC3F-1228-2286-6B91-A2B87C2B6270}"/>
               </a:ext>
             </a:extLst>
           </p:cNvPr>
@@ -10612,36 +10493,6 @@
           </p:cNvSpPr>
           <p:nvPr>
             <p:ph type="title"/>
-          </p:nvPr>
-        </p:nvSpPr>
-        <p:spPr/>
-        <p:txBody>
-          <a:bodyPr>
-            <a:normAutofit fontScale="90000"/>
-          </a:bodyPr>
-          <a:lstStyle/>
-          <a:p>
-            <a:r>
-              <a:rPr lang="en-US"/>
-              <a:t>Project Overview (TODO: fix)</a:t>
-            </a:r>
-          </a:p>
-        </p:txBody>
-      </p:sp>
-      <p:sp>
-        <p:nvSpPr>
-          <p:cNvPr id="3" name="Text Placeholder 2">
-            <a:extLst>
-              <a:ext uri="{FF2B5EF4-FFF2-40B4-BE49-F238E27FC236}">
-                <a16:creationId xmlns:a16="http://schemas.microsoft.com/office/drawing/2014/main" id="{551864E5-FFDC-ADFD-43FF-2B170516EB7F}"/>
-              </a:ext>
-            </a:extLst>
-          </p:cNvPr>
-          <p:cNvSpPr>
-            <a:spLocks noGrp="1"/>
-          </p:cNvSpPr>
-          <p:nvPr>
-            <p:ph type="body" idx="1"/>
           </p:nvPr>
         </p:nvSpPr>
         <p:spPr/>
@@ -10651,14 +10502,206 @@
           </a:bodyPr>
           <a:lstStyle/>
           <a:p>
-            <a:endParaRPr lang="en-US"/>
+            <a:pPr marL="152396" indent="0">
+              <a:buNone/>
+            </a:pPr>
+            <a:r>
+              <a:rPr lang="en-US" sz="3600" b="0" i="0" dirty="0">
+                <a:solidFill>
+                  <a:srgbClr val="262626"/>
+                </a:solidFill>
+                <a:effectLst/>
+                <a:latin typeface="Calibri" panose="020F0502020204030204" pitchFamily="34" charset="0"/>
+                <a:cs typeface="Calibri" panose="020F0502020204030204" pitchFamily="34" charset="0"/>
+              </a:rPr>
+              <a:t>How do different variables influence used vehicle pricing?</a:t>
+            </a:r>
+          </a:p>
+        </p:txBody>
+      </p:sp>
+      <p:sp>
+        <p:nvSpPr>
+          <p:cNvPr id="3" name="Text Placeholder 2">
+            <a:extLst>
+              <a:ext uri="{FF2B5EF4-FFF2-40B4-BE49-F238E27FC236}">
+                <a16:creationId xmlns:a16="http://schemas.microsoft.com/office/drawing/2014/main" id="{6E057948-2F4E-0E44-5B1E-51136C244822}"/>
+              </a:ext>
+            </a:extLst>
+          </p:cNvPr>
+          <p:cNvSpPr>
+            <a:spLocks noGrp="1"/>
+          </p:cNvSpPr>
+          <p:nvPr>
+            <p:ph type="body" idx="1"/>
+          </p:nvPr>
+        </p:nvSpPr>
+        <p:spPr>
+          <a:xfrm>
+            <a:off x="415600" y="1536633"/>
+            <a:ext cx="11360800" cy="4360584"/>
+          </a:xfrm>
+        </p:spPr>
+        <p:txBody>
+          <a:bodyPr>
+            <a:normAutofit fontScale="92500" lnSpcReduction="10000"/>
+          </a:bodyPr>
+          <a:lstStyle/>
+          <a:p>
+            <a:pPr marL="152396" indent="0">
+              <a:buNone/>
+            </a:pPr>
+            <a:r>
+              <a:rPr lang="en-US" b="1" dirty="0">
+                <a:solidFill>
+                  <a:srgbClr val="262626"/>
+                </a:solidFill>
+                <a:latin typeface="Calibri" panose="020F0502020204030204" pitchFamily="34" charset="0"/>
+                <a:cs typeface="Calibri" panose="020F0502020204030204" pitchFamily="34" charset="0"/>
+              </a:rPr>
+              <a:t>Practical utility to multiple types of users</a:t>
+            </a:r>
+          </a:p>
+          <a:p>
+            <a:r>
+              <a:rPr lang="en-US" dirty="0">
+                <a:latin typeface="Calibri" panose="020F0502020204030204" pitchFamily="34" charset="0"/>
+                <a:cs typeface="Calibri" panose="020F0502020204030204" pitchFamily="34" charset="0"/>
+              </a:rPr>
+              <a:t>User car dealers</a:t>
+            </a:r>
+          </a:p>
+          <a:p>
+            <a:r>
+              <a:rPr lang="en-US" dirty="0">
+                <a:latin typeface="Calibri" panose="020F0502020204030204" pitchFamily="34" charset="0"/>
+                <a:cs typeface="Calibri" panose="020F0502020204030204" pitchFamily="34" charset="0"/>
+              </a:rPr>
+              <a:t>Private sellers</a:t>
+            </a:r>
+          </a:p>
+          <a:p>
+            <a:r>
+              <a:rPr lang="en-US" dirty="0">
+                <a:latin typeface="Calibri" panose="020F0502020204030204" pitchFamily="34" charset="0"/>
+                <a:cs typeface="Calibri" panose="020F0502020204030204" pitchFamily="34" charset="0"/>
+              </a:rPr>
+              <a:t>Customers/dealers negotiating prices of trade-in vehicles</a:t>
+            </a:r>
+          </a:p>
+          <a:p>
+            <a:r>
+              <a:rPr lang="en-US" dirty="0">
+                <a:latin typeface="Calibri" panose="020F0502020204030204" pitchFamily="34" charset="0"/>
+                <a:cs typeface="Calibri" panose="020F0502020204030204" pitchFamily="34" charset="0"/>
+              </a:rPr>
+              <a:t>Automotive websites and data providers</a:t>
+            </a:r>
+          </a:p>
+          <a:p>
+            <a:r>
+              <a:rPr lang="en-US" dirty="0">
+                <a:latin typeface="Calibri" panose="020F0502020204030204" pitchFamily="34" charset="0"/>
+                <a:cs typeface="Calibri" panose="020F0502020204030204" pitchFamily="34" charset="0"/>
+              </a:rPr>
+              <a:t>Economists or scientists investigating market dynamics</a:t>
+            </a:r>
+          </a:p>
+          <a:p>
+            <a:pPr marL="152396" indent="0">
+              <a:buNone/>
+            </a:pPr>
+            <a:endParaRPr lang="en-US" dirty="0">
+              <a:solidFill>
+                <a:srgbClr val="262626"/>
+              </a:solidFill>
+              <a:latin typeface="Calibri" panose="020F0502020204030204" pitchFamily="34" charset="0"/>
+              <a:cs typeface="Calibri" panose="020F0502020204030204" pitchFamily="34" charset="0"/>
+            </a:endParaRPr>
+          </a:p>
+          <a:p>
+            <a:pPr marL="152396" indent="0">
+              <a:buNone/>
+            </a:pPr>
+            <a:r>
+              <a:rPr lang="en-US" b="1" dirty="0">
+                <a:solidFill>
+                  <a:srgbClr val="262626"/>
+                </a:solidFill>
+                <a:latin typeface="Calibri" panose="020F0502020204030204" pitchFamily="34" charset="0"/>
+                <a:cs typeface="Calibri" panose="020F0502020204030204" pitchFamily="34" charset="0"/>
+              </a:rPr>
+              <a:t>Team’s Personal Reasons</a:t>
+            </a:r>
+          </a:p>
+          <a:p>
+            <a:r>
+              <a:rPr lang="en-US" dirty="0">
+                <a:solidFill>
+                  <a:srgbClr val="262626"/>
+                </a:solidFill>
+                <a:latin typeface="Calibri" panose="020F0502020204030204" pitchFamily="34" charset="0"/>
+                <a:cs typeface="Calibri" panose="020F0502020204030204" pitchFamily="34" charset="0"/>
+              </a:rPr>
+              <a:t>Explore a regression problem (more prior experience with classification)</a:t>
+            </a:r>
+            <a:endParaRPr lang="en-US" dirty="0">
+              <a:latin typeface="Calibri" panose="020F0502020204030204" pitchFamily="34" charset="0"/>
+              <a:cs typeface="Calibri" panose="020F0502020204030204" pitchFamily="34" charset="0"/>
+            </a:endParaRPr>
+          </a:p>
+          <a:p>
+            <a:r>
+              <a:rPr lang="en-US" dirty="0">
+                <a:latin typeface="Calibri" panose="020F0502020204030204" pitchFamily="34" charset="0"/>
+                <a:cs typeface="Calibri" panose="020F0502020204030204" pitchFamily="34" charset="0"/>
+              </a:rPr>
+              <a:t>Gain experience with visualization, data preparation, Scikit-Learn, Pandas, and </a:t>
+            </a:r>
+            <a:r>
+              <a:rPr lang="en-US" dirty="0" err="1">
+                <a:latin typeface="Calibri" panose="020F0502020204030204" pitchFamily="34" charset="0"/>
+                <a:cs typeface="Calibri" panose="020F0502020204030204" pitchFamily="34" charset="0"/>
+              </a:rPr>
+              <a:t>XGBoost</a:t>
+            </a:r>
+            <a:endParaRPr lang="en-US" dirty="0">
+              <a:latin typeface="Calibri" panose="020F0502020204030204" pitchFamily="34" charset="0"/>
+              <a:cs typeface="Calibri" panose="020F0502020204030204" pitchFamily="34" charset="0"/>
+            </a:endParaRPr>
+          </a:p>
+          <a:p>
+            <a:r>
+              <a:rPr lang="en-US" dirty="0">
+                <a:latin typeface="Calibri" panose="020F0502020204030204" pitchFamily="34" charset="0"/>
+                <a:cs typeface="Calibri" panose="020F0502020204030204" pitchFamily="34" charset="0"/>
+              </a:rPr>
+              <a:t>Always have been interested in cars</a:t>
+            </a:r>
+          </a:p>
+          <a:p>
+            <a:r>
+              <a:rPr lang="en-US" dirty="0">
+                <a:latin typeface="Calibri" panose="020F0502020204030204" pitchFamily="34" charset="0"/>
+                <a:cs typeface="Calibri" panose="020F0502020204030204" pitchFamily="34" charset="0"/>
+              </a:rPr>
+              <a:t>COVID-19 supply chain problems effect on vehicle prices</a:t>
+            </a:r>
+          </a:p>
+          <a:p>
+            <a:pPr marL="152396" indent="0">
+              <a:buNone/>
+            </a:pPr>
+            <a:endParaRPr lang="en-US" dirty="0">
+              <a:latin typeface="Calibri" panose="020F0502020204030204" pitchFamily="34" charset="0"/>
+              <a:cs typeface="Calibri" panose="020F0502020204030204" pitchFamily="34" charset="0"/>
+            </a:endParaRPr>
           </a:p>
         </p:txBody>
       </p:sp>
     </p:spTree>
     <p:extLst>
       <p:ext uri="{BB962C8B-B14F-4D97-AF65-F5344CB8AC3E}">
-        <p14:creationId xmlns:p14="http://schemas.microsoft.com/office/powerpoint/2010/main" val="1503249293"/>
+        <p14:creationId xmlns:p14="http://schemas.microsoft.com/office/powerpoint/2010/main" val="2519445450"/>
       </p:ext>
     </p:extLst>
   </p:cSld>
@@ -11284,25 +11327,39 @@
           <a:p>
             <a:r>
               <a:rPr lang="en-US" dirty="0"/>
-              <a:t>Useful columns in the dataset include two numeric columns, not counting listing price along with a larger number of categorical columns.</a:t>
-            </a:r>
-          </a:p>
-          <a:p>
-            <a:r>
-              <a:rPr lang="en-US" dirty="0"/>
-              <a:t>We examined the distribution of categorical features, histogram of numeric features, and correlation across all features.</a:t>
-            </a:r>
-          </a:p>
-          <a:p>
-            <a:r>
-              <a:rPr lang="en-US" dirty="0"/>
-              <a:t>We also examined pair plots across numeric feature pairs.</a:t>
-            </a:r>
-          </a:p>
-          <a:p>
-            <a:r>
-              <a:rPr lang="en-US" dirty="0"/>
-              <a:t>We also examined the missing/null ratio of all columns, and removed outliers of the numeric features.</a:t>
+              <a:t>Useful columns in the dataset include:</a:t>
+            </a:r>
+          </a:p>
+          <a:p>
+            <a:pPr lvl="1"/>
+            <a:r>
+              <a:rPr lang="en-US" dirty="0"/>
+              <a:t>Two numeric columns, not counting listing price</a:t>
+            </a:r>
+          </a:p>
+          <a:p>
+            <a:pPr lvl="1"/>
+            <a:r>
+              <a:rPr lang="en-US" dirty="0"/>
+              <a:t>And a larger number of categorical columns</a:t>
+            </a:r>
+          </a:p>
+          <a:p>
+            <a:r>
+              <a:rPr lang="en-US" dirty="0"/>
+              <a:t>Examined the distribution of categorical features, histogram of numeric features, and correlation across all features.</a:t>
+            </a:r>
+          </a:p>
+          <a:p>
+            <a:r>
+              <a:rPr lang="en-US" dirty="0"/>
+              <a:t>Examined pair plots across numeric feature pairs.</a:t>
+            </a:r>
+          </a:p>
+          <a:p>
+            <a:r>
+              <a:rPr lang="en-US" dirty="0"/>
+              <a:t>Examined missing/null ratio of all columns, and removed outliers of the numeric features.</a:t>
             </a:r>
           </a:p>
           <a:p>

</xml_diff>